<commit_message>
edited diagrams for storage component to include events
</commit_message>
<xml_diff>
--- a/docs/diagrams/StorageComponentClassDiagram.pptx
+++ b/docs/diagrams/StorageComponentClassDiagram.pptx
@@ -107,7 +107,27 @@
       </a:defRPr>
     </a:lvl9pPr>
   </p:defaultTextStyle>
+  <p:extLst>
+    <p:ext uri="{EFAFB233-063F-42B5-8137-9DF3F51BA10A}">
+      <p15:sldGuideLst xmlns:p15="http://schemas.microsoft.com/office/powerpoint/2012/main">
+        <p15:guide id="1" orient="horz" pos="1488">
+          <p15:clr>
+            <a:srgbClr val="A4A3A4"/>
+          </p15:clr>
+        </p15:guide>
+        <p15:guide id="2" pos="2880">
+          <p15:clr>
+            <a:srgbClr val="A4A3A4"/>
+          </p15:clr>
+        </p15:guide>
+      </p15:sldGuideLst>
+    </p:ext>
+  </p:extLst>
 </p:presentation>
+</file>
+
+<file path=ppt/revisionInfo.xml><?xml version="1.0" encoding="utf-8"?>
+<p1510:revInfo xmlns:a="http://schemas.openxmlformats.org/drawingml/2006/main" xmlns:r="http://schemas.openxmlformats.org/officeDocument/2006/relationships" xmlns:p1510="http://schemas.microsoft.com/office/powerpoint/2015/10/main"/>
 </file>
 
 <file path=ppt/notesMasters/notesMaster1.xml><?xml version="1.0" encoding="utf-8"?>
@@ -192,7 +212,7 @@
           <a:p>
             <a:fld id="{F5CC4B3F-88C1-4FFA-B1B6-F41C21DC6924}" type="datetimeFigureOut">
               <a:rPr lang="en-US" smtClean="0"/>
-              <a:t>10/16/2016</a:t>
+              <a:t>10/20/2017</a:t>
             </a:fld>
             <a:endParaRPr lang="en-US"/>
           </a:p>
@@ -256,38 +276,37 @@
           <a:p>
             <a:pPr lvl="0"/>
             <a:r>
-              <a:rPr lang="en-US" smtClean="0"/>
+              <a:rPr lang="en-US"/>
               <a:t>Click to edit Master text styles</a:t>
             </a:r>
           </a:p>
           <a:p>
             <a:pPr lvl="1"/>
             <a:r>
-              <a:rPr lang="en-US" smtClean="0"/>
+              <a:rPr lang="en-US"/>
               <a:t>Second level</a:t>
             </a:r>
           </a:p>
           <a:p>
             <a:pPr lvl="2"/>
             <a:r>
-              <a:rPr lang="en-US" smtClean="0"/>
+              <a:rPr lang="en-US"/>
               <a:t>Third level</a:t>
             </a:r>
           </a:p>
           <a:p>
             <a:pPr lvl="3"/>
             <a:r>
-              <a:rPr lang="en-US" smtClean="0"/>
+              <a:rPr lang="en-US"/>
               <a:t>Fourth level</a:t>
             </a:r>
           </a:p>
           <a:p>
             <a:pPr lvl="4"/>
             <a:r>
-              <a:rPr lang="en-US" smtClean="0"/>
+              <a:rPr lang="en-US"/>
               <a:t>Fifth level</a:t>
             </a:r>
-            <a:endParaRPr lang="en-US"/>
           </a:p>
         </p:txBody>
       </p:sp>
@@ -460,6 +479,90 @@
 </p:notesMaster>
 </file>
 
+<file path=ppt/notesSlides/notesSlide1.xml><?xml version="1.0" encoding="utf-8"?>
+<p:notes xmlns:a="http://schemas.openxmlformats.org/drawingml/2006/main" xmlns:r="http://schemas.openxmlformats.org/officeDocument/2006/relationships" xmlns:p="http://schemas.openxmlformats.org/presentationml/2006/main">
+  <p:cSld>
+    <p:spTree>
+      <p:nvGrpSpPr>
+        <p:cNvPr id="1" name=""/>
+        <p:cNvGrpSpPr/>
+        <p:nvPr/>
+      </p:nvGrpSpPr>
+      <p:grpSpPr>
+        <a:xfrm>
+          <a:off x="0" y="0"/>
+          <a:ext cx="0" cy="0"/>
+          <a:chOff x="0" y="0"/>
+          <a:chExt cx="0" cy="0"/>
+        </a:xfrm>
+      </p:grpSpPr>
+      <p:sp>
+        <p:nvSpPr>
+          <p:cNvPr id="2" name="Slide Image Placeholder 1"/>
+          <p:cNvSpPr>
+            <a:spLocks noGrp="1" noRot="1" noChangeAspect="1"/>
+          </p:cNvSpPr>
+          <p:nvPr>
+            <p:ph type="sldImg"/>
+          </p:nvPr>
+        </p:nvSpPr>
+        <p:spPr/>
+      </p:sp>
+      <p:sp>
+        <p:nvSpPr>
+          <p:cNvPr id="3" name="Notes Placeholder 2"/>
+          <p:cNvSpPr>
+            <a:spLocks noGrp="1"/>
+          </p:cNvSpPr>
+          <p:nvPr>
+            <p:ph type="body" idx="1"/>
+          </p:nvPr>
+        </p:nvSpPr>
+        <p:spPr/>
+        <p:txBody>
+          <a:bodyPr/>
+          <a:lstStyle/>
+          <a:p>
+            <a:endParaRPr lang="en-SG" dirty="0"/>
+          </a:p>
+        </p:txBody>
+      </p:sp>
+      <p:sp>
+        <p:nvSpPr>
+          <p:cNvPr id="4" name="Slide Number Placeholder 3"/>
+          <p:cNvSpPr>
+            <a:spLocks noGrp="1"/>
+          </p:cNvSpPr>
+          <p:nvPr>
+            <p:ph type="sldNum" sz="quarter" idx="10"/>
+          </p:nvPr>
+        </p:nvSpPr>
+        <p:spPr/>
+        <p:txBody>
+          <a:bodyPr/>
+          <a:lstStyle/>
+          <a:p>
+            <a:fld id="{5A7AB025-77E3-4BD1-A2FD-B3183DBA47A3}" type="slidenum">
+              <a:rPr lang="en-US" smtClean="0"/>
+              <a:t>1</a:t>
+            </a:fld>
+            <a:endParaRPr lang="en-US"/>
+          </a:p>
+        </p:txBody>
+      </p:sp>
+    </p:spTree>
+    <p:extLst>
+      <p:ext uri="{BB962C8B-B14F-4D97-AF65-F5344CB8AC3E}">
+        <p14:creationId xmlns:p14="http://schemas.microsoft.com/office/powerpoint/2010/main" val="1970621503"/>
+      </p:ext>
+    </p:extLst>
+  </p:cSld>
+  <p:clrMapOvr>
+    <a:masterClrMapping/>
+  </p:clrMapOvr>
+</p:notes>
+</file>
+
 <file path=ppt/slideLayouts/slideLayout1.xml><?xml version="1.0" encoding="utf-8"?>
 <p:sldLayout xmlns:a="http://schemas.openxmlformats.org/drawingml/2006/main" xmlns:r="http://schemas.openxmlformats.org/officeDocument/2006/relationships" xmlns:p="http://schemas.openxmlformats.org/presentationml/2006/main" type="title" preserve="1">
   <p:cSld name="Title Slide">
@@ -498,10 +601,9 @@
           <a:lstStyle/>
           <a:p>
             <a:r>
-              <a:rPr lang="en-US" smtClean="0"/>
+              <a:rPr lang="en-US"/>
               <a:t>Click to edit Master title style</a:t>
             </a:r>
-            <a:endParaRPr lang="en-US"/>
           </a:p>
         </p:txBody>
       </p:sp>
@@ -617,10 +719,9 @@
           </a:lstStyle>
           <a:p>
             <a:r>
-              <a:rPr lang="en-US" smtClean="0"/>
+              <a:rPr lang="en-US"/>
               <a:t>Click to edit Master subtitle style</a:t>
             </a:r>
-            <a:endParaRPr lang="en-US"/>
           </a:p>
         </p:txBody>
       </p:sp>
@@ -641,7 +742,7 @@
           <a:p>
             <a:fld id="{78C97017-6FC3-485B-9764-EAC9E56C1D49}" type="datetimeFigureOut">
               <a:rPr lang="en-US" smtClean="0"/>
-              <a:t>10/16/2016</a:t>
+              <a:t>10/20/2017</a:t>
             </a:fld>
             <a:endParaRPr lang="en-US"/>
           </a:p>
@@ -735,10 +836,9 @@
           <a:lstStyle/>
           <a:p>
             <a:r>
-              <a:rPr lang="en-US" smtClean="0"/>
+              <a:rPr lang="en-US"/>
               <a:t>Click to edit Master title style</a:t>
             </a:r>
-            <a:endParaRPr lang="en-US"/>
           </a:p>
         </p:txBody>
       </p:sp>
@@ -759,38 +859,37 @@
           <a:p>
             <a:pPr lvl="0"/>
             <a:r>
-              <a:rPr lang="en-US" smtClean="0"/>
+              <a:rPr lang="en-US"/>
               <a:t>Click to edit Master text styles</a:t>
             </a:r>
           </a:p>
           <a:p>
             <a:pPr lvl="1"/>
             <a:r>
-              <a:rPr lang="en-US" smtClean="0"/>
+              <a:rPr lang="en-US"/>
               <a:t>Second level</a:t>
             </a:r>
           </a:p>
           <a:p>
             <a:pPr lvl="2"/>
             <a:r>
-              <a:rPr lang="en-US" smtClean="0"/>
+              <a:rPr lang="en-US"/>
               <a:t>Third level</a:t>
             </a:r>
           </a:p>
           <a:p>
             <a:pPr lvl="3"/>
             <a:r>
-              <a:rPr lang="en-US" smtClean="0"/>
+              <a:rPr lang="en-US"/>
               <a:t>Fourth level</a:t>
             </a:r>
           </a:p>
           <a:p>
             <a:pPr lvl="4"/>
             <a:r>
-              <a:rPr lang="en-US" smtClean="0"/>
+              <a:rPr lang="en-US"/>
               <a:t>Fifth level</a:t>
             </a:r>
-            <a:endParaRPr lang="en-US"/>
           </a:p>
         </p:txBody>
       </p:sp>
@@ -811,7 +910,7 @@
           <a:p>
             <a:fld id="{78C97017-6FC3-485B-9764-EAC9E56C1D49}" type="datetimeFigureOut">
               <a:rPr lang="en-US" smtClean="0"/>
-              <a:t>10/16/2016</a:t>
+              <a:t>10/20/2017</a:t>
             </a:fld>
             <a:endParaRPr lang="en-US"/>
           </a:p>
@@ -910,10 +1009,9 @@
           <a:lstStyle/>
           <a:p>
             <a:r>
-              <a:rPr lang="en-US" smtClean="0"/>
+              <a:rPr lang="en-US"/>
               <a:t>Click to edit Master title style</a:t>
             </a:r>
-            <a:endParaRPr lang="en-US"/>
           </a:p>
         </p:txBody>
       </p:sp>
@@ -939,38 +1037,37 @@
           <a:p>
             <a:pPr lvl="0"/>
             <a:r>
-              <a:rPr lang="en-US" smtClean="0"/>
+              <a:rPr lang="en-US"/>
               <a:t>Click to edit Master text styles</a:t>
             </a:r>
           </a:p>
           <a:p>
             <a:pPr lvl="1"/>
             <a:r>
-              <a:rPr lang="en-US" smtClean="0"/>
+              <a:rPr lang="en-US"/>
               <a:t>Second level</a:t>
             </a:r>
           </a:p>
           <a:p>
             <a:pPr lvl="2"/>
             <a:r>
-              <a:rPr lang="en-US" smtClean="0"/>
+              <a:rPr lang="en-US"/>
               <a:t>Third level</a:t>
             </a:r>
           </a:p>
           <a:p>
             <a:pPr lvl="3"/>
             <a:r>
-              <a:rPr lang="en-US" smtClean="0"/>
+              <a:rPr lang="en-US"/>
               <a:t>Fourth level</a:t>
             </a:r>
           </a:p>
           <a:p>
             <a:pPr lvl="4"/>
             <a:r>
-              <a:rPr lang="en-US" smtClean="0"/>
+              <a:rPr lang="en-US"/>
               <a:t>Fifth level</a:t>
             </a:r>
-            <a:endParaRPr lang="en-US"/>
           </a:p>
         </p:txBody>
       </p:sp>
@@ -991,7 +1088,7 @@
           <a:p>
             <a:fld id="{78C97017-6FC3-485B-9764-EAC9E56C1D49}" type="datetimeFigureOut">
               <a:rPr lang="en-US" smtClean="0"/>
-              <a:t>10/16/2016</a:t>
+              <a:t>10/20/2017</a:t>
             </a:fld>
             <a:endParaRPr lang="en-US"/>
           </a:p>
@@ -1085,10 +1182,9 @@
           <a:lstStyle/>
           <a:p>
             <a:r>
-              <a:rPr lang="en-US" smtClean="0"/>
+              <a:rPr lang="en-US"/>
               <a:t>Click to edit Master title style</a:t>
             </a:r>
-            <a:endParaRPr lang="en-US"/>
           </a:p>
         </p:txBody>
       </p:sp>
@@ -1109,38 +1205,37 @@
           <a:p>
             <a:pPr lvl="0"/>
             <a:r>
-              <a:rPr lang="en-US" smtClean="0"/>
+              <a:rPr lang="en-US"/>
               <a:t>Click to edit Master text styles</a:t>
             </a:r>
           </a:p>
           <a:p>
             <a:pPr lvl="1"/>
             <a:r>
-              <a:rPr lang="en-US" smtClean="0"/>
+              <a:rPr lang="en-US"/>
               <a:t>Second level</a:t>
             </a:r>
           </a:p>
           <a:p>
             <a:pPr lvl="2"/>
             <a:r>
-              <a:rPr lang="en-US" smtClean="0"/>
+              <a:rPr lang="en-US"/>
               <a:t>Third level</a:t>
             </a:r>
           </a:p>
           <a:p>
             <a:pPr lvl="3"/>
             <a:r>
-              <a:rPr lang="en-US" smtClean="0"/>
+              <a:rPr lang="en-US"/>
               <a:t>Fourth level</a:t>
             </a:r>
           </a:p>
           <a:p>
             <a:pPr lvl="4"/>
             <a:r>
-              <a:rPr lang="en-US" smtClean="0"/>
+              <a:rPr lang="en-US"/>
               <a:t>Fifth level</a:t>
             </a:r>
-            <a:endParaRPr lang="en-US"/>
           </a:p>
         </p:txBody>
       </p:sp>
@@ -1161,7 +1256,7 @@
           <a:p>
             <a:fld id="{78C97017-6FC3-485B-9764-EAC9E56C1D49}" type="datetimeFigureOut">
               <a:rPr lang="en-US" smtClean="0"/>
-              <a:t>10/16/2016</a:t>
+              <a:t>10/20/2017</a:t>
             </a:fld>
             <a:endParaRPr lang="en-US"/>
           </a:p>
@@ -1264,10 +1359,9 @@
           </a:lstStyle>
           <a:p>
             <a:r>
-              <a:rPr lang="en-US" smtClean="0"/>
+              <a:rPr lang="en-US"/>
               <a:t>Click to edit Master title style</a:t>
             </a:r>
-            <a:endParaRPr lang="en-US"/>
           </a:p>
         </p:txBody>
       </p:sp>
@@ -1384,7 +1478,7 @@
           <a:p>
             <a:pPr lvl="0"/>
             <a:r>
-              <a:rPr lang="en-US" smtClean="0"/>
+              <a:rPr lang="en-US"/>
               <a:t>Click to edit Master text styles</a:t>
             </a:r>
           </a:p>
@@ -1407,7 +1501,7 @@
           <a:p>
             <a:fld id="{78C97017-6FC3-485B-9764-EAC9E56C1D49}" type="datetimeFigureOut">
               <a:rPr lang="en-US" smtClean="0"/>
-              <a:t>10/16/2016</a:t>
+              <a:t>10/20/2017</a:t>
             </a:fld>
             <a:endParaRPr lang="en-US"/>
           </a:p>
@@ -1501,10 +1595,9 @@
           <a:lstStyle/>
           <a:p>
             <a:r>
-              <a:rPr lang="en-US" smtClean="0"/>
+              <a:rPr lang="en-US"/>
               <a:t>Click to edit Master title style</a:t>
             </a:r>
-            <a:endParaRPr lang="en-US"/>
           </a:p>
         </p:txBody>
       </p:sp>
@@ -1558,38 +1651,37 @@
           <a:p>
             <a:pPr lvl="0"/>
             <a:r>
-              <a:rPr lang="en-US" smtClean="0"/>
+              <a:rPr lang="en-US"/>
               <a:t>Click to edit Master text styles</a:t>
             </a:r>
           </a:p>
           <a:p>
             <a:pPr lvl="1"/>
             <a:r>
-              <a:rPr lang="en-US" smtClean="0"/>
+              <a:rPr lang="en-US"/>
               <a:t>Second level</a:t>
             </a:r>
           </a:p>
           <a:p>
             <a:pPr lvl="2"/>
             <a:r>
-              <a:rPr lang="en-US" smtClean="0"/>
+              <a:rPr lang="en-US"/>
               <a:t>Third level</a:t>
             </a:r>
           </a:p>
           <a:p>
             <a:pPr lvl="3"/>
             <a:r>
-              <a:rPr lang="en-US" smtClean="0"/>
+              <a:rPr lang="en-US"/>
               <a:t>Fourth level</a:t>
             </a:r>
           </a:p>
           <a:p>
             <a:pPr lvl="4"/>
             <a:r>
-              <a:rPr lang="en-US" smtClean="0"/>
+              <a:rPr lang="en-US"/>
               <a:t>Fifth level</a:t>
             </a:r>
-            <a:endParaRPr lang="en-US"/>
           </a:p>
         </p:txBody>
       </p:sp>
@@ -1643,38 +1735,37 @@
           <a:p>
             <a:pPr lvl="0"/>
             <a:r>
-              <a:rPr lang="en-US" smtClean="0"/>
+              <a:rPr lang="en-US"/>
               <a:t>Click to edit Master text styles</a:t>
             </a:r>
           </a:p>
           <a:p>
             <a:pPr lvl="1"/>
             <a:r>
-              <a:rPr lang="en-US" smtClean="0"/>
+              <a:rPr lang="en-US"/>
               <a:t>Second level</a:t>
             </a:r>
           </a:p>
           <a:p>
             <a:pPr lvl="2"/>
             <a:r>
-              <a:rPr lang="en-US" smtClean="0"/>
+              <a:rPr lang="en-US"/>
               <a:t>Third level</a:t>
             </a:r>
           </a:p>
           <a:p>
             <a:pPr lvl="3"/>
             <a:r>
-              <a:rPr lang="en-US" smtClean="0"/>
+              <a:rPr lang="en-US"/>
               <a:t>Fourth level</a:t>
             </a:r>
           </a:p>
           <a:p>
             <a:pPr lvl="4"/>
             <a:r>
-              <a:rPr lang="en-US" smtClean="0"/>
+              <a:rPr lang="en-US"/>
               <a:t>Fifth level</a:t>
             </a:r>
-            <a:endParaRPr lang="en-US"/>
           </a:p>
         </p:txBody>
       </p:sp>
@@ -1695,7 +1786,7 @@
           <a:p>
             <a:fld id="{78C97017-6FC3-485B-9764-EAC9E56C1D49}" type="datetimeFigureOut">
               <a:rPr lang="en-US" smtClean="0"/>
-              <a:t>10/16/2016</a:t>
+              <a:t>10/20/2017</a:t>
             </a:fld>
             <a:endParaRPr lang="en-US"/>
           </a:p>
@@ -1793,10 +1884,9 @@
           </a:lstStyle>
           <a:p>
             <a:r>
-              <a:rPr lang="en-US" smtClean="0"/>
+              <a:rPr lang="en-US"/>
               <a:t>Click to edit Master title style</a:t>
             </a:r>
-            <a:endParaRPr lang="en-US"/>
           </a:p>
         </p:txBody>
       </p:sp>
@@ -1859,7 +1949,7 @@
           <a:p>
             <a:pPr lvl="0"/>
             <a:r>
-              <a:rPr lang="en-US" smtClean="0"/>
+              <a:rPr lang="en-US"/>
               <a:t>Click to edit Master text styles</a:t>
             </a:r>
           </a:p>
@@ -1915,38 +2005,37 @@
           <a:p>
             <a:pPr lvl="0"/>
             <a:r>
-              <a:rPr lang="en-US" smtClean="0"/>
+              <a:rPr lang="en-US"/>
               <a:t>Click to edit Master text styles</a:t>
             </a:r>
           </a:p>
           <a:p>
             <a:pPr lvl="1"/>
             <a:r>
-              <a:rPr lang="en-US" smtClean="0"/>
+              <a:rPr lang="en-US"/>
               <a:t>Second level</a:t>
             </a:r>
           </a:p>
           <a:p>
             <a:pPr lvl="2"/>
             <a:r>
-              <a:rPr lang="en-US" smtClean="0"/>
+              <a:rPr lang="en-US"/>
               <a:t>Third level</a:t>
             </a:r>
           </a:p>
           <a:p>
             <a:pPr lvl="3"/>
             <a:r>
-              <a:rPr lang="en-US" smtClean="0"/>
+              <a:rPr lang="en-US"/>
               <a:t>Fourth level</a:t>
             </a:r>
           </a:p>
           <a:p>
             <a:pPr lvl="4"/>
             <a:r>
-              <a:rPr lang="en-US" smtClean="0"/>
+              <a:rPr lang="en-US"/>
               <a:t>Fifth level</a:t>
             </a:r>
-            <a:endParaRPr lang="en-US"/>
           </a:p>
         </p:txBody>
       </p:sp>
@@ -2009,7 +2098,7 @@
           <a:p>
             <a:pPr lvl="0"/>
             <a:r>
-              <a:rPr lang="en-US" smtClean="0"/>
+              <a:rPr lang="en-US"/>
               <a:t>Click to edit Master text styles</a:t>
             </a:r>
           </a:p>
@@ -2065,38 +2154,37 @@
           <a:p>
             <a:pPr lvl="0"/>
             <a:r>
-              <a:rPr lang="en-US" smtClean="0"/>
+              <a:rPr lang="en-US"/>
               <a:t>Click to edit Master text styles</a:t>
             </a:r>
           </a:p>
           <a:p>
             <a:pPr lvl="1"/>
             <a:r>
-              <a:rPr lang="en-US" smtClean="0"/>
+              <a:rPr lang="en-US"/>
               <a:t>Second level</a:t>
             </a:r>
           </a:p>
           <a:p>
             <a:pPr lvl="2"/>
             <a:r>
-              <a:rPr lang="en-US" smtClean="0"/>
+              <a:rPr lang="en-US"/>
               <a:t>Third level</a:t>
             </a:r>
           </a:p>
           <a:p>
             <a:pPr lvl="3"/>
             <a:r>
-              <a:rPr lang="en-US" smtClean="0"/>
+              <a:rPr lang="en-US"/>
               <a:t>Fourth level</a:t>
             </a:r>
           </a:p>
           <a:p>
             <a:pPr lvl="4"/>
             <a:r>
-              <a:rPr lang="en-US" smtClean="0"/>
+              <a:rPr lang="en-US"/>
               <a:t>Fifth level</a:t>
             </a:r>
-            <a:endParaRPr lang="en-US"/>
           </a:p>
         </p:txBody>
       </p:sp>
@@ -2117,7 +2205,7 @@
           <a:p>
             <a:fld id="{78C97017-6FC3-485B-9764-EAC9E56C1D49}" type="datetimeFigureOut">
               <a:rPr lang="en-US" smtClean="0"/>
-              <a:t>10/16/2016</a:t>
+              <a:t>10/20/2017</a:t>
             </a:fld>
             <a:endParaRPr lang="en-US"/>
           </a:p>
@@ -2211,10 +2299,9 @@
           <a:lstStyle/>
           <a:p>
             <a:r>
-              <a:rPr lang="en-US" smtClean="0"/>
+              <a:rPr lang="en-US"/>
               <a:t>Click to edit Master title style</a:t>
             </a:r>
-            <a:endParaRPr lang="en-US"/>
           </a:p>
         </p:txBody>
       </p:sp>
@@ -2235,7 +2322,7 @@
           <a:p>
             <a:fld id="{78C97017-6FC3-485B-9764-EAC9E56C1D49}" type="datetimeFigureOut">
               <a:rPr lang="en-US" smtClean="0"/>
-              <a:t>10/16/2016</a:t>
+              <a:t>10/20/2017</a:t>
             </a:fld>
             <a:endParaRPr lang="en-US"/>
           </a:p>
@@ -2330,7 +2417,7 @@
           <a:p>
             <a:fld id="{78C97017-6FC3-485B-9764-EAC9E56C1D49}" type="datetimeFigureOut">
               <a:rPr lang="en-US" smtClean="0"/>
-              <a:t>10/16/2016</a:t>
+              <a:t>10/20/2017</a:t>
             </a:fld>
             <a:endParaRPr lang="en-US"/>
           </a:p>
@@ -2433,10 +2520,9 @@
           </a:lstStyle>
           <a:p>
             <a:r>
-              <a:rPr lang="en-US" smtClean="0"/>
+              <a:rPr lang="en-US"/>
               <a:t>Click to edit Master title style</a:t>
             </a:r>
-            <a:endParaRPr lang="en-US"/>
           </a:p>
         </p:txBody>
       </p:sp>
@@ -2490,38 +2576,37 @@
           <a:p>
             <a:pPr lvl="0"/>
             <a:r>
-              <a:rPr lang="en-US" smtClean="0"/>
+              <a:rPr lang="en-US"/>
               <a:t>Click to edit Master text styles</a:t>
             </a:r>
           </a:p>
           <a:p>
             <a:pPr lvl="1"/>
             <a:r>
-              <a:rPr lang="en-US" smtClean="0"/>
+              <a:rPr lang="en-US"/>
               <a:t>Second level</a:t>
             </a:r>
           </a:p>
           <a:p>
             <a:pPr lvl="2"/>
             <a:r>
-              <a:rPr lang="en-US" smtClean="0"/>
+              <a:rPr lang="en-US"/>
               <a:t>Third level</a:t>
             </a:r>
           </a:p>
           <a:p>
             <a:pPr lvl="3"/>
             <a:r>
-              <a:rPr lang="en-US" smtClean="0"/>
+              <a:rPr lang="en-US"/>
               <a:t>Fourth level</a:t>
             </a:r>
           </a:p>
           <a:p>
             <a:pPr lvl="4"/>
             <a:r>
-              <a:rPr lang="en-US" smtClean="0"/>
+              <a:rPr lang="en-US"/>
               <a:t>Fifth level</a:t>
             </a:r>
-            <a:endParaRPr lang="en-US"/>
           </a:p>
         </p:txBody>
       </p:sp>
@@ -2584,7 +2669,7 @@
           <a:p>
             <a:pPr lvl="0"/>
             <a:r>
-              <a:rPr lang="en-US" smtClean="0"/>
+              <a:rPr lang="en-US"/>
               <a:t>Click to edit Master text styles</a:t>
             </a:r>
           </a:p>
@@ -2607,7 +2692,7 @@
           <a:p>
             <a:fld id="{78C97017-6FC3-485B-9764-EAC9E56C1D49}" type="datetimeFigureOut">
               <a:rPr lang="en-US" smtClean="0"/>
-              <a:t>10/16/2016</a:t>
+              <a:t>10/20/2017</a:t>
             </a:fld>
             <a:endParaRPr lang="en-US"/>
           </a:p>
@@ -2710,10 +2795,9 @@
           </a:lstStyle>
           <a:p>
             <a:r>
-              <a:rPr lang="en-US" smtClean="0"/>
+              <a:rPr lang="en-US"/>
               <a:t>Click to edit Master title style</a:t>
             </a:r>
-            <a:endParaRPr lang="en-US"/>
           </a:p>
         </p:txBody>
       </p:sp>
@@ -2837,7 +2921,7 @@
           <a:p>
             <a:pPr lvl="0"/>
             <a:r>
-              <a:rPr lang="en-US" smtClean="0"/>
+              <a:rPr lang="en-US"/>
               <a:t>Click to edit Master text styles</a:t>
             </a:r>
           </a:p>
@@ -2860,7 +2944,7 @@
           <a:p>
             <a:fld id="{78C97017-6FC3-485B-9764-EAC9E56C1D49}" type="datetimeFigureOut">
               <a:rPr lang="en-US" smtClean="0"/>
-              <a:t>10/16/2016</a:t>
+              <a:t>10/20/2017</a:t>
             </a:fld>
             <a:endParaRPr lang="en-US"/>
           </a:p>
@@ -2969,10 +3053,9 @@
           <a:lstStyle/>
           <a:p>
             <a:r>
-              <a:rPr lang="en-US" smtClean="0"/>
+              <a:rPr lang="en-US"/>
               <a:t>Click to edit Master title style</a:t>
             </a:r>
-            <a:endParaRPr lang="en-US"/>
           </a:p>
         </p:txBody>
       </p:sp>
@@ -3003,38 +3086,37 @@
           <a:p>
             <a:pPr lvl="0"/>
             <a:r>
-              <a:rPr lang="en-US" smtClean="0"/>
+              <a:rPr lang="en-US"/>
               <a:t>Click to edit Master text styles</a:t>
             </a:r>
           </a:p>
           <a:p>
             <a:pPr lvl="1"/>
             <a:r>
-              <a:rPr lang="en-US" smtClean="0"/>
+              <a:rPr lang="en-US"/>
               <a:t>Second level</a:t>
             </a:r>
           </a:p>
           <a:p>
             <a:pPr lvl="2"/>
             <a:r>
-              <a:rPr lang="en-US" smtClean="0"/>
+              <a:rPr lang="en-US"/>
               <a:t>Third level</a:t>
             </a:r>
           </a:p>
           <a:p>
             <a:pPr lvl="3"/>
             <a:r>
-              <a:rPr lang="en-US" smtClean="0"/>
+              <a:rPr lang="en-US"/>
               <a:t>Fourth level</a:t>
             </a:r>
           </a:p>
           <a:p>
             <a:pPr lvl="4"/>
             <a:r>
-              <a:rPr lang="en-US" smtClean="0"/>
+              <a:rPr lang="en-US"/>
               <a:t>Fifth level</a:t>
             </a:r>
-            <a:endParaRPr lang="en-US"/>
           </a:p>
         </p:txBody>
       </p:sp>
@@ -3073,7 +3155,7 @@
           <a:p>
             <a:fld id="{78C97017-6FC3-485B-9764-EAC9E56C1D49}" type="datetimeFigureOut">
               <a:rPr lang="en-US" smtClean="0"/>
-              <a:t>10/16/2016</a:t>
+              <a:t>10/20/2017</a:t>
             </a:fld>
             <a:endParaRPr lang="en-US"/>
           </a:p>
@@ -3457,7 +3539,7 @@
         <p:spPr>
           <a:xfrm>
             <a:off x="1119865" y="2086382"/>
-            <a:ext cx="7871735" cy="1723618"/>
+            <a:ext cx="7871735" cy="2257018"/>
           </a:xfrm>
           <a:prstGeom prst="roundRect">
             <a:avLst>
@@ -3494,7 +3576,7 @@
           <a:lstStyle/>
           <a:p>
             <a:r>
-              <a:rPr lang="en-US" sz="1200" b="1" dirty="0" smtClean="0">
+              <a:rPr lang="en-US" sz="1200" b="1" dirty="0">
                 <a:solidFill>
                   <a:schemeClr val="accent6">
                     <a:lumMod val="75000"/>
@@ -3561,7 +3643,7 @@
           <a:p>
             <a:pPr algn="ctr"/>
             <a:r>
-              <a:rPr lang="en-US" sz="1050" dirty="0" smtClean="0">
+              <a:rPr lang="en-US" sz="1050" dirty="0">
                 <a:solidFill>
                   <a:schemeClr val="bg1"/>
                 </a:solidFill>
@@ -3569,14 +3651,14 @@
               <a:t>&lt;&lt;interface&gt;&gt;</a:t>
             </a:r>
             <a:br>
-              <a:rPr lang="en-US" sz="1050" dirty="0" smtClean="0">
+              <a:rPr lang="en-US" sz="1050" dirty="0">
                 <a:solidFill>
                   <a:schemeClr val="bg1"/>
                 </a:solidFill>
               </a:rPr>
             </a:br>
             <a:r>
-              <a:rPr lang="en-US" sz="1050" dirty="0" err="1" smtClean="0">
+              <a:rPr lang="en-US" sz="1050" dirty="0" err="1">
                 <a:solidFill>
                   <a:schemeClr val="bg1"/>
                 </a:solidFill>
@@ -3639,7 +3721,7 @@
           <a:p>
             <a:pPr algn="ctr"/>
             <a:r>
-              <a:rPr lang="en-US" sz="1050" dirty="0" err="1" smtClean="0">
+              <a:rPr lang="en-US" sz="1050" dirty="0" err="1">
                 <a:solidFill>
                   <a:schemeClr val="bg1"/>
                 </a:solidFill>
@@ -3713,7 +3795,7 @@
           <a:p>
             <a:pPr algn="ctr"/>
             <a:r>
-              <a:rPr lang="en-US" sz="1050" dirty="0" smtClean="0">
+              <a:rPr lang="en-US" sz="1050" dirty="0">
                 <a:solidFill>
                   <a:schemeClr val="bg1"/>
                 </a:solidFill>
@@ -4147,7 +4229,7 @@
           <a:p>
             <a:pPr algn="ctr"/>
             <a:r>
-              <a:rPr lang="en-US" sz="1050" b="1" dirty="0" err="1" smtClean="0">
+              <a:rPr lang="en-US" sz="1050" b="1" dirty="0" err="1">
                 <a:solidFill>
                   <a:schemeClr val="accent6">
                     <a:lumMod val="75000"/>
@@ -4156,18 +4238,8 @@
               </a:rPr>
               <a:t>XmlAddressBook</a:t>
             </a:r>
-            <a:r>
-              <a:rPr lang="en-US" sz="1050" b="1" dirty="0" smtClean="0">
-                <a:solidFill>
-                  <a:schemeClr val="accent6">
-                    <a:lumMod val="75000"/>
-                  </a:schemeClr>
-                </a:solidFill>
-              </a:rPr>
-              <a:t/>
-            </a:r>
             <a:br>
-              <a:rPr lang="en-US" sz="1050" b="1" dirty="0" smtClean="0">
+              <a:rPr lang="en-US" sz="1050" b="1" dirty="0">
                 <a:solidFill>
                   <a:schemeClr val="accent6">
                     <a:lumMod val="75000"/>
@@ -4176,7 +4248,7 @@
               </a:rPr>
             </a:br>
             <a:r>
-              <a:rPr lang="en-US" sz="1050" b="1" dirty="0" smtClean="0">
+              <a:rPr lang="en-US" sz="1050" b="1" dirty="0">
                 <a:solidFill>
                   <a:schemeClr val="accent6">
                     <a:lumMod val="75000"/>
@@ -4243,7 +4315,7 @@
           <a:p>
             <a:pPr algn="ctr"/>
             <a:r>
-              <a:rPr lang="en-US" sz="1050" dirty="0" smtClean="0">
+              <a:rPr lang="en-US" sz="1050" dirty="0">
                 <a:solidFill>
                   <a:schemeClr val="bg1"/>
                 </a:solidFill>
@@ -4251,14 +4323,14 @@
               <a:t>&lt;&lt;interface&gt;&gt;</a:t>
             </a:r>
             <a:br>
-              <a:rPr lang="en-US" sz="1050" dirty="0" smtClean="0">
+              <a:rPr lang="en-US" sz="1050" dirty="0">
                 <a:solidFill>
                   <a:schemeClr val="bg1"/>
                 </a:solidFill>
               </a:rPr>
             </a:br>
             <a:r>
-              <a:rPr lang="en-US" sz="1050" dirty="0" err="1" smtClean="0">
+              <a:rPr lang="en-US" sz="1050" dirty="0" err="1">
                 <a:solidFill>
                   <a:schemeClr val="bg1"/>
                 </a:solidFill>
@@ -4516,30 +4588,22 @@
           <a:p>
             <a:pPr algn="ctr"/>
             <a:r>
-              <a:rPr lang="en-US" sz="1050" dirty="0" err="1" smtClean="0">
+              <a:rPr lang="en-US" sz="1050" dirty="0" err="1">
                 <a:solidFill>
                   <a:schemeClr val="bg1"/>
                 </a:solidFill>
               </a:rPr>
               <a:t>JsonUserPrefs</a:t>
             </a:r>
-            <a:r>
-              <a:rPr lang="en-US" sz="1050" dirty="0" smtClean="0">
-                <a:solidFill>
-                  <a:schemeClr val="bg1"/>
-                </a:solidFill>
-              </a:rPr>
-              <a:t/>
-            </a:r>
             <a:br>
-              <a:rPr lang="en-US" sz="1050" dirty="0" smtClean="0">
+              <a:rPr lang="en-US" sz="1050" dirty="0">
                 <a:solidFill>
                   <a:schemeClr val="bg1"/>
                 </a:solidFill>
               </a:rPr>
             </a:br>
             <a:r>
-              <a:rPr lang="en-US" sz="1050" dirty="0" smtClean="0">
+              <a:rPr lang="en-US" sz="1050" dirty="0">
                 <a:solidFill>
                   <a:schemeClr val="bg1"/>
                 </a:solidFill>
@@ -4591,7 +4655,7 @@
           <a:p>
             <a:pPr algn="ctr"/>
             <a:r>
-              <a:rPr lang="en-US" sz="1050" b="1" dirty="0" err="1" smtClean="0">
+              <a:rPr lang="en-US" sz="1050" b="1" dirty="0" err="1">
                 <a:solidFill>
                   <a:schemeClr val="accent6">
                     <a:lumMod val="75000"/>
@@ -4600,18 +4664,8 @@
               </a:rPr>
               <a:t>XmlSerializable</a:t>
             </a:r>
-            <a:r>
-              <a:rPr lang="en-US" sz="1050" b="1" dirty="0" smtClean="0">
-                <a:solidFill>
-                  <a:schemeClr val="accent6">
-                    <a:lumMod val="75000"/>
-                  </a:schemeClr>
-                </a:solidFill>
-              </a:rPr>
-              <a:t/>
-            </a:r>
             <a:br>
-              <a:rPr lang="en-US" sz="1050" b="1" dirty="0" smtClean="0">
+              <a:rPr lang="en-US" sz="1050" b="1" dirty="0">
                 <a:solidFill>
                   <a:schemeClr val="accent6">
                     <a:lumMod val="75000"/>
@@ -4620,7 +4674,7 @@
               </a:rPr>
             </a:br>
             <a:r>
-              <a:rPr lang="en-US" sz="1050" b="1" dirty="0" err="1" smtClean="0">
+              <a:rPr lang="en-US" sz="1050" b="1" dirty="0" err="1">
                 <a:solidFill>
                   <a:schemeClr val="accent6">
                     <a:lumMod val="75000"/>
@@ -4717,7 +4771,7 @@
           <a:p>
             <a:pPr algn="ctr"/>
             <a:r>
-              <a:rPr lang="en-US" sz="1050" b="1" dirty="0" err="1" smtClean="0">
+              <a:rPr lang="en-US" sz="1050" b="1" dirty="0" err="1">
                 <a:solidFill>
                   <a:schemeClr val="accent6">
                     <a:lumMod val="75000"/>
@@ -4773,7 +4827,7 @@
           <a:p>
             <a:pPr algn="ctr"/>
             <a:r>
-              <a:rPr lang="en-US" sz="1050" b="1" dirty="0" err="1" smtClean="0">
+              <a:rPr lang="en-US" sz="1050" b="1" dirty="0" err="1">
                 <a:solidFill>
                   <a:schemeClr val="accent6">
                     <a:lumMod val="75000"/>
@@ -4792,24 +4846,90 @@
           </a:p>
         </p:txBody>
       </p:sp>
+      <p:sp>
+        <p:nvSpPr>
+          <p:cNvPr id="26" name="Rectangle 8">
+            <a:extLst>
+              <a:ext uri="{FF2B5EF4-FFF2-40B4-BE49-F238E27FC236}">
+                <a16:creationId xmlns:a16="http://schemas.microsoft.com/office/drawing/2014/main" id="{3F299393-5AF9-4CDA-9A8E-6BFFB53B7C20}"/>
+              </a:ext>
+            </a:extLst>
+          </p:cNvPr>
+          <p:cNvSpPr/>
+          <p:nvPr/>
+        </p:nvSpPr>
+        <p:spPr>
+          <a:xfrm>
+            <a:off x="7615738" y="3731565"/>
+            <a:ext cx="1259718" cy="346760"/>
+          </a:xfrm>
+          <a:prstGeom prst="rect">
+            <a:avLst/>
+          </a:prstGeom>
+          <a:ln w="19050"/>
+          <a:effectLst/>
+        </p:spPr>
+        <p:style>
+          <a:lnRef idx="1">
+            <a:schemeClr val="accent6"/>
+          </a:lnRef>
+          <a:fillRef idx="2">
+            <a:schemeClr val="accent6"/>
+          </a:fillRef>
+          <a:effectRef idx="1">
+            <a:schemeClr val="accent6"/>
+          </a:effectRef>
+          <a:fontRef idx="minor">
+            <a:schemeClr val="dk1"/>
+          </a:fontRef>
+        </p:style>
+        <p:txBody>
+          <a:bodyPr rtlCol="0" anchor="ctr"/>
+          <a:lstStyle/>
+          <a:p>
+            <a:pPr algn="ctr"/>
+            <a:r>
+              <a:rPr lang="en-US" sz="1050" b="1" dirty="0" err="1">
+                <a:solidFill>
+                  <a:schemeClr val="accent6">
+                    <a:lumMod val="75000"/>
+                  </a:schemeClr>
+                </a:solidFill>
+              </a:rPr>
+              <a:t>XmlAdaptedEvent</a:t>
+            </a:r>
+            <a:endParaRPr lang="en-SG" sz="1050" b="1" dirty="0">
+              <a:solidFill>
+                <a:schemeClr val="accent6">
+                  <a:lumMod val="75000"/>
+                </a:schemeClr>
+              </a:solidFill>
+            </a:endParaRPr>
+          </a:p>
+        </p:txBody>
+      </p:sp>
       <p:cxnSp>
         <p:nvCxnSpPr>
-          <p:cNvPr id="77" name="Elbow Connector 122"/>
+          <p:cNvPr id="27" name="Elbow Connector 122">
+            <a:extLst>
+              <a:ext uri="{FF2B5EF4-FFF2-40B4-BE49-F238E27FC236}">
+                <a16:creationId xmlns:a16="http://schemas.microsoft.com/office/drawing/2014/main" id="{0EF6FDAD-FA08-4AC0-86BE-4EDF974D7752}"/>
+              </a:ext>
+            </a:extLst>
+          </p:cNvPr>
           <p:cNvCxnSpPr>
-            <a:stCxn id="66" idx="3"/>
-            <a:endCxn id="74" idx="1"/>
+            <a:cxnSpLocks/>
+            <a:endCxn id="26" idx="1"/>
           </p:cNvCxnSpPr>
           <p:nvPr/>
         </p:nvCxnSpPr>
         <p:spPr>
-          <a:xfrm flipV="1">
-            <a:off x="7220507" y="3333004"/>
-            <a:ext cx="395231" cy="786"/>
+          <a:xfrm rot="16200000" flipH="1">
+            <a:off x="7209891" y="3499098"/>
+            <a:ext cx="533524" cy="278169"/>
           </a:xfrm>
-          <a:prstGeom prst="bentConnector3">
-            <a:avLst>
-              <a:gd name="adj1" fmla="val 50000"/>
-            </a:avLst>
+          <a:prstGeom prst="bentConnector2">
+            <a:avLst/>
           </a:prstGeom>
           <a:ln w="19050">
             <a:prstDash val="sysDot"/>
@@ -4833,6 +4953,104 @@
           </a:fontRef>
         </p:style>
       </p:cxnSp>
+      <p:cxnSp>
+        <p:nvCxnSpPr>
+          <p:cNvPr id="33" name="Elbow Connector 63">
+            <a:extLst>
+              <a:ext uri="{FF2B5EF4-FFF2-40B4-BE49-F238E27FC236}">
+                <a16:creationId xmlns:a16="http://schemas.microsoft.com/office/drawing/2014/main" id="{B3F41DEA-8045-4BE9-AE0D-0CBA6BA9FBE2}"/>
+              </a:ext>
+            </a:extLst>
+          </p:cNvPr>
+          <p:cNvCxnSpPr/>
+          <p:nvPr/>
+        </p:nvCxnSpPr>
+        <p:spPr>
+          <a:xfrm flipV="1">
+            <a:off x="7225905" y="3344822"/>
+            <a:ext cx="223324" cy="1"/>
+          </a:xfrm>
+          <a:prstGeom prst="bentConnector3">
+            <a:avLst>
+              <a:gd name="adj1" fmla="val 50000"/>
+            </a:avLst>
+          </a:prstGeom>
+          <a:ln w="19050">
+            <a:solidFill>
+              <a:schemeClr val="accent6">
+                <a:lumMod val="75000"/>
+              </a:schemeClr>
+            </a:solidFill>
+            <a:prstDash val="sysDot"/>
+            <a:headEnd type="none" w="med" len="med"/>
+            <a:tailEnd type="none" w="med" len="med"/>
+          </a:ln>
+          <a:effectLst/>
+        </p:spPr>
+        <p:style>
+          <a:lnRef idx="1">
+            <a:schemeClr val="accent2"/>
+          </a:lnRef>
+          <a:fillRef idx="2">
+            <a:schemeClr val="accent2"/>
+          </a:fillRef>
+          <a:effectRef idx="1">
+            <a:schemeClr val="accent2"/>
+          </a:effectRef>
+          <a:fontRef idx="minor">
+            <a:schemeClr val="dk1"/>
+          </a:fontRef>
+        </p:style>
+      </p:cxnSp>
+      <p:cxnSp>
+        <p:nvCxnSpPr>
+          <p:cNvPr id="36" name="Elbow Connector 122">
+            <a:extLst>
+              <a:ext uri="{FF2B5EF4-FFF2-40B4-BE49-F238E27FC236}">
+                <a16:creationId xmlns:a16="http://schemas.microsoft.com/office/drawing/2014/main" id="{F3ACA18B-E1EF-4F11-9C30-8875358AC54A}"/>
+              </a:ext>
+            </a:extLst>
+          </p:cNvPr>
+          <p:cNvCxnSpPr/>
+          <p:nvPr/>
+        </p:nvCxnSpPr>
+        <p:spPr>
+          <a:xfrm>
+            <a:off x="7382171" y="3338728"/>
+            <a:ext cx="228600" cy="1970"/>
+          </a:xfrm>
+          <a:prstGeom prst="bentConnector3">
+            <a:avLst>
+              <a:gd name="adj1" fmla="val 50000"/>
+            </a:avLst>
+          </a:prstGeom>
+          <a:ln w="19050">
+            <a:solidFill>
+              <a:schemeClr val="accent6">
+                <a:lumMod val="75000"/>
+              </a:schemeClr>
+            </a:solidFill>
+            <a:prstDash val="sysDot"/>
+            <a:headEnd type="none" w="med" len="med"/>
+            <a:tailEnd type="arrow" w="med" len="med"/>
+          </a:ln>
+          <a:effectLst/>
+        </p:spPr>
+        <p:style>
+          <a:lnRef idx="1">
+            <a:schemeClr val="accent2"/>
+          </a:lnRef>
+          <a:fillRef idx="2">
+            <a:schemeClr val="accent2"/>
+          </a:fillRef>
+          <a:effectRef idx="1">
+            <a:schemeClr val="accent2"/>
+          </a:effectRef>
+          <a:fontRef idx="minor">
+            <a:schemeClr val="dk1"/>
+          </a:fontRef>
+        </p:style>
+      </p:cxnSp>
     </p:spTree>
     <p:extLst>
       <p:ext uri="{BB962C8B-B14F-4D97-AF65-F5344CB8AC3E}">
@@ -4843,13 +5061,6 @@
   <p:clrMapOvr>
     <a:masterClrMapping/>
   </p:clrMapOvr>
-  <p:timing>
-    <p:tnLst>
-      <p:par>
-        <p:cTn id="1" dur="indefinite" restart="never" nodeType="tmRoot"/>
-      </p:par>
-    </p:tnLst>
-  </p:timing>
 </p:sld>
 </file>
 

</xml_diff>

<commit_message>
DG - Updated storage diagram.
</commit_message>
<xml_diff>
--- a/docs/diagrams/StorageComponentClassDiagram.pptx
+++ b/docs/diagrams/StorageComponentClassDiagram.pptx
@@ -107,7 +107,27 @@
       </a:defRPr>
     </a:lvl9pPr>
   </p:defaultTextStyle>
+  <p:extLst>
+    <p:ext uri="{EFAFB233-063F-42B5-8137-9DF3F51BA10A}">
+      <p15:sldGuideLst xmlns:p15="http://schemas.microsoft.com/office/powerpoint/2012/main">
+        <p15:guide id="1" orient="horz" pos="1488">
+          <p15:clr>
+            <a:srgbClr val="A4A3A4"/>
+          </p15:clr>
+        </p15:guide>
+        <p15:guide id="2" pos="2880">
+          <p15:clr>
+            <a:srgbClr val="A4A3A4"/>
+          </p15:clr>
+        </p15:guide>
+      </p15:sldGuideLst>
+    </p:ext>
+  </p:extLst>
 </p:presentation>
+</file>
+
+<file path=ppt/revisionInfo.xml><?xml version="1.0" encoding="utf-8"?>
+<p1510:revInfo xmlns:a="http://schemas.openxmlformats.org/drawingml/2006/main" xmlns:r="http://schemas.openxmlformats.org/officeDocument/2006/relationships" xmlns:p1510="http://schemas.microsoft.com/office/powerpoint/2015/10/main"/>
 </file>
 
 <file path=ppt/notesMasters/notesMaster1.xml><?xml version="1.0" encoding="utf-8"?>
@@ -192,7 +212,7 @@
           <a:p>
             <a:fld id="{F5CC4B3F-88C1-4FFA-B1B6-F41C21DC6924}" type="datetimeFigureOut">
               <a:rPr lang="en-US" smtClean="0"/>
-              <a:t>10/16/2016</a:t>
+              <a:t>10/22/2017</a:t>
             </a:fld>
             <a:endParaRPr lang="en-US"/>
           </a:p>
@@ -256,38 +276,37 @@
           <a:p>
             <a:pPr lvl="0"/>
             <a:r>
-              <a:rPr lang="en-US" smtClean="0"/>
+              <a:rPr lang="en-US"/>
               <a:t>Click to edit Master text styles</a:t>
             </a:r>
           </a:p>
           <a:p>
             <a:pPr lvl="1"/>
             <a:r>
-              <a:rPr lang="en-US" smtClean="0"/>
+              <a:rPr lang="en-US"/>
               <a:t>Second level</a:t>
             </a:r>
           </a:p>
           <a:p>
             <a:pPr lvl="2"/>
             <a:r>
-              <a:rPr lang="en-US" smtClean="0"/>
+              <a:rPr lang="en-US"/>
               <a:t>Third level</a:t>
             </a:r>
           </a:p>
           <a:p>
             <a:pPr lvl="3"/>
             <a:r>
-              <a:rPr lang="en-US" smtClean="0"/>
+              <a:rPr lang="en-US"/>
               <a:t>Fourth level</a:t>
             </a:r>
           </a:p>
           <a:p>
             <a:pPr lvl="4"/>
             <a:r>
-              <a:rPr lang="en-US" smtClean="0"/>
+              <a:rPr lang="en-US"/>
               <a:t>Fifth level</a:t>
             </a:r>
-            <a:endParaRPr lang="en-US"/>
           </a:p>
         </p:txBody>
       </p:sp>
@@ -498,10 +517,9 @@
           <a:lstStyle/>
           <a:p>
             <a:r>
-              <a:rPr lang="en-US" smtClean="0"/>
+              <a:rPr lang="en-US"/>
               <a:t>Click to edit Master title style</a:t>
             </a:r>
-            <a:endParaRPr lang="en-US"/>
           </a:p>
         </p:txBody>
       </p:sp>
@@ -617,10 +635,9 @@
           </a:lstStyle>
           <a:p>
             <a:r>
-              <a:rPr lang="en-US" smtClean="0"/>
+              <a:rPr lang="en-US"/>
               <a:t>Click to edit Master subtitle style</a:t>
             </a:r>
-            <a:endParaRPr lang="en-US"/>
           </a:p>
         </p:txBody>
       </p:sp>
@@ -641,7 +658,7 @@
           <a:p>
             <a:fld id="{78C97017-6FC3-485B-9764-EAC9E56C1D49}" type="datetimeFigureOut">
               <a:rPr lang="en-US" smtClean="0"/>
-              <a:t>10/16/2016</a:t>
+              <a:t>10/22/2017</a:t>
             </a:fld>
             <a:endParaRPr lang="en-US"/>
           </a:p>
@@ -735,10 +752,9 @@
           <a:lstStyle/>
           <a:p>
             <a:r>
-              <a:rPr lang="en-US" smtClean="0"/>
+              <a:rPr lang="en-US"/>
               <a:t>Click to edit Master title style</a:t>
             </a:r>
-            <a:endParaRPr lang="en-US"/>
           </a:p>
         </p:txBody>
       </p:sp>
@@ -759,38 +775,37 @@
           <a:p>
             <a:pPr lvl="0"/>
             <a:r>
-              <a:rPr lang="en-US" smtClean="0"/>
+              <a:rPr lang="en-US"/>
               <a:t>Click to edit Master text styles</a:t>
             </a:r>
           </a:p>
           <a:p>
             <a:pPr lvl="1"/>
             <a:r>
-              <a:rPr lang="en-US" smtClean="0"/>
+              <a:rPr lang="en-US"/>
               <a:t>Second level</a:t>
             </a:r>
           </a:p>
           <a:p>
             <a:pPr lvl="2"/>
             <a:r>
-              <a:rPr lang="en-US" smtClean="0"/>
+              <a:rPr lang="en-US"/>
               <a:t>Third level</a:t>
             </a:r>
           </a:p>
           <a:p>
             <a:pPr lvl="3"/>
             <a:r>
-              <a:rPr lang="en-US" smtClean="0"/>
+              <a:rPr lang="en-US"/>
               <a:t>Fourth level</a:t>
             </a:r>
           </a:p>
           <a:p>
             <a:pPr lvl="4"/>
             <a:r>
-              <a:rPr lang="en-US" smtClean="0"/>
+              <a:rPr lang="en-US"/>
               <a:t>Fifth level</a:t>
             </a:r>
-            <a:endParaRPr lang="en-US"/>
           </a:p>
         </p:txBody>
       </p:sp>
@@ -811,7 +826,7 @@
           <a:p>
             <a:fld id="{78C97017-6FC3-485B-9764-EAC9E56C1D49}" type="datetimeFigureOut">
               <a:rPr lang="en-US" smtClean="0"/>
-              <a:t>10/16/2016</a:t>
+              <a:t>10/22/2017</a:t>
             </a:fld>
             <a:endParaRPr lang="en-US"/>
           </a:p>
@@ -910,10 +925,9 @@
           <a:lstStyle/>
           <a:p>
             <a:r>
-              <a:rPr lang="en-US" smtClean="0"/>
+              <a:rPr lang="en-US"/>
               <a:t>Click to edit Master title style</a:t>
             </a:r>
-            <a:endParaRPr lang="en-US"/>
           </a:p>
         </p:txBody>
       </p:sp>
@@ -939,38 +953,37 @@
           <a:p>
             <a:pPr lvl="0"/>
             <a:r>
-              <a:rPr lang="en-US" smtClean="0"/>
+              <a:rPr lang="en-US"/>
               <a:t>Click to edit Master text styles</a:t>
             </a:r>
           </a:p>
           <a:p>
             <a:pPr lvl="1"/>
             <a:r>
-              <a:rPr lang="en-US" smtClean="0"/>
+              <a:rPr lang="en-US"/>
               <a:t>Second level</a:t>
             </a:r>
           </a:p>
           <a:p>
             <a:pPr lvl="2"/>
             <a:r>
-              <a:rPr lang="en-US" smtClean="0"/>
+              <a:rPr lang="en-US"/>
               <a:t>Third level</a:t>
             </a:r>
           </a:p>
           <a:p>
             <a:pPr lvl="3"/>
             <a:r>
-              <a:rPr lang="en-US" smtClean="0"/>
+              <a:rPr lang="en-US"/>
               <a:t>Fourth level</a:t>
             </a:r>
           </a:p>
           <a:p>
             <a:pPr lvl="4"/>
             <a:r>
-              <a:rPr lang="en-US" smtClean="0"/>
+              <a:rPr lang="en-US"/>
               <a:t>Fifth level</a:t>
             </a:r>
-            <a:endParaRPr lang="en-US"/>
           </a:p>
         </p:txBody>
       </p:sp>
@@ -991,7 +1004,7 @@
           <a:p>
             <a:fld id="{78C97017-6FC3-485B-9764-EAC9E56C1D49}" type="datetimeFigureOut">
               <a:rPr lang="en-US" smtClean="0"/>
-              <a:t>10/16/2016</a:t>
+              <a:t>10/22/2017</a:t>
             </a:fld>
             <a:endParaRPr lang="en-US"/>
           </a:p>
@@ -1085,10 +1098,9 @@
           <a:lstStyle/>
           <a:p>
             <a:r>
-              <a:rPr lang="en-US" smtClean="0"/>
+              <a:rPr lang="en-US"/>
               <a:t>Click to edit Master title style</a:t>
             </a:r>
-            <a:endParaRPr lang="en-US"/>
           </a:p>
         </p:txBody>
       </p:sp>
@@ -1109,38 +1121,37 @@
           <a:p>
             <a:pPr lvl="0"/>
             <a:r>
-              <a:rPr lang="en-US" smtClean="0"/>
+              <a:rPr lang="en-US"/>
               <a:t>Click to edit Master text styles</a:t>
             </a:r>
           </a:p>
           <a:p>
             <a:pPr lvl="1"/>
             <a:r>
-              <a:rPr lang="en-US" smtClean="0"/>
+              <a:rPr lang="en-US"/>
               <a:t>Second level</a:t>
             </a:r>
           </a:p>
           <a:p>
             <a:pPr lvl="2"/>
             <a:r>
-              <a:rPr lang="en-US" smtClean="0"/>
+              <a:rPr lang="en-US"/>
               <a:t>Third level</a:t>
             </a:r>
           </a:p>
           <a:p>
             <a:pPr lvl="3"/>
             <a:r>
-              <a:rPr lang="en-US" smtClean="0"/>
+              <a:rPr lang="en-US"/>
               <a:t>Fourth level</a:t>
             </a:r>
           </a:p>
           <a:p>
             <a:pPr lvl="4"/>
             <a:r>
-              <a:rPr lang="en-US" smtClean="0"/>
+              <a:rPr lang="en-US"/>
               <a:t>Fifth level</a:t>
             </a:r>
-            <a:endParaRPr lang="en-US"/>
           </a:p>
         </p:txBody>
       </p:sp>
@@ -1161,7 +1172,7 @@
           <a:p>
             <a:fld id="{78C97017-6FC3-485B-9764-EAC9E56C1D49}" type="datetimeFigureOut">
               <a:rPr lang="en-US" smtClean="0"/>
-              <a:t>10/16/2016</a:t>
+              <a:t>10/22/2017</a:t>
             </a:fld>
             <a:endParaRPr lang="en-US"/>
           </a:p>
@@ -1264,10 +1275,9 @@
           </a:lstStyle>
           <a:p>
             <a:r>
-              <a:rPr lang="en-US" smtClean="0"/>
+              <a:rPr lang="en-US"/>
               <a:t>Click to edit Master title style</a:t>
             </a:r>
-            <a:endParaRPr lang="en-US"/>
           </a:p>
         </p:txBody>
       </p:sp>
@@ -1384,7 +1394,7 @@
           <a:p>
             <a:pPr lvl="0"/>
             <a:r>
-              <a:rPr lang="en-US" smtClean="0"/>
+              <a:rPr lang="en-US"/>
               <a:t>Click to edit Master text styles</a:t>
             </a:r>
           </a:p>
@@ -1407,7 +1417,7 @@
           <a:p>
             <a:fld id="{78C97017-6FC3-485B-9764-EAC9E56C1D49}" type="datetimeFigureOut">
               <a:rPr lang="en-US" smtClean="0"/>
-              <a:t>10/16/2016</a:t>
+              <a:t>10/22/2017</a:t>
             </a:fld>
             <a:endParaRPr lang="en-US"/>
           </a:p>
@@ -1501,10 +1511,9 @@
           <a:lstStyle/>
           <a:p>
             <a:r>
-              <a:rPr lang="en-US" smtClean="0"/>
+              <a:rPr lang="en-US"/>
               <a:t>Click to edit Master title style</a:t>
             </a:r>
-            <a:endParaRPr lang="en-US"/>
           </a:p>
         </p:txBody>
       </p:sp>
@@ -1558,38 +1567,37 @@
           <a:p>
             <a:pPr lvl="0"/>
             <a:r>
-              <a:rPr lang="en-US" smtClean="0"/>
+              <a:rPr lang="en-US"/>
               <a:t>Click to edit Master text styles</a:t>
             </a:r>
           </a:p>
           <a:p>
             <a:pPr lvl="1"/>
             <a:r>
-              <a:rPr lang="en-US" smtClean="0"/>
+              <a:rPr lang="en-US"/>
               <a:t>Second level</a:t>
             </a:r>
           </a:p>
           <a:p>
             <a:pPr lvl="2"/>
             <a:r>
-              <a:rPr lang="en-US" smtClean="0"/>
+              <a:rPr lang="en-US"/>
               <a:t>Third level</a:t>
             </a:r>
           </a:p>
           <a:p>
             <a:pPr lvl="3"/>
             <a:r>
-              <a:rPr lang="en-US" smtClean="0"/>
+              <a:rPr lang="en-US"/>
               <a:t>Fourth level</a:t>
             </a:r>
           </a:p>
           <a:p>
             <a:pPr lvl="4"/>
             <a:r>
-              <a:rPr lang="en-US" smtClean="0"/>
+              <a:rPr lang="en-US"/>
               <a:t>Fifth level</a:t>
             </a:r>
-            <a:endParaRPr lang="en-US"/>
           </a:p>
         </p:txBody>
       </p:sp>
@@ -1643,38 +1651,37 @@
           <a:p>
             <a:pPr lvl="0"/>
             <a:r>
-              <a:rPr lang="en-US" smtClean="0"/>
+              <a:rPr lang="en-US"/>
               <a:t>Click to edit Master text styles</a:t>
             </a:r>
           </a:p>
           <a:p>
             <a:pPr lvl="1"/>
             <a:r>
-              <a:rPr lang="en-US" smtClean="0"/>
+              <a:rPr lang="en-US"/>
               <a:t>Second level</a:t>
             </a:r>
           </a:p>
           <a:p>
             <a:pPr lvl="2"/>
             <a:r>
-              <a:rPr lang="en-US" smtClean="0"/>
+              <a:rPr lang="en-US"/>
               <a:t>Third level</a:t>
             </a:r>
           </a:p>
           <a:p>
             <a:pPr lvl="3"/>
             <a:r>
-              <a:rPr lang="en-US" smtClean="0"/>
+              <a:rPr lang="en-US"/>
               <a:t>Fourth level</a:t>
             </a:r>
           </a:p>
           <a:p>
             <a:pPr lvl="4"/>
             <a:r>
-              <a:rPr lang="en-US" smtClean="0"/>
+              <a:rPr lang="en-US"/>
               <a:t>Fifth level</a:t>
             </a:r>
-            <a:endParaRPr lang="en-US"/>
           </a:p>
         </p:txBody>
       </p:sp>
@@ -1695,7 +1702,7 @@
           <a:p>
             <a:fld id="{78C97017-6FC3-485B-9764-EAC9E56C1D49}" type="datetimeFigureOut">
               <a:rPr lang="en-US" smtClean="0"/>
-              <a:t>10/16/2016</a:t>
+              <a:t>10/22/2017</a:t>
             </a:fld>
             <a:endParaRPr lang="en-US"/>
           </a:p>
@@ -1793,10 +1800,9 @@
           </a:lstStyle>
           <a:p>
             <a:r>
-              <a:rPr lang="en-US" smtClean="0"/>
+              <a:rPr lang="en-US"/>
               <a:t>Click to edit Master title style</a:t>
             </a:r>
-            <a:endParaRPr lang="en-US"/>
           </a:p>
         </p:txBody>
       </p:sp>
@@ -1859,7 +1865,7 @@
           <a:p>
             <a:pPr lvl="0"/>
             <a:r>
-              <a:rPr lang="en-US" smtClean="0"/>
+              <a:rPr lang="en-US"/>
               <a:t>Click to edit Master text styles</a:t>
             </a:r>
           </a:p>
@@ -1915,38 +1921,37 @@
           <a:p>
             <a:pPr lvl="0"/>
             <a:r>
-              <a:rPr lang="en-US" smtClean="0"/>
+              <a:rPr lang="en-US"/>
               <a:t>Click to edit Master text styles</a:t>
             </a:r>
           </a:p>
           <a:p>
             <a:pPr lvl="1"/>
             <a:r>
-              <a:rPr lang="en-US" smtClean="0"/>
+              <a:rPr lang="en-US"/>
               <a:t>Second level</a:t>
             </a:r>
           </a:p>
           <a:p>
             <a:pPr lvl="2"/>
             <a:r>
-              <a:rPr lang="en-US" smtClean="0"/>
+              <a:rPr lang="en-US"/>
               <a:t>Third level</a:t>
             </a:r>
           </a:p>
           <a:p>
             <a:pPr lvl="3"/>
             <a:r>
-              <a:rPr lang="en-US" smtClean="0"/>
+              <a:rPr lang="en-US"/>
               <a:t>Fourth level</a:t>
             </a:r>
           </a:p>
           <a:p>
             <a:pPr lvl="4"/>
             <a:r>
-              <a:rPr lang="en-US" smtClean="0"/>
+              <a:rPr lang="en-US"/>
               <a:t>Fifth level</a:t>
             </a:r>
-            <a:endParaRPr lang="en-US"/>
           </a:p>
         </p:txBody>
       </p:sp>
@@ -2009,7 +2014,7 @@
           <a:p>
             <a:pPr lvl="0"/>
             <a:r>
-              <a:rPr lang="en-US" smtClean="0"/>
+              <a:rPr lang="en-US"/>
               <a:t>Click to edit Master text styles</a:t>
             </a:r>
           </a:p>
@@ -2065,38 +2070,37 @@
           <a:p>
             <a:pPr lvl="0"/>
             <a:r>
-              <a:rPr lang="en-US" smtClean="0"/>
+              <a:rPr lang="en-US"/>
               <a:t>Click to edit Master text styles</a:t>
             </a:r>
           </a:p>
           <a:p>
             <a:pPr lvl="1"/>
             <a:r>
-              <a:rPr lang="en-US" smtClean="0"/>
+              <a:rPr lang="en-US"/>
               <a:t>Second level</a:t>
             </a:r>
           </a:p>
           <a:p>
             <a:pPr lvl="2"/>
             <a:r>
-              <a:rPr lang="en-US" smtClean="0"/>
+              <a:rPr lang="en-US"/>
               <a:t>Third level</a:t>
             </a:r>
           </a:p>
           <a:p>
             <a:pPr lvl="3"/>
             <a:r>
-              <a:rPr lang="en-US" smtClean="0"/>
+              <a:rPr lang="en-US"/>
               <a:t>Fourth level</a:t>
             </a:r>
           </a:p>
           <a:p>
             <a:pPr lvl="4"/>
             <a:r>
-              <a:rPr lang="en-US" smtClean="0"/>
+              <a:rPr lang="en-US"/>
               <a:t>Fifth level</a:t>
             </a:r>
-            <a:endParaRPr lang="en-US"/>
           </a:p>
         </p:txBody>
       </p:sp>
@@ -2117,7 +2121,7 @@
           <a:p>
             <a:fld id="{78C97017-6FC3-485B-9764-EAC9E56C1D49}" type="datetimeFigureOut">
               <a:rPr lang="en-US" smtClean="0"/>
-              <a:t>10/16/2016</a:t>
+              <a:t>10/22/2017</a:t>
             </a:fld>
             <a:endParaRPr lang="en-US"/>
           </a:p>
@@ -2211,10 +2215,9 @@
           <a:lstStyle/>
           <a:p>
             <a:r>
-              <a:rPr lang="en-US" smtClean="0"/>
+              <a:rPr lang="en-US"/>
               <a:t>Click to edit Master title style</a:t>
             </a:r>
-            <a:endParaRPr lang="en-US"/>
           </a:p>
         </p:txBody>
       </p:sp>
@@ -2235,7 +2238,7 @@
           <a:p>
             <a:fld id="{78C97017-6FC3-485B-9764-EAC9E56C1D49}" type="datetimeFigureOut">
               <a:rPr lang="en-US" smtClean="0"/>
-              <a:t>10/16/2016</a:t>
+              <a:t>10/22/2017</a:t>
             </a:fld>
             <a:endParaRPr lang="en-US"/>
           </a:p>
@@ -2330,7 +2333,7 @@
           <a:p>
             <a:fld id="{78C97017-6FC3-485B-9764-EAC9E56C1D49}" type="datetimeFigureOut">
               <a:rPr lang="en-US" smtClean="0"/>
-              <a:t>10/16/2016</a:t>
+              <a:t>10/22/2017</a:t>
             </a:fld>
             <a:endParaRPr lang="en-US"/>
           </a:p>
@@ -2433,10 +2436,9 @@
           </a:lstStyle>
           <a:p>
             <a:r>
-              <a:rPr lang="en-US" smtClean="0"/>
+              <a:rPr lang="en-US"/>
               <a:t>Click to edit Master title style</a:t>
             </a:r>
-            <a:endParaRPr lang="en-US"/>
           </a:p>
         </p:txBody>
       </p:sp>
@@ -2490,38 +2492,37 @@
           <a:p>
             <a:pPr lvl="0"/>
             <a:r>
-              <a:rPr lang="en-US" smtClean="0"/>
+              <a:rPr lang="en-US"/>
               <a:t>Click to edit Master text styles</a:t>
             </a:r>
           </a:p>
           <a:p>
             <a:pPr lvl="1"/>
             <a:r>
-              <a:rPr lang="en-US" smtClean="0"/>
+              <a:rPr lang="en-US"/>
               <a:t>Second level</a:t>
             </a:r>
           </a:p>
           <a:p>
             <a:pPr lvl="2"/>
             <a:r>
-              <a:rPr lang="en-US" smtClean="0"/>
+              <a:rPr lang="en-US"/>
               <a:t>Third level</a:t>
             </a:r>
           </a:p>
           <a:p>
             <a:pPr lvl="3"/>
             <a:r>
-              <a:rPr lang="en-US" smtClean="0"/>
+              <a:rPr lang="en-US"/>
               <a:t>Fourth level</a:t>
             </a:r>
           </a:p>
           <a:p>
             <a:pPr lvl="4"/>
             <a:r>
-              <a:rPr lang="en-US" smtClean="0"/>
+              <a:rPr lang="en-US"/>
               <a:t>Fifth level</a:t>
             </a:r>
-            <a:endParaRPr lang="en-US"/>
           </a:p>
         </p:txBody>
       </p:sp>
@@ -2584,7 +2585,7 @@
           <a:p>
             <a:pPr lvl="0"/>
             <a:r>
-              <a:rPr lang="en-US" smtClean="0"/>
+              <a:rPr lang="en-US"/>
               <a:t>Click to edit Master text styles</a:t>
             </a:r>
           </a:p>
@@ -2607,7 +2608,7 @@
           <a:p>
             <a:fld id="{78C97017-6FC3-485B-9764-EAC9E56C1D49}" type="datetimeFigureOut">
               <a:rPr lang="en-US" smtClean="0"/>
-              <a:t>10/16/2016</a:t>
+              <a:t>10/22/2017</a:t>
             </a:fld>
             <a:endParaRPr lang="en-US"/>
           </a:p>
@@ -2710,10 +2711,9 @@
           </a:lstStyle>
           <a:p>
             <a:r>
-              <a:rPr lang="en-US" smtClean="0"/>
+              <a:rPr lang="en-US"/>
               <a:t>Click to edit Master title style</a:t>
             </a:r>
-            <a:endParaRPr lang="en-US"/>
           </a:p>
         </p:txBody>
       </p:sp>
@@ -2837,7 +2837,7 @@
           <a:p>
             <a:pPr lvl="0"/>
             <a:r>
-              <a:rPr lang="en-US" smtClean="0"/>
+              <a:rPr lang="en-US"/>
               <a:t>Click to edit Master text styles</a:t>
             </a:r>
           </a:p>
@@ -2860,7 +2860,7 @@
           <a:p>
             <a:fld id="{78C97017-6FC3-485B-9764-EAC9E56C1D49}" type="datetimeFigureOut">
               <a:rPr lang="en-US" smtClean="0"/>
-              <a:t>10/16/2016</a:t>
+              <a:t>10/22/2017</a:t>
             </a:fld>
             <a:endParaRPr lang="en-US"/>
           </a:p>
@@ -2969,10 +2969,9 @@
           <a:lstStyle/>
           <a:p>
             <a:r>
-              <a:rPr lang="en-US" smtClean="0"/>
+              <a:rPr lang="en-US"/>
               <a:t>Click to edit Master title style</a:t>
             </a:r>
-            <a:endParaRPr lang="en-US"/>
           </a:p>
         </p:txBody>
       </p:sp>
@@ -3003,38 +3002,37 @@
           <a:p>
             <a:pPr lvl="0"/>
             <a:r>
-              <a:rPr lang="en-US" smtClean="0"/>
+              <a:rPr lang="en-US"/>
               <a:t>Click to edit Master text styles</a:t>
             </a:r>
           </a:p>
           <a:p>
             <a:pPr lvl="1"/>
             <a:r>
-              <a:rPr lang="en-US" smtClean="0"/>
+              <a:rPr lang="en-US"/>
               <a:t>Second level</a:t>
             </a:r>
           </a:p>
           <a:p>
             <a:pPr lvl="2"/>
             <a:r>
-              <a:rPr lang="en-US" smtClean="0"/>
+              <a:rPr lang="en-US"/>
               <a:t>Third level</a:t>
             </a:r>
           </a:p>
           <a:p>
             <a:pPr lvl="3"/>
             <a:r>
-              <a:rPr lang="en-US" smtClean="0"/>
+              <a:rPr lang="en-US"/>
               <a:t>Fourth level</a:t>
             </a:r>
           </a:p>
           <a:p>
             <a:pPr lvl="4"/>
             <a:r>
-              <a:rPr lang="en-US" smtClean="0"/>
+              <a:rPr lang="en-US"/>
               <a:t>Fifth level</a:t>
             </a:r>
-            <a:endParaRPr lang="en-US"/>
           </a:p>
         </p:txBody>
       </p:sp>
@@ -3073,7 +3071,7 @@
           <a:p>
             <a:fld id="{78C97017-6FC3-485B-9764-EAC9E56C1D49}" type="datetimeFigureOut">
               <a:rPr lang="en-US" smtClean="0"/>
-              <a:t>10/16/2016</a:t>
+              <a:t>10/22/2017</a:t>
             </a:fld>
             <a:endParaRPr lang="en-US"/>
           </a:p>
@@ -3457,7 +3455,7 @@
         <p:spPr>
           <a:xfrm>
             <a:off x="1119865" y="2086382"/>
-            <a:ext cx="7871735" cy="1723618"/>
+            <a:ext cx="7871735" cy="2561818"/>
           </a:xfrm>
           <a:prstGeom prst="roundRect">
             <a:avLst>
@@ -3494,7 +3492,7 @@
           <a:lstStyle/>
           <a:p>
             <a:r>
-              <a:rPr lang="en-US" sz="1200" b="1" dirty="0" smtClean="0">
+              <a:rPr lang="en-US" sz="1200" b="1" dirty="0">
                 <a:solidFill>
                   <a:schemeClr val="accent6">
                     <a:lumMod val="75000"/>
@@ -3521,7 +3519,7 @@
         </p:nvSpPr>
         <p:spPr>
           <a:xfrm>
-            <a:off x="2877180" y="3158440"/>
+            <a:off x="2877180" y="3195384"/>
             <a:ext cx="1323049" cy="346760"/>
           </a:xfrm>
           <a:prstGeom prst="rect">
@@ -3561,7 +3559,7 @@
           <a:p>
             <a:pPr algn="ctr"/>
             <a:r>
-              <a:rPr lang="en-US" sz="1050" dirty="0" smtClean="0">
+              <a:rPr lang="en-US" sz="1050" dirty="0">
                 <a:solidFill>
                   <a:schemeClr val="bg1"/>
                 </a:solidFill>
@@ -3569,14 +3567,14 @@
               <a:t>&lt;&lt;interface&gt;&gt;</a:t>
             </a:r>
             <a:br>
-              <a:rPr lang="en-US" sz="1050" dirty="0" smtClean="0">
+              <a:rPr lang="en-US" sz="1050" dirty="0">
                 <a:solidFill>
                   <a:schemeClr val="bg1"/>
                 </a:solidFill>
               </a:rPr>
             </a:br>
             <a:r>
-              <a:rPr lang="en-US" sz="1050" dirty="0" err="1" smtClean="0">
+              <a:rPr lang="en-US" sz="1050" dirty="0" err="1">
                 <a:solidFill>
                   <a:schemeClr val="bg1"/>
                 </a:solidFill>
@@ -3599,8 +3597,8 @@
         </p:nvSpPr>
         <p:spPr>
           <a:xfrm rot="16200000">
-            <a:off x="1683963" y="2868687"/>
-            <a:ext cx="1093635" cy="346760"/>
+            <a:off x="1244270" y="3345324"/>
+            <a:ext cx="1963606" cy="337343"/>
           </a:xfrm>
           <a:prstGeom prst="rect">
             <a:avLst/>
@@ -3639,7 +3637,7 @@
           <a:p>
             <a:pPr algn="ctr"/>
             <a:r>
-              <a:rPr lang="en-US" sz="1050" dirty="0" err="1" smtClean="0">
+              <a:rPr lang="en-US" sz="1050" dirty="0" err="1">
                 <a:solidFill>
                   <a:schemeClr val="bg1"/>
                 </a:solidFill>
@@ -3662,8 +3660,8 @@
         </p:nvSpPr>
         <p:spPr>
           <a:xfrm rot="16200000">
-            <a:off x="956202" y="2861202"/>
-            <a:ext cx="1093635" cy="346760"/>
+            <a:off x="497407" y="3356941"/>
+            <a:ext cx="1971091" cy="306626"/>
           </a:xfrm>
           <a:prstGeom prst="rect">
             <a:avLst/>
@@ -3713,7 +3711,7 @@
           <a:p>
             <a:pPr algn="ctr"/>
             <a:r>
-              <a:rPr lang="en-US" sz="1050" dirty="0" smtClean="0">
+              <a:rPr lang="en-US" sz="1050" dirty="0">
                 <a:solidFill>
                   <a:schemeClr val="bg1"/>
                 </a:solidFill>
@@ -3736,7 +3734,7 @@
         </p:nvSpPr>
         <p:spPr>
           <a:xfrm rot="16200000">
-            <a:off x="1626910" y="2952291"/>
+            <a:off x="1626910" y="3434586"/>
             <a:ext cx="270504" cy="175523"/>
           </a:xfrm>
           <a:prstGeom prst="triangle">
@@ -3794,7 +3792,7 @@
         </p:nvCxnSpPr>
         <p:spPr>
           <a:xfrm>
-            <a:off x="2656370" y="3326536"/>
+            <a:off x="2656370" y="3363480"/>
             <a:ext cx="220810" cy="5284"/>
           </a:xfrm>
           <a:prstGeom prst="straightConnector1">
@@ -3834,7 +3832,7 @@
         </p:nvCxnSpPr>
         <p:spPr>
           <a:xfrm>
-            <a:off x="910091" y="3040053"/>
+            <a:off x="910091" y="3542144"/>
             <a:ext cx="419548" cy="2860"/>
           </a:xfrm>
           <a:prstGeom prst="bentConnector3">
@@ -3879,7 +3877,7 @@
         </p:nvCxnSpPr>
         <p:spPr>
           <a:xfrm flipV="1">
-            <a:off x="1849924" y="3040052"/>
+            <a:off x="1849924" y="3522347"/>
             <a:ext cx="216105" cy="1"/>
           </a:xfrm>
           <a:prstGeom prst="line">
@@ -3920,7 +3918,7 @@
         </p:nvSpPr>
         <p:spPr>
           <a:xfrm>
-            <a:off x="2420322" y="3239846"/>
+            <a:off x="2420322" y="3276790"/>
             <a:ext cx="236048" cy="173380"/>
           </a:xfrm>
           <a:prstGeom prst="flowChartDecision">
@@ -3974,7 +3972,7 @@
         </p:nvCxnSpPr>
         <p:spPr>
           <a:xfrm flipV="1">
-            <a:off x="4398041" y="3331820"/>
+            <a:off x="4398041" y="3368764"/>
             <a:ext cx="223324" cy="1"/>
           </a:xfrm>
           <a:prstGeom prst="bentConnector3">
@@ -4017,7 +4015,7 @@
         </p:nvSpPr>
         <p:spPr>
           <a:xfrm rot="5400000" flipV="1">
-            <a:off x="4175027" y="3244059"/>
+            <a:off x="4175027" y="3281003"/>
             <a:ext cx="270504" cy="175523"/>
           </a:xfrm>
           <a:prstGeom prst="triangle">
@@ -4075,7 +4073,7 @@
         </p:nvCxnSpPr>
         <p:spPr>
           <a:xfrm>
-            <a:off x="5791200" y="3331820"/>
+            <a:off x="5791200" y="3368764"/>
             <a:ext cx="228600" cy="1970"/>
           </a:xfrm>
           <a:prstGeom prst="bentConnector3">
@@ -4118,7 +4116,7 @@
         </p:nvSpPr>
         <p:spPr>
           <a:xfrm>
-            <a:off x="4621365" y="3158440"/>
+            <a:off x="4621365" y="3195384"/>
             <a:ext cx="1169835" cy="346760"/>
           </a:xfrm>
           <a:prstGeom prst="rect">
@@ -4147,7 +4145,7 @@
           <a:p>
             <a:pPr algn="ctr"/>
             <a:r>
-              <a:rPr lang="en-US" sz="1050" b="1" dirty="0" err="1" smtClean="0">
+              <a:rPr lang="en-US" sz="1050" b="1" dirty="0" err="1">
                 <a:solidFill>
                   <a:schemeClr val="accent6">
                     <a:lumMod val="75000"/>
@@ -4156,18 +4154,8 @@
               </a:rPr>
               <a:t>XmlAddressBook</a:t>
             </a:r>
-            <a:r>
-              <a:rPr lang="en-US" sz="1050" b="1" dirty="0" smtClean="0">
-                <a:solidFill>
-                  <a:schemeClr val="accent6">
-                    <a:lumMod val="75000"/>
-                  </a:schemeClr>
-                </a:solidFill>
-              </a:rPr>
-              <a:t/>
-            </a:r>
             <a:br>
-              <a:rPr lang="en-US" sz="1050" b="1" dirty="0" smtClean="0">
+              <a:rPr lang="en-US" sz="1050" b="1" dirty="0">
                 <a:solidFill>
                   <a:schemeClr val="accent6">
                     <a:lumMod val="75000"/>
@@ -4176,7 +4164,7 @@
               </a:rPr>
             </a:br>
             <a:r>
-              <a:rPr lang="en-US" sz="1050" b="1" dirty="0" smtClean="0">
+              <a:rPr lang="en-US" sz="1050" b="1" dirty="0">
                 <a:solidFill>
                   <a:schemeClr val="accent6">
                     <a:lumMod val="75000"/>
@@ -4203,7 +4191,7 @@
         </p:nvSpPr>
         <p:spPr>
           <a:xfrm>
-            <a:off x="2873943" y="2558040"/>
+            <a:off x="2873943" y="2594984"/>
             <a:ext cx="1323049" cy="346760"/>
           </a:xfrm>
           <a:prstGeom prst="rect">
@@ -4243,7 +4231,7 @@
           <a:p>
             <a:pPr algn="ctr"/>
             <a:r>
-              <a:rPr lang="en-US" sz="1050" dirty="0" smtClean="0">
+              <a:rPr lang="en-US" sz="1050" dirty="0">
                 <a:solidFill>
                   <a:schemeClr val="bg1"/>
                 </a:solidFill>
@@ -4251,14 +4239,14 @@
               <a:t>&lt;&lt;interface&gt;&gt;</a:t>
             </a:r>
             <a:br>
-              <a:rPr lang="en-US" sz="1050" dirty="0" smtClean="0">
+              <a:rPr lang="en-US" sz="1050" dirty="0">
                 <a:solidFill>
                   <a:schemeClr val="bg1"/>
                 </a:solidFill>
               </a:rPr>
             </a:br>
             <a:r>
-              <a:rPr lang="en-US" sz="1050" dirty="0" err="1" smtClean="0">
+              <a:rPr lang="en-US" sz="1050" dirty="0" err="1">
                 <a:solidFill>
                   <a:schemeClr val="bg1"/>
                 </a:solidFill>
@@ -4284,7 +4272,7 @@
         </p:nvCxnSpPr>
         <p:spPr>
           <a:xfrm>
-            <a:off x="2653133" y="2726136"/>
+            <a:off x="2653133" y="2763080"/>
             <a:ext cx="220810" cy="5284"/>
           </a:xfrm>
           <a:prstGeom prst="straightConnector1">
@@ -4324,7 +4312,7 @@
         </p:nvSpPr>
         <p:spPr>
           <a:xfrm>
-            <a:off x="2417085" y="2639446"/>
+            <a:off x="2417085" y="2676390"/>
             <a:ext cx="236048" cy="173380"/>
           </a:xfrm>
           <a:prstGeom prst="flowChartDecision">
@@ -4378,7 +4366,7 @@
         </p:nvCxnSpPr>
         <p:spPr>
           <a:xfrm flipV="1">
-            <a:off x="4394804" y="2731420"/>
+            <a:off x="4394804" y="2768364"/>
             <a:ext cx="223324" cy="1"/>
           </a:xfrm>
           <a:prstGeom prst="bentConnector3">
@@ -4421,7 +4409,7 @@
         </p:nvSpPr>
         <p:spPr>
           <a:xfrm rot="5400000" flipV="1">
-            <a:off x="4171790" y="2643659"/>
+            <a:off x="4171790" y="2680603"/>
             <a:ext cx="270504" cy="175523"/>
           </a:xfrm>
           <a:prstGeom prst="triangle">
@@ -4476,7 +4464,7 @@
         </p:nvSpPr>
         <p:spPr>
           <a:xfrm>
-            <a:off x="4618128" y="2558040"/>
+            <a:off x="4618128" y="2594984"/>
             <a:ext cx="1093635" cy="346760"/>
           </a:xfrm>
           <a:prstGeom prst="rect">
@@ -4516,30 +4504,22 @@
           <a:p>
             <a:pPr algn="ctr"/>
             <a:r>
-              <a:rPr lang="en-US" sz="1050" dirty="0" err="1" smtClean="0">
+              <a:rPr lang="en-US" sz="1050" dirty="0" err="1">
                 <a:solidFill>
                   <a:schemeClr val="bg1"/>
                 </a:solidFill>
               </a:rPr>
               <a:t>JsonUserPrefs</a:t>
             </a:r>
-            <a:r>
-              <a:rPr lang="en-US" sz="1050" dirty="0" smtClean="0">
-                <a:solidFill>
-                  <a:schemeClr val="bg1"/>
-                </a:solidFill>
-              </a:rPr>
-              <a:t/>
-            </a:r>
             <a:br>
-              <a:rPr lang="en-US" sz="1050" dirty="0" smtClean="0">
+              <a:rPr lang="en-US" sz="1050" dirty="0">
                 <a:solidFill>
                   <a:schemeClr val="bg1"/>
                 </a:solidFill>
               </a:rPr>
             </a:br>
             <a:r>
-              <a:rPr lang="en-US" sz="1050" dirty="0" smtClean="0">
+              <a:rPr lang="en-US" sz="1050" dirty="0">
                 <a:solidFill>
                   <a:schemeClr val="bg1"/>
                 </a:solidFill>
@@ -4562,7 +4542,7 @@
         </p:nvSpPr>
         <p:spPr>
           <a:xfrm>
-            <a:off x="6019800" y="3160410"/>
+            <a:off x="6019800" y="3197354"/>
             <a:ext cx="1200707" cy="346760"/>
           </a:xfrm>
           <a:prstGeom prst="rect">
@@ -4591,7 +4571,7 @@
           <a:p>
             <a:pPr algn="ctr"/>
             <a:r>
-              <a:rPr lang="en-US" sz="1050" b="1" dirty="0" err="1" smtClean="0">
+              <a:rPr lang="en-US" sz="1050" b="1" dirty="0" err="1">
                 <a:solidFill>
                   <a:schemeClr val="accent6">
                     <a:lumMod val="75000"/>
@@ -4600,18 +4580,8 @@
               </a:rPr>
               <a:t>XmlSerializable</a:t>
             </a:r>
-            <a:r>
-              <a:rPr lang="en-US" sz="1050" b="1" dirty="0" smtClean="0">
-                <a:solidFill>
-                  <a:schemeClr val="accent6">
-                    <a:lumMod val="75000"/>
-                  </a:schemeClr>
-                </a:solidFill>
-              </a:rPr>
-              <a:t/>
-            </a:r>
             <a:br>
-              <a:rPr lang="en-US" sz="1050" b="1" dirty="0" smtClean="0">
+              <a:rPr lang="en-US" sz="1050" b="1" dirty="0">
                 <a:solidFill>
                   <a:schemeClr val="accent6">
                     <a:lumMod val="75000"/>
@@ -4620,7 +4590,7 @@
               </a:rPr>
             </a:br>
             <a:r>
-              <a:rPr lang="en-US" sz="1050" b="1" dirty="0" err="1" smtClean="0">
+              <a:rPr lang="en-US" sz="1050" b="1" dirty="0" err="1">
                 <a:solidFill>
                   <a:schemeClr val="accent6">
                     <a:lumMod val="75000"/>
@@ -4643,6 +4613,7 @@
         <p:nvCxnSpPr>
           <p:cNvPr id="70" name="Elbow Connector 122"/>
           <p:cNvCxnSpPr>
+            <a:cxnSpLocks/>
             <a:stCxn id="74" idx="0"/>
             <a:endCxn id="73" idx="2"/>
           </p:cNvCxnSpPr>
@@ -4650,7 +4621,7 @@
         </p:nvCxnSpPr>
         <p:spPr>
           <a:xfrm rot="5400000" flipH="1" flipV="1">
-            <a:off x="8077993" y="2992020"/>
+            <a:off x="8077993" y="3028964"/>
             <a:ext cx="335208" cy="12700"/>
           </a:xfrm>
           <a:prstGeom prst="bentConnector3">
@@ -4688,7 +4659,7 @@
         </p:nvSpPr>
         <p:spPr>
           <a:xfrm>
-            <a:off x="7615738" y="2477656"/>
+            <a:off x="7615738" y="2514600"/>
             <a:ext cx="1259718" cy="346760"/>
           </a:xfrm>
           <a:prstGeom prst="rect">
@@ -4717,7 +4688,7 @@
           <a:p>
             <a:pPr algn="ctr"/>
             <a:r>
-              <a:rPr lang="en-US" sz="1050" b="1" dirty="0" err="1" smtClean="0">
+              <a:rPr lang="en-US" sz="1050" b="1" dirty="0" err="1">
                 <a:solidFill>
                   <a:schemeClr val="accent6">
                     <a:lumMod val="75000"/>
@@ -4744,7 +4715,7 @@
         </p:nvSpPr>
         <p:spPr>
           <a:xfrm>
-            <a:off x="7615738" y="3159624"/>
+            <a:off x="7615738" y="3196568"/>
             <a:ext cx="1259718" cy="346760"/>
           </a:xfrm>
           <a:prstGeom prst="rect">
@@ -4773,7 +4744,7 @@
           <a:p>
             <a:pPr algn="ctr"/>
             <a:r>
-              <a:rPr lang="en-US" sz="1050" b="1" dirty="0" err="1" smtClean="0">
+              <a:rPr lang="en-US" sz="1050" b="1" dirty="0" err="1">
                 <a:solidFill>
                   <a:schemeClr val="accent6">
                     <a:lumMod val="75000"/>
@@ -4796,6 +4767,7 @@
         <p:nvCxnSpPr>
           <p:cNvPr id="77" name="Elbow Connector 122"/>
           <p:cNvCxnSpPr>
+            <a:cxnSpLocks/>
             <a:stCxn id="66" idx="3"/>
             <a:endCxn id="74" idx="1"/>
           </p:cNvCxnSpPr>
@@ -4803,7 +4775,7 @@
         </p:nvCxnSpPr>
         <p:spPr>
           <a:xfrm flipV="1">
-            <a:off x="7220507" y="3333004"/>
+            <a:off x="7220507" y="3369948"/>
             <a:ext cx="395231" cy="786"/>
           </a:xfrm>
           <a:prstGeom prst="bentConnector3">
@@ -4827,6 +4799,678 @@
           </a:fillRef>
           <a:effectRef idx="1">
             <a:schemeClr val="accent6"/>
+          </a:effectRef>
+          <a:fontRef idx="minor">
+            <a:schemeClr val="dk1"/>
+          </a:fontRef>
+        </p:style>
+      </p:cxnSp>
+      <p:sp>
+        <p:nvSpPr>
+          <p:cNvPr id="27" name="Rectangle 8">
+            <a:extLst>
+              <a:ext uri="{FF2B5EF4-FFF2-40B4-BE49-F238E27FC236}">
+                <a16:creationId xmlns:a16="http://schemas.microsoft.com/office/drawing/2014/main" id="{EA7609E6-0C86-4634-94EA-9D64433FDC02}"/>
+              </a:ext>
+            </a:extLst>
+          </p:cNvPr>
+          <p:cNvSpPr/>
+          <p:nvPr/>
+        </p:nvSpPr>
+        <p:spPr>
+          <a:xfrm>
+            <a:off x="2873943" y="3825421"/>
+            <a:ext cx="1323049" cy="346760"/>
+          </a:xfrm>
+          <a:prstGeom prst="rect">
+            <a:avLst/>
+          </a:prstGeom>
+          <a:solidFill>
+            <a:schemeClr val="accent6">
+              <a:lumMod val="75000"/>
+            </a:schemeClr>
+          </a:solidFill>
+          <a:ln w="19050">
+            <a:solidFill>
+              <a:schemeClr val="accent6">
+                <a:lumMod val="75000"/>
+              </a:schemeClr>
+            </a:solidFill>
+          </a:ln>
+          <a:effectLst/>
+        </p:spPr>
+        <p:style>
+          <a:lnRef idx="1">
+            <a:schemeClr val="accent2"/>
+          </a:lnRef>
+          <a:fillRef idx="2">
+            <a:schemeClr val="accent2"/>
+          </a:fillRef>
+          <a:effectRef idx="1">
+            <a:schemeClr val="accent2"/>
+          </a:effectRef>
+          <a:fontRef idx="minor">
+            <a:schemeClr val="dk1"/>
+          </a:fontRef>
+        </p:style>
+        <p:txBody>
+          <a:bodyPr rtlCol="0" anchor="ctr"/>
+          <a:lstStyle/>
+          <a:p>
+            <a:pPr algn="ctr"/>
+            <a:r>
+              <a:rPr lang="en-US" sz="1050" dirty="0">
+                <a:solidFill>
+                  <a:schemeClr val="bg1"/>
+                </a:solidFill>
+              </a:rPr>
+              <a:t>&lt;&lt;interface&gt;&gt;</a:t>
+            </a:r>
+            <a:br>
+              <a:rPr lang="en-US" sz="1050" dirty="0">
+                <a:solidFill>
+                  <a:schemeClr val="bg1"/>
+                </a:solidFill>
+              </a:rPr>
+            </a:br>
+            <a:r>
+              <a:rPr lang="en-US" sz="1050" dirty="0" err="1">
+                <a:solidFill>
+                  <a:schemeClr val="bg1"/>
+                </a:solidFill>
+              </a:rPr>
+              <a:t>EventStorage</a:t>
+            </a:r>
+            <a:endParaRPr lang="en-SG" sz="1050" dirty="0">
+              <a:solidFill>
+                <a:schemeClr val="bg1"/>
+              </a:solidFill>
+            </a:endParaRPr>
+          </a:p>
+        </p:txBody>
+      </p:sp>
+      <p:cxnSp>
+        <p:nvCxnSpPr>
+          <p:cNvPr id="28" name="Straight Arrow Connector 27">
+            <a:extLst>
+              <a:ext uri="{FF2B5EF4-FFF2-40B4-BE49-F238E27FC236}">
+                <a16:creationId xmlns:a16="http://schemas.microsoft.com/office/drawing/2014/main" id="{1972607C-6FB4-4FED-B252-6F4F8A45A965}"/>
+              </a:ext>
+            </a:extLst>
+          </p:cNvPr>
+          <p:cNvCxnSpPr>
+            <a:stCxn id="29" idx="3"/>
+            <a:endCxn id="27" idx="1"/>
+          </p:cNvCxnSpPr>
+          <p:nvPr/>
+        </p:nvCxnSpPr>
+        <p:spPr>
+          <a:xfrm>
+            <a:off x="2653133" y="3993517"/>
+            <a:ext cx="220810" cy="5284"/>
+          </a:xfrm>
+          <a:prstGeom prst="straightConnector1">
+            <a:avLst/>
+          </a:prstGeom>
+          <a:ln w="19050">
+            <a:solidFill>
+              <a:schemeClr val="accent6">
+                <a:lumMod val="75000"/>
+              </a:schemeClr>
+            </a:solidFill>
+            <a:headEnd type="none" w="med" len="med"/>
+            <a:tailEnd type="arrow" w="med" len="med"/>
+          </a:ln>
+          <a:effectLst/>
+        </p:spPr>
+        <p:style>
+          <a:lnRef idx="1">
+            <a:schemeClr val="accent2"/>
+          </a:lnRef>
+          <a:fillRef idx="2">
+            <a:schemeClr val="accent2"/>
+          </a:fillRef>
+          <a:effectRef idx="1">
+            <a:schemeClr val="accent2"/>
+          </a:effectRef>
+          <a:fontRef idx="minor">
+            <a:schemeClr val="dk1"/>
+          </a:fontRef>
+        </p:style>
+      </p:cxnSp>
+      <p:sp>
+        <p:nvSpPr>
+          <p:cNvPr id="29" name="Flowchart: Decision 96">
+            <a:extLst>
+              <a:ext uri="{FF2B5EF4-FFF2-40B4-BE49-F238E27FC236}">
+                <a16:creationId xmlns:a16="http://schemas.microsoft.com/office/drawing/2014/main" id="{47F8A2CD-D5FD-4D46-8E38-6B8EA067B88F}"/>
+              </a:ext>
+            </a:extLst>
+          </p:cNvPr>
+          <p:cNvSpPr/>
+          <p:nvPr/>
+        </p:nvSpPr>
+        <p:spPr>
+          <a:xfrm>
+            <a:off x="2417085" y="3906827"/>
+            <a:ext cx="236048" cy="173380"/>
+          </a:xfrm>
+          <a:prstGeom prst="flowChartDecision">
+            <a:avLst/>
+          </a:prstGeom>
+          <a:noFill/>
+          <a:ln w="19050">
+            <a:solidFill>
+              <a:schemeClr val="accent6">
+                <a:lumMod val="75000"/>
+              </a:schemeClr>
+            </a:solidFill>
+          </a:ln>
+          <a:effectLst/>
+        </p:spPr>
+        <p:style>
+          <a:lnRef idx="1">
+            <a:schemeClr val="accent2"/>
+          </a:lnRef>
+          <a:fillRef idx="2">
+            <a:schemeClr val="accent2"/>
+          </a:fillRef>
+          <a:effectRef idx="1">
+            <a:schemeClr val="accent2"/>
+          </a:effectRef>
+          <a:fontRef idx="minor">
+            <a:schemeClr val="dk1"/>
+          </a:fontRef>
+        </p:style>
+        <p:txBody>
+          <a:bodyPr rtlCol="0" anchor="ctr"/>
+          <a:lstStyle/>
+          <a:p>
+            <a:pPr algn="ctr"/>
+            <a:endParaRPr lang="en-US" sz="1050">
+              <a:solidFill>
+                <a:schemeClr val="bg1"/>
+              </a:solidFill>
+            </a:endParaRPr>
+          </a:p>
+        </p:txBody>
+      </p:sp>
+      <p:sp>
+        <p:nvSpPr>
+          <p:cNvPr id="30" name="Rectangle 8">
+            <a:extLst>
+              <a:ext uri="{FF2B5EF4-FFF2-40B4-BE49-F238E27FC236}">
+                <a16:creationId xmlns:a16="http://schemas.microsoft.com/office/drawing/2014/main" id="{DF2A02FA-9763-49B8-AE8A-F7F45AAB7B00}"/>
+              </a:ext>
+            </a:extLst>
+          </p:cNvPr>
+          <p:cNvSpPr/>
+          <p:nvPr/>
+        </p:nvSpPr>
+        <p:spPr>
+          <a:xfrm>
+            <a:off x="4618128" y="3825421"/>
+            <a:ext cx="1169835" cy="346760"/>
+          </a:xfrm>
+          <a:prstGeom prst="rect">
+            <a:avLst/>
+          </a:prstGeom>
+          <a:ln w="19050"/>
+          <a:effectLst/>
+        </p:spPr>
+        <p:style>
+          <a:lnRef idx="1">
+            <a:schemeClr val="accent6"/>
+          </a:lnRef>
+          <a:fillRef idx="2">
+            <a:schemeClr val="accent6"/>
+          </a:fillRef>
+          <a:effectRef idx="1">
+            <a:schemeClr val="accent6"/>
+          </a:effectRef>
+          <a:fontRef idx="minor">
+            <a:schemeClr val="dk1"/>
+          </a:fontRef>
+        </p:style>
+        <p:txBody>
+          <a:bodyPr rtlCol="0" anchor="ctr"/>
+          <a:lstStyle/>
+          <a:p>
+            <a:pPr algn="ctr"/>
+            <a:r>
+              <a:rPr lang="en-US" sz="1050" b="1" dirty="0" err="1">
+                <a:solidFill>
+                  <a:schemeClr val="accent6">
+                    <a:lumMod val="75000"/>
+                  </a:schemeClr>
+                </a:solidFill>
+              </a:rPr>
+              <a:t>XmlEvent</a:t>
+            </a:r>
+            <a:br>
+              <a:rPr lang="en-US" sz="1050" b="1" dirty="0">
+                <a:solidFill>
+                  <a:schemeClr val="accent6">
+                    <a:lumMod val="75000"/>
+                  </a:schemeClr>
+                </a:solidFill>
+              </a:rPr>
+            </a:br>
+            <a:r>
+              <a:rPr lang="en-US" sz="1050" b="1" dirty="0">
+                <a:solidFill>
+                  <a:schemeClr val="accent6">
+                    <a:lumMod val="75000"/>
+                  </a:schemeClr>
+                </a:solidFill>
+              </a:rPr>
+              <a:t>Storage</a:t>
+            </a:r>
+            <a:endParaRPr lang="en-SG" sz="1050" b="1" dirty="0">
+              <a:solidFill>
+                <a:schemeClr val="accent6">
+                  <a:lumMod val="75000"/>
+                </a:schemeClr>
+              </a:solidFill>
+            </a:endParaRPr>
+          </a:p>
+        </p:txBody>
+      </p:sp>
+      <p:sp>
+        <p:nvSpPr>
+          <p:cNvPr id="31" name="Rectangle 8">
+            <a:extLst>
+              <a:ext uri="{FF2B5EF4-FFF2-40B4-BE49-F238E27FC236}">
+                <a16:creationId xmlns:a16="http://schemas.microsoft.com/office/drawing/2014/main" id="{161FB03B-694F-4FBA-8212-D45EF20E7E2D}"/>
+              </a:ext>
+            </a:extLst>
+          </p:cNvPr>
+          <p:cNvSpPr/>
+          <p:nvPr/>
+        </p:nvSpPr>
+        <p:spPr>
+          <a:xfrm>
+            <a:off x="6016563" y="3827391"/>
+            <a:ext cx="1200707" cy="346760"/>
+          </a:xfrm>
+          <a:prstGeom prst="rect">
+            <a:avLst/>
+          </a:prstGeom>
+          <a:ln w="19050"/>
+          <a:effectLst/>
+        </p:spPr>
+        <p:style>
+          <a:lnRef idx="1">
+            <a:schemeClr val="accent6"/>
+          </a:lnRef>
+          <a:fillRef idx="2">
+            <a:schemeClr val="accent6"/>
+          </a:fillRef>
+          <a:effectRef idx="1">
+            <a:schemeClr val="accent6"/>
+          </a:effectRef>
+          <a:fontRef idx="minor">
+            <a:schemeClr val="dk1"/>
+          </a:fontRef>
+        </p:style>
+        <p:txBody>
+          <a:bodyPr rtlCol="0" anchor="ctr"/>
+          <a:lstStyle/>
+          <a:p>
+            <a:pPr algn="ctr"/>
+            <a:r>
+              <a:rPr lang="en-US" sz="1050" b="1" dirty="0" err="1">
+                <a:solidFill>
+                  <a:schemeClr val="accent6">
+                    <a:lumMod val="75000"/>
+                  </a:schemeClr>
+                </a:solidFill>
+              </a:rPr>
+              <a:t>XmlSerializable</a:t>
+            </a:r>
+            <a:br>
+              <a:rPr lang="en-US" sz="1050" b="1" dirty="0">
+                <a:solidFill>
+                  <a:schemeClr val="accent6">
+                    <a:lumMod val="75000"/>
+                  </a:schemeClr>
+                </a:solidFill>
+              </a:rPr>
+            </a:br>
+            <a:r>
+              <a:rPr lang="en-US" sz="1050" b="1" dirty="0" err="1">
+                <a:solidFill>
+                  <a:schemeClr val="accent6">
+                    <a:lumMod val="75000"/>
+                  </a:schemeClr>
+                </a:solidFill>
+              </a:rPr>
+              <a:t>EventStorage</a:t>
+            </a:r>
+            <a:endParaRPr lang="en-SG" sz="1050" b="1" dirty="0">
+              <a:solidFill>
+                <a:schemeClr val="accent6">
+                  <a:lumMod val="75000"/>
+                </a:schemeClr>
+              </a:solidFill>
+            </a:endParaRPr>
+          </a:p>
+        </p:txBody>
+      </p:sp>
+      <p:sp>
+        <p:nvSpPr>
+          <p:cNvPr id="32" name="Isosceles Triangle 102">
+            <a:extLst>
+              <a:ext uri="{FF2B5EF4-FFF2-40B4-BE49-F238E27FC236}">
+                <a16:creationId xmlns:a16="http://schemas.microsoft.com/office/drawing/2014/main" id="{0A5A3B3C-3D85-4ED4-BB0C-FFA8A53D2F58}"/>
+              </a:ext>
+            </a:extLst>
+          </p:cNvPr>
+          <p:cNvSpPr/>
+          <p:nvPr/>
+        </p:nvSpPr>
+        <p:spPr>
+          <a:xfrm rot="5400000" flipV="1">
+            <a:off x="4143510" y="3911664"/>
+            <a:ext cx="270504" cy="175523"/>
+          </a:xfrm>
+          <a:prstGeom prst="triangle">
+            <a:avLst/>
+          </a:prstGeom>
+          <a:solidFill>
+            <a:schemeClr val="accent6">
+              <a:lumMod val="75000"/>
+            </a:schemeClr>
+          </a:solidFill>
+          <a:ln w="19050">
+            <a:solidFill>
+              <a:schemeClr val="accent6">
+                <a:lumMod val="75000"/>
+              </a:schemeClr>
+            </a:solidFill>
+          </a:ln>
+          <a:effectLst/>
+        </p:spPr>
+        <p:style>
+          <a:lnRef idx="1">
+            <a:schemeClr val="accent2"/>
+          </a:lnRef>
+          <a:fillRef idx="2">
+            <a:schemeClr val="accent2"/>
+          </a:fillRef>
+          <a:effectRef idx="1">
+            <a:schemeClr val="accent2"/>
+          </a:effectRef>
+          <a:fontRef idx="minor">
+            <a:schemeClr val="dk1"/>
+          </a:fontRef>
+        </p:style>
+        <p:txBody>
+          <a:bodyPr rtlCol="0" anchor="ctr"/>
+          <a:lstStyle/>
+          <a:p>
+            <a:pPr algn="ctr"/>
+            <a:endParaRPr lang="en-SG" sz="1050">
+              <a:solidFill>
+                <a:schemeClr val="bg1"/>
+              </a:solidFill>
+            </a:endParaRPr>
+          </a:p>
+        </p:txBody>
+      </p:sp>
+      <p:cxnSp>
+        <p:nvCxnSpPr>
+          <p:cNvPr id="33" name="Elbow Connector 122">
+            <a:extLst>
+              <a:ext uri="{FF2B5EF4-FFF2-40B4-BE49-F238E27FC236}">
+                <a16:creationId xmlns:a16="http://schemas.microsoft.com/office/drawing/2014/main" id="{9E759EAB-7EA4-4C9C-8B87-5B5F65FAD674}"/>
+              </a:ext>
+            </a:extLst>
+          </p:cNvPr>
+          <p:cNvCxnSpPr/>
+          <p:nvPr/>
+        </p:nvCxnSpPr>
+        <p:spPr>
+          <a:xfrm>
+            <a:off x="5789500" y="3979547"/>
+            <a:ext cx="228600" cy="1970"/>
+          </a:xfrm>
+          <a:prstGeom prst="bentConnector3">
+            <a:avLst>
+              <a:gd name="adj1" fmla="val 50000"/>
+            </a:avLst>
+          </a:prstGeom>
+          <a:ln w="19050">
+            <a:solidFill>
+              <a:schemeClr val="accent6">
+                <a:lumMod val="75000"/>
+              </a:schemeClr>
+            </a:solidFill>
+            <a:prstDash val="sysDot"/>
+            <a:headEnd type="none" w="med" len="med"/>
+            <a:tailEnd type="arrow" w="med" len="med"/>
+          </a:ln>
+          <a:effectLst/>
+        </p:spPr>
+        <p:style>
+          <a:lnRef idx="1">
+            <a:schemeClr val="accent2"/>
+          </a:lnRef>
+          <a:fillRef idx="2">
+            <a:schemeClr val="accent2"/>
+          </a:fillRef>
+          <a:effectRef idx="1">
+            <a:schemeClr val="accent2"/>
+          </a:effectRef>
+          <a:fontRef idx="minor">
+            <a:schemeClr val="dk1"/>
+          </a:fontRef>
+        </p:style>
+      </p:cxnSp>
+      <p:cxnSp>
+        <p:nvCxnSpPr>
+          <p:cNvPr id="34" name="Elbow Connector 122">
+            <a:extLst>
+              <a:ext uri="{FF2B5EF4-FFF2-40B4-BE49-F238E27FC236}">
+                <a16:creationId xmlns:a16="http://schemas.microsoft.com/office/drawing/2014/main" id="{2112CB64-F6EA-4D59-B9AD-6CFFECB5BF51}"/>
+              </a:ext>
+            </a:extLst>
+          </p:cNvPr>
+          <p:cNvCxnSpPr>
+            <a:cxnSpLocks/>
+            <a:endCxn id="35" idx="1"/>
+          </p:cNvCxnSpPr>
+          <p:nvPr/>
+        </p:nvCxnSpPr>
+        <p:spPr>
+          <a:xfrm flipV="1">
+            <a:off x="7188990" y="3981485"/>
+            <a:ext cx="426936" cy="32"/>
+          </a:xfrm>
+          <a:prstGeom prst="bentConnector3">
+            <a:avLst>
+              <a:gd name="adj1" fmla="val 50000"/>
+            </a:avLst>
+          </a:prstGeom>
+          <a:ln w="19050">
+            <a:prstDash val="sysDot"/>
+            <a:headEnd type="none" w="med" len="med"/>
+            <a:tailEnd type="arrow" w="med" len="med"/>
+          </a:ln>
+          <a:effectLst/>
+        </p:spPr>
+        <p:style>
+          <a:lnRef idx="1">
+            <a:schemeClr val="accent6"/>
+          </a:lnRef>
+          <a:fillRef idx="2">
+            <a:schemeClr val="accent6"/>
+          </a:fillRef>
+          <a:effectRef idx="1">
+            <a:schemeClr val="accent6"/>
+          </a:effectRef>
+          <a:fontRef idx="minor">
+            <a:schemeClr val="dk1"/>
+          </a:fontRef>
+        </p:style>
+      </p:cxnSp>
+      <p:sp>
+        <p:nvSpPr>
+          <p:cNvPr id="35" name="Rectangle 8">
+            <a:extLst>
+              <a:ext uri="{FF2B5EF4-FFF2-40B4-BE49-F238E27FC236}">
+                <a16:creationId xmlns:a16="http://schemas.microsoft.com/office/drawing/2014/main" id="{0CA0189C-F09A-4DAC-8A1D-2564D17DD331}"/>
+              </a:ext>
+            </a:extLst>
+          </p:cNvPr>
+          <p:cNvSpPr/>
+          <p:nvPr/>
+        </p:nvSpPr>
+        <p:spPr>
+          <a:xfrm>
+            <a:off x="7615926" y="3808105"/>
+            <a:ext cx="1259718" cy="346760"/>
+          </a:xfrm>
+          <a:prstGeom prst="rect">
+            <a:avLst/>
+          </a:prstGeom>
+          <a:ln w="19050"/>
+          <a:effectLst/>
+        </p:spPr>
+        <p:style>
+          <a:lnRef idx="1">
+            <a:schemeClr val="accent6"/>
+          </a:lnRef>
+          <a:fillRef idx="2">
+            <a:schemeClr val="accent6"/>
+          </a:fillRef>
+          <a:effectRef idx="1">
+            <a:schemeClr val="accent6"/>
+          </a:effectRef>
+          <a:fontRef idx="minor">
+            <a:schemeClr val="dk1"/>
+          </a:fontRef>
+        </p:style>
+        <p:txBody>
+          <a:bodyPr rtlCol="0" anchor="ctr"/>
+          <a:lstStyle/>
+          <a:p>
+            <a:pPr algn="ctr"/>
+            <a:r>
+              <a:rPr lang="en-US" sz="1050" b="1" dirty="0" err="1">
+                <a:solidFill>
+                  <a:schemeClr val="accent6">
+                    <a:lumMod val="75000"/>
+                  </a:schemeClr>
+                </a:solidFill>
+              </a:rPr>
+              <a:t>XmlAdaptedEvent</a:t>
+            </a:r>
+            <a:endParaRPr lang="en-SG" sz="1050" b="1" dirty="0">
+              <a:solidFill>
+                <a:schemeClr val="accent6">
+                  <a:lumMod val="75000"/>
+                </a:schemeClr>
+              </a:solidFill>
+            </a:endParaRPr>
+          </a:p>
+        </p:txBody>
+      </p:sp>
+      <p:cxnSp>
+        <p:nvCxnSpPr>
+          <p:cNvPr id="36" name="Elbow Connector 122">
+            <a:extLst>
+              <a:ext uri="{FF2B5EF4-FFF2-40B4-BE49-F238E27FC236}">
+                <a16:creationId xmlns:a16="http://schemas.microsoft.com/office/drawing/2014/main" id="{E5711559-BB8B-408B-8B9B-886F7997536A}"/>
+              </a:ext>
+            </a:extLst>
+          </p:cNvPr>
+          <p:cNvCxnSpPr>
+            <a:cxnSpLocks/>
+            <a:stCxn id="35" idx="0"/>
+            <a:endCxn id="74" idx="2"/>
+          </p:cNvCxnSpPr>
+          <p:nvPr/>
+        </p:nvCxnSpPr>
+        <p:spPr>
+          <a:xfrm rot="16200000" flipV="1">
+            <a:off x="8113303" y="3675623"/>
+            <a:ext cx="264777" cy="188"/>
+          </a:xfrm>
+          <a:prstGeom prst="bentConnector3">
+            <a:avLst>
+              <a:gd name="adj1" fmla="val 50000"/>
+            </a:avLst>
+          </a:prstGeom>
+          <a:ln w="19050">
+            <a:prstDash val="sysDot"/>
+            <a:headEnd type="none" w="med" len="med"/>
+            <a:tailEnd type="arrow" w="med" len="med"/>
+          </a:ln>
+          <a:effectLst/>
+        </p:spPr>
+        <p:style>
+          <a:lnRef idx="1">
+            <a:schemeClr val="accent6"/>
+          </a:lnRef>
+          <a:fillRef idx="2">
+            <a:schemeClr val="accent6"/>
+          </a:fillRef>
+          <a:effectRef idx="1">
+            <a:schemeClr val="accent6"/>
+          </a:effectRef>
+          <a:fontRef idx="minor">
+            <a:schemeClr val="dk1"/>
+          </a:fontRef>
+        </p:style>
+      </p:cxnSp>
+      <p:cxnSp>
+        <p:nvCxnSpPr>
+          <p:cNvPr id="43" name="Elbow Connector 63">
+            <a:extLst>
+              <a:ext uri="{FF2B5EF4-FFF2-40B4-BE49-F238E27FC236}">
+                <a16:creationId xmlns:a16="http://schemas.microsoft.com/office/drawing/2014/main" id="{D6FC638D-6A1B-4A2C-873C-220842C62BF0}"/>
+              </a:ext>
+            </a:extLst>
+          </p:cNvPr>
+          <p:cNvCxnSpPr>
+            <a:cxnSpLocks/>
+            <a:stCxn id="32" idx="3"/>
+            <a:endCxn id="30" idx="1"/>
+          </p:cNvCxnSpPr>
+          <p:nvPr/>
+        </p:nvCxnSpPr>
+        <p:spPr>
+          <a:xfrm flipV="1">
+            <a:off x="4366524" y="3998801"/>
+            <a:ext cx="251604" cy="625"/>
+          </a:xfrm>
+          <a:prstGeom prst="bentConnector3">
+            <a:avLst>
+              <a:gd name="adj1" fmla="val 50000"/>
+            </a:avLst>
+          </a:prstGeom>
+          <a:ln w="19050">
+            <a:solidFill>
+              <a:schemeClr val="accent6">
+                <a:lumMod val="75000"/>
+              </a:schemeClr>
+            </a:solidFill>
+            <a:prstDash val="sysDot"/>
+            <a:headEnd type="none" w="med" len="med"/>
+            <a:tailEnd type="none" w="med" len="med"/>
+          </a:ln>
+          <a:effectLst/>
+        </p:spPr>
+        <p:style>
+          <a:lnRef idx="1">
+            <a:schemeClr val="accent2"/>
+          </a:lnRef>
+          <a:fillRef idx="2">
+            <a:schemeClr val="accent2"/>
+          </a:fillRef>
+          <a:effectRef idx="1">
+            <a:schemeClr val="accent2"/>
           </a:effectRef>
           <a:fontRef idx="minor">
             <a:schemeClr val="dk1"/>
@@ -4843,13 +5487,6 @@
   <p:clrMapOvr>
     <a:masterClrMapping/>
   </p:clrMapOvr>
-  <p:timing>
-    <p:tnLst>
-      <p:par>
-        <p:cTn id="1" dur="indefinite" restart="never" nodeType="tmRoot"/>
-      </p:par>
-    </p:tnLst>
-  </p:timing>
 </p:sld>
 </file>
 

</xml_diff>

<commit_message>
Updated UIclass diagram and storageclassdiagram for DG
</commit_message>
<xml_diff>
--- a/docs/diagrams/StorageComponentClassDiagram.pptx
+++ b/docs/diagrams/StorageComponentClassDiagram.pptx
@@ -107,7 +107,60 @@
       </a:defRPr>
     </a:lvl9pPr>
   </p:defaultTextStyle>
+  <p:extLst>
+    <p:ext uri="{EFAFB233-063F-42B5-8137-9DF3F51BA10A}">
+      <p15:sldGuideLst xmlns:p15="http://schemas.microsoft.com/office/powerpoint/2012/main">
+        <p15:guide id="1" orient="horz" pos="1488">
+          <p15:clr>
+            <a:srgbClr val="A4A3A4"/>
+          </p15:clr>
+        </p15:guide>
+        <p15:guide id="2" pos="2880">
+          <p15:clr>
+            <a:srgbClr val="A4A3A4"/>
+          </p15:clr>
+        </p15:guide>
+      </p15:sldGuideLst>
+    </p:ext>
+  </p:extLst>
 </p:presentation>
+</file>
+
+<file path=ppt/changesInfos/changesInfo1.xml><?xml version="1.0" encoding="utf-8"?>
+<pc:chgInfo xmlns:a="http://schemas.openxmlformats.org/drawingml/2006/main" xmlns:r="http://schemas.openxmlformats.org/officeDocument/2006/relationships" xmlns:ac="http://schemas.microsoft.com/office/drawing/2013/main/command" xmlns:pc="http://schemas.microsoft.com/office/powerpoint/2013/main/command">
+  <pc:docChgLst>
+    <pc:chgData name="Melvin Leo" userId="fc11bf49cac66023" providerId="LiveId" clId="{C9FE2B49-E3EE-430B-B1FE-EF751018076E}"/>
+    <pc:docChg chg="modSld">
+      <pc:chgData name="Melvin Leo" userId="fc11bf49cac66023" providerId="LiveId" clId="{C9FE2B49-E3EE-430B-B1FE-EF751018076E}" dt="2017-10-23T17:37:35.617" v="18" actId="1076"/>
+      <pc:docMkLst>
+        <pc:docMk/>
+      </pc:docMkLst>
+      <pc:sldChg chg="addSp modSp">
+        <pc:chgData name="Melvin Leo" userId="fc11bf49cac66023" providerId="LiveId" clId="{C9FE2B49-E3EE-430B-B1FE-EF751018076E}" dt="2017-10-23T17:37:35.617" v="18" actId="1076"/>
+        <pc:sldMkLst>
+          <pc:docMk/>
+          <pc:sldMk cId="1478832369" sldId="264"/>
+        </pc:sldMkLst>
+        <pc:spChg chg="add mod">
+          <ac:chgData name="Melvin Leo" userId="fc11bf49cac66023" providerId="LiveId" clId="{C9FE2B49-E3EE-430B-B1FE-EF751018076E}" dt="2017-10-23T17:37:20.576" v="16" actId="1076"/>
+          <ac:spMkLst>
+            <pc:docMk/>
+            <pc:sldMk cId="1478832369" sldId="264"/>
+            <ac:spMk id="26" creationId="{62312A7A-3E50-4DDF-BFDF-DA4BAC181FCD}"/>
+          </ac:spMkLst>
+        </pc:spChg>
+        <pc:cxnChg chg="add mod">
+          <ac:chgData name="Melvin Leo" userId="fc11bf49cac66023" providerId="LiveId" clId="{C9FE2B49-E3EE-430B-B1FE-EF751018076E}" dt="2017-10-23T17:37:35.617" v="18" actId="1076"/>
+          <ac:cxnSpMkLst>
+            <pc:docMk/>
+            <pc:sldMk cId="1478832369" sldId="264"/>
+            <ac:cxnSpMk id="27" creationId="{AC18CD23-2D9D-4447-8BB0-67D1F70B78D9}"/>
+          </ac:cxnSpMkLst>
+        </pc:cxnChg>
+      </pc:sldChg>
+    </pc:docChg>
+  </pc:docChgLst>
+</pc:chgInfo>
 </file>
 
 <file path=ppt/notesMasters/notesMaster1.xml><?xml version="1.0" encoding="utf-8"?>
@@ -192,7 +245,7 @@
           <a:p>
             <a:fld id="{F5CC4B3F-88C1-4FFA-B1B6-F41C21DC6924}" type="datetimeFigureOut">
               <a:rPr lang="en-US" smtClean="0"/>
-              <a:t>10/16/2016</a:t>
+              <a:t>10/24/2017</a:t>
             </a:fld>
             <a:endParaRPr lang="en-US"/>
           </a:p>
@@ -256,38 +309,37 @@
           <a:p>
             <a:pPr lvl="0"/>
             <a:r>
-              <a:rPr lang="en-US" smtClean="0"/>
+              <a:rPr lang="en-US"/>
               <a:t>Click to edit Master text styles</a:t>
             </a:r>
           </a:p>
           <a:p>
             <a:pPr lvl="1"/>
             <a:r>
-              <a:rPr lang="en-US" smtClean="0"/>
+              <a:rPr lang="en-US"/>
               <a:t>Second level</a:t>
             </a:r>
           </a:p>
           <a:p>
             <a:pPr lvl="2"/>
             <a:r>
-              <a:rPr lang="en-US" smtClean="0"/>
+              <a:rPr lang="en-US"/>
               <a:t>Third level</a:t>
             </a:r>
           </a:p>
           <a:p>
             <a:pPr lvl="3"/>
             <a:r>
-              <a:rPr lang="en-US" smtClean="0"/>
+              <a:rPr lang="en-US"/>
               <a:t>Fourth level</a:t>
             </a:r>
           </a:p>
           <a:p>
             <a:pPr lvl="4"/>
             <a:r>
-              <a:rPr lang="en-US" smtClean="0"/>
+              <a:rPr lang="en-US"/>
               <a:t>Fifth level</a:t>
             </a:r>
-            <a:endParaRPr lang="en-US"/>
           </a:p>
         </p:txBody>
       </p:sp>
@@ -498,10 +550,9 @@
           <a:lstStyle/>
           <a:p>
             <a:r>
-              <a:rPr lang="en-US" smtClean="0"/>
+              <a:rPr lang="en-US"/>
               <a:t>Click to edit Master title style</a:t>
             </a:r>
-            <a:endParaRPr lang="en-US"/>
           </a:p>
         </p:txBody>
       </p:sp>
@@ -617,10 +668,9 @@
           </a:lstStyle>
           <a:p>
             <a:r>
-              <a:rPr lang="en-US" smtClean="0"/>
+              <a:rPr lang="en-US"/>
               <a:t>Click to edit Master subtitle style</a:t>
             </a:r>
-            <a:endParaRPr lang="en-US"/>
           </a:p>
         </p:txBody>
       </p:sp>
@@ -641,7 +691,7 @@
           <a:p>
             <a:fld id="{78C97017-6FC3-485B-9764-EAC9E56C1D49}" type="datetimeFigureOut">
               <a:rPr lang="en-US" smtClean="0"/>
-              <a:t>10/16/2016</a:t>
+              <a:t>10/24/2017</a:t>
             </a:fld>
             <a:endParaRPr lang="en-US"/>
           </a:p>
@@ -735,10 +785,9 @@
           <a:lstStyle/>
           <a:p>
             <a:r>
-              <a:rPr lang="en-US" smtClean="0"/>
+              <a:rPr lang="en-US"/>
               <a:t>Click to edit Master title style</a:t>
             </a:r>
-            <a:endParaRPr lang="en-US"/>
           </a:p>
         </p:txBody>
       </p:sp>
@@ -759,38 +808,37 @@
           <a:p>
             <a:pPr lvl="0"/>
             <a:r>
-              <a:rPr lang="en-US" smtClean="0"/>
+              <a:rPr lang="en-US"/>
               <a:t>Click to edit Master text styles</a:t>
             </a:r>
           </a:p>
           <a:p>
             <a:pPr lvl="1"/>
             <a:r>
-              <a:rPr lang="en-US" smtClean="0"/>
+              <a:rPr lang="en-US"/>
               <a:t>Second level</a:t>
             </a:r>
           </a:p>
           <a:p>
             <a:pPr lvl="2"/>
             <a:r>
-              <a:rPr lang="en-US" smtClean="0"/>
+              <a:rPr lang="en-US"/>
               <a:t>Third level</a:t>
             </a:r>
           </a:p>
           <a:p>
             <a:pPr lvl="3"/>
             <a:r>
-              <a:rPr lang="en-US" smtClean="0"/>
+              <a:rPr lang="en-US"/>
               <a:t>Fourth level</a:t>
             </a:r>
           </a:p>
           <a:p>
             <a:pPr lvl="4"/>
             <a:r>
-              <a:rPr lang="en-US" smtClean="0"/>
+              <a:rPr lang="en-US"/>
               <a:t>Fifth level</a:t>
             </a:r>
-            <a:endParaRPr lang="en-US"/>
           </a:p>
         </p:txBody>
       </p:sp>
@@ -811,7 +859,7 @@
           <a:p>
             <a:fld id="{78C97017-6FC3-485B-9764-EAC9E56C1D49}" type="datetimeFigureOut">
               <a:rPr lang="en-US" smtClean="0"/>
-              <a:t>10/16/2016</a:t>
+              <a:t>10/24/2017</a:t>
             </a:fld>
             <a:endParaRPr lang="en-US"/>
           </a:p>
@@ -910,10 +958,9 @@
           <a:lstStyle/>
           <a:p>
             <a:r>
-              <a:rPr lang="en-US" smtClean="0"/>
+              <a:rPr lang="en-US"/>
               <a:t>Click to edit Master title style</a:t>
             </a:r>
-            <a:endParaRPr lang="en-US"/>
           </a:p>
         </p:txBody>
       </p:sp>
@@ -939,38 +986,37 @@
           <a:p>
             <a:pPr lvl="0"/>
             <a:r>
-              <a:rPr lang="en-US" smtClean="0"/>
+              <a:rPr lang="en-US"/>
               <a:t>Click to edit Master text styles</a:t>
             </a:r>
           </a:p>
           <a:p>
             <a:pPr lvl="1"/>
             <a:r>
-              <a:rPr lang="en-US" smtClean="0"/>
+              <a:rPr lang="en-US"/>
               <a:t>Second level</a:t>
             </a:r>
           </a:p>
           <a:p>
             <a:pPr lvl="2"/>
             <a:r>
-              <a:rPr lang="en-US" smtClean="0"/>
+              <a:rPr lang="en-US"/>
               <a:t>Third level</a:t>
             </a:r>
           </a:p>
           <a:p>
             <a:pPr lvl="3"/>
             <a:r>
-              <a:rPr lang="en-US" smtClean="0"/>
+              <a:rPr lang="en-US"/>
               <a:t>Fourth level</a:t>
             </a:r>
           </a:p>
           <a:p>
             <a:pPr lvl="4"/>
             <a:r>
-              <a:rPr lang="en-US" smtClean="0"/>
+              <a:rPr lang="en-US"/>
               <a:t>Fifth level</a:t>
             </a:r>
-            <a:endParaRPr lang="en-US"/>
           </a:p>
         </p:txBody>
       </p:sp>
@@ -991,7 +1037,7 @@
           <a:p>
             <a:fld id="{78C97017-6FC3-485B-9764-EAC9E56C1D49}" type="datetimeFigureOut">
               <a:rPr lang="en-US" smtClean="0"/>
-              <a:t>10/16/2016</a:t>
+              <a:t>10/24/2017</a:t>
             </a:fld>
             <a:endParaRPr lang="en-US"/>
           </a:p>
@@ -1085,10 +1131,9 @@
           <a:lstStyle/>
           <a:p>
             <a:r>
-              <a:rPr lang="en-US" smtClean="0"/>
+              <a:rPr lang="en-US"/>
               <a:t>Click to edit Master title style</a:t>
             </a:r>
-            <a:endParaRPr lang="en-US"/>
           </a:p>
         </p:txBody>
       </p:sp>
@@ -1109,38 +1154,37 @@
           <a:p>
             <a:pPr lvl="0"/>
             <a:r>
-              <a:rPr lang="en-US" smtClean="0"/>
+              <a:rPr lang="en-US"/>
               <a:t>Click to edit Master text styles</a:t>
             </a:r>
           </a:p>
           <a:p>
             <a:pPr lvl="1"/>
             <a:r>
-              <a:rPr lang="en-US" smtClean="0"/>
+              <a:rPr lang="en-US"/>
               <a:t>Second level</a:t>
             </a:r>
           </a:p>
           <a:p>
             <a:pPr lvl="2"/>
             <a:r>
-              <a:rPr lang="en-US" smtClean="0"/>
+              <a:rPr lang="en-US"/>
               <a:t>Third level</a:t>
             </a:r>
           </a:p>
           <a:p>
             <a:pPr lvl="3"/>
             <a:r>
-              <a:rPr lang="en-US" smtClean="0"/>
+              <a:rPr lang="en-US"/>
               <a:t>Fourth level</a:t>
             </a:r>
           </a:p>
           <a:p>
             <a:pPr lvl="4"/>
             <a:r>
-              <a:rPr lang="en-US" smtClean="0"/>
+              <a:rPr lang="en-US"/>
               <a:t>Fifth level</a:t>
             </a:r>
-            <a:endParaRPr lang="en-US"/>
           </a:p>
         </p:txBody>
       </p:sp>
@@ -1161,7 +1205,7 @@
           <a:p>
             <a:fld id="{78C97017-6FC3-485B-9764-EAC9E56C1D49}" type="datetimeFigureOut">
               <a:rPr lang="en-US" smtClean="0"/>
-              <a:t>10/16/2016</a:t>
+              <a:t>10/24/2017</a:t>
             </a:fld>
             <a:endParaRPr lang="en-US"/>
           </a:p>
@@ -1264,10 +1308,9 @@
           </a:lstStyle>
           <a:p>
             <a:r>
-              <a:rPr lang="en-US" smtClean="0"/>
+              <a:rPr lang="en-US"/>
               <a:t>Click to edit Master title style</a:t>
             </a:r>
-            <a:endParaRPr lang="en-US"/>
           </a:p>
         </p:txBody>
       </p:sp>
@@ -1384,7 +1427,7 @@
           <a:p>
             <a:pPr lvl="0"/>
             <a:r>
-              <a:rPr lang="en-US" smtClean="0"/>
+              <a:rPr lang="en-US"/>
               <a:t>Click to edit Master text styles</a:t>
             </a:r>
           </a:p>
@@ -1407,7 +1450,7 @@
           <a:p>
             <a:fld id="{78C97017-6FC3-485B-9764-EAC9E56C1D49}" type="datetimeFigureOut">
               <a:rPr lang="en-US" smtClean="0"/>
-              <a:t>10/16/2016</a:t>
+              <a:t>10/24/2017</a:t>
             </a:fld>
             <a:endParaRPr lang="en-US"/>
           </a:p>
@@ -1501,10 +1544,9 @@
           <a:lstStyle/>
           <a:p>
             <a:r>
-              <a:rPr lang="en-US" smtClean="0"/>
+              <a:rPr lang="en-US"/>
               <a:t>Click to edit Master title style</a:t>
             </a:r>
-            <a:endParaRPr lang="en-US"/>
           </a:p>
         </p:txBody>
       </p:sp>
@@ -1558,38 +1600,37 @@
           <a:p>
             <a:pPr lvl="0"/>
             <a:r>
-              <a:rPr lang="en-US" smtClean="0"/>
+              <a:rPr lang="en-US"/>
               <a:t>Click to edit Master text styles</a:t>
             </a:r>
           </a:p>
           <a:p>
             <a:pPr lvl="1"/>
             <a:r>
-              <a:rPr lang="en-US" smtClean="0"/>
+              <a:rPr lang="en-US"/>
               <a:t>Second level</a:t>
             </a:r>
           </a:p>
           <a:p>
             <a:pPr lvl="2"/>
             <a:r>
-              <a:rPr lang="en-US" smtClean="0"/>
+              <a:rPr lang="en-US"/>
               <a:t>Third level</a:t>
             </a:r>
           </a:p>
           <a:p>
             <a:pPr lvl="3"/>
             <a:r>
-              <a:rPr lang="en-US" smtClean="0"/>
+              <a:rPr lang="en-US"/>
               <a:t>Fourth level</a:t>
             </a:r>
           </a:p>
           <a:p>
             <a:pPr lvl="4"/>
             <a:r>
-              <a:rPr lang="en-US" smtClean="0"/>
+              <a:rPr lang="en-US"/>
               <a:t>Fifth level</a:t>
             </a:r>
-            <a:endParaRPr lang="en-US"/>
           </a:p>
         </p:txBody>
       </p:sp>
@@ -1643,38 +1684,37 @@
           <a:p>
             <a:pPr lvl="0"/>
             <a:r>
-              <a:rPr lang="en-US" smtClean="0"/>
+              <a:rPr lang="en-US"/>
               <a:t>Click to edit Master text styles</a:t>
             </a:r>
           </a:p>
           <a:p>
             <a:pPr lvl="1"/>
             <a:r>
-              <a:rPr lang="en-US" smtClean="0"/>
+              <a:rPr lang="en-US"/>
               <a:t>Second level</a:t>
             </a:r>
           </a:p>
           <a:p>
             <a:pPr lvl="2"/>
             <a:r>
-              <a:rPr lang="en-US" smtClean="0"/>
+              <a:rPr lang="en-US"/>
               <a:t>Third level</a:t>
             </a:r>
           </a:p>
           <a:p>
             <a:pPr lvl="3"/>
             <a:r>
-              <a:rPr lang="en-US" smtClean="0"/>
+              <a:rPr lang="en-US"/>
               <a:t>Fourth level</a:t>
             </a:r>
           </a:p>
           <a:p>
             <a:pPr lvl="4"/>
             <a:r>
-              <a:rPr lang="en-US" smtClean="0"/>
+              <a:rPr lang="en-US"/>
               <a:t>Fifth level</a:t>
             </a:r>
-            <a:endParaRPr lang="en-US"/>
           </a:p>
         </p:txBody>
       </p:sp>
@@ -1695,7 +1735,7 @@
           <a:p>
             <a:fld id="{78C97017-6FC3-485B-9764-EAC9E56C1D49}" type="datetimeFigureOut">
               <a:rPr lang="en-US" smtClean="0"/>
-              <a:t>10/16/2016</a:t>
+              <a:t>10/24/2017</a:t>
             </a:fld>
             <a:endParaRPr lang="en-US"/>
           </a:p>
@@ -1793,10 +1833,9 @@
           </a:lstStyle>
           <a:p>
             <a:r>
-              <a:rPr lang="en-US" smtClean="0"/>
+              <a:rPr lang="en-US"/>
               <a:t>Click to edit Master title style</a:t>
             </a:r>
-            <a:endParaRPr lang="en-US"/>
           </a:p>
         </p:txBody>
       </p:sp>
@@ -1859,7 +1898,7 @@
           <a:p>
             <a:pPr lvl="0"/>
             <a:r>
-              <a:rPr lang="en-US" smtClean="0"/>
+              <a:rPr lang="en-US"/>
               <a:t>Click to edit Master text styles</a:t>
             </a:r>
           </a:p>
@@ -1915,38 +1954,37 @@
           <a:p>
             <a:pPr lvl="0"/>
             <a:r>
-              <a:rPr lang="en-US" smtClean="0"/>
+              <a:rPr lang="en-US"/>
               <a:t>Click to edit Master text styles</a:t>
             </a:r>
           </a:p>
           <a:p>
             <a:pPr lvl="1"/>
             <a:r>
-              <a:rPr lang="en-US" smtClean="0"/>
+              <a:rPr lang="en-US"/>
               <a:t>Second level</a:t>
             </a:r>
           </a:p>
           <a:p>
             <a:pPr lvl="2"/>
             <a:r>
-              <a:rPr lang="en-US" smtClean="0"/>
+              <a:rPr lang="en-US"/>
               <a:t>Third level</a:t>
             </a:r>
           </a:p>
           <a:p>
             <a:pPr lvl="3"/>
             <a:r>
-              <a:rPr lang="en-US" smtClean="0"/>
+              <a:rPr lang="en-US"/>
               <a:t>Fourth level</a:t>
             </a:r>
           </a:p>
           <a:p>
             <a:pPr lvl="4"/>
             <a:r>
-              <a:rPr lang="en-US" smtClean="0"/>
+              <a:rPr lang="en-US"/>
               <a:t>Fifth level</a:t>
             </a:r>
-            <a:endParaRPr lang="en-US"/>
           </a:p>
         </p:txBody>
       </p:sp>
@@ -2009,7 +2047,7 @@
           <a:p>
             <a:pPr lvl="0"/>
             <a:r>
-              <a:rPr lang="en-US" smtClean="0"/>
+              <a:rPr lang="en-US"/>
               <a:t>Click to edit Master text styles</a:t>
             </a:r>
           </a:p>
@@ -2065,38 +2103,37 @@
           <a:p>
             <a:pPr lvl="0"/>
             <a:r>
-              <a:rPr lang="en-US" smtClean="0"/>
+              <a:rPr lang="en-US"/>
               <a:t>Click to edit Master text styles</a:t>
             </a:r>
           </a:p>
           <a:p>
             <a:pPr lvl="1"/>
             <a:r>
-              <a:rPr lang="en-US" smtClean="0"/>
+              <a:rPr lang="en-US"/>
               <a:t>Second level</a:t>
             </a:r>
           </a:p>
           <a:p>
             <a:pPr lvl="2"/>
             <a:r>
-              <a:rPr lang="en-US" smtClean="0"/>
+              <a:rPr lang="en-US"/>
               <a:t>Third level</a:t>
             </a:r>
           </a:p>
           <a:p>
             <a:pPr lvl="3"/>
             <a:r>
-              <a:rPr lang="en-US" smtClean="0"/>
+              <a:rPr lang="en-US"/>
               <a:t>Fourth level</a:t>
             </a:r>
           </a:p>
           <a:p>
             <a:pPr lvl="4"/>
             <a:r>
-              <a:rPr lang="en-US" smtClean="0"/>
+              <a:rPr lang="en-US"/>
               <a:t>Fifth level</a:t>
             </a:r>
-            <a:endParaRPr lang="en-US"/>
           </a:p>
         </p:txBody>
       </p:sp>
@@ -2117,7 +2154,7 @@
           <a:p>
             <a:fld id="{78C97017-6FC3-485B-9764-EAC9E56C1D49}" type="datetimeFigureOut">
               <a:rPr lang="en-US" smtClean="0"/>
-              <a:t>10/16/2016</a:t>
+              <a:t>10/24/2017</a:t>
             </a:fld>
             <a:endParaRPr lang="en-US"/>
           </a:p>
@@ -2211,10 +2248,9 @@
           <a:lstStyle/>
           <a:p>
             <a:r>
-              <a:rPr lang="en-US" smtClean="0"/>
+              <a:rPr lang="en-US"/>
               <a:t>Click to edit Master title style</a:t>
             </a:r>
-            <a:endParaRPr lang="en-US"/>
           </a:p>
         </p:txBody>
       </p:sp>
@@ -2235,7 +2271,7 @@
           <a:p>
             <a:fld id="{78C97017-6FC3-485B-9764-EAC9E56C1D49}" type="datetimeFigureOut">
               <a:rPr lang="en-US" smtClean="0"/>
-              <a:t>10/16/2016</a:t>
+              <a:t>10/24/2017</a:t>
             </a:fld>
             <a:endParaRPr lang="en-US"/>
           </a:p>
@@ -2330,7 +2366,7 @@
           <a:p>
             <a:fld id="{78C97017-6FC3-485B-9764-EAC9E56C1D49}" type="datetimeFigureOut">
               <a:rPr lang="en-US" smtClean="0"/>
-              <a:t>10/16/2016</a:t>
+              <a:t>10/24/2017</a:t>
             </a:fld>
             <a:endParaRPr lang="en-US"/>
           </a:p>
@@ -2433,10 +2469,9 @@
           </a:lstStyle>
           <a:p>
             <a:r>
-              <a:rPr lang="en-US" smtClean="0"/>
+              <a:rPr lang="en-US"/>
               <a:t>Click to edit Master title style</a:t>
             </a:r>
-            <a:endParaRPr lang="en-US"/>
           </a:p>
         </p:txBody>
       </p:sp>
@@ -2490,38 +2525,37 @@
           <a:p>
             <a:pPr lvl="0"/>
             <a:r>
-              <a:rPr lang="en-US" smtClean="0"/>
+              <a:rPr lang="en-US"/>
               <a:t>Click to edit Master text styles</a:t>
             </a:r>
           </a:p>
           <a:p>
             <a:pPr lvl="1"/>
             <a:r>
-              <a:rPr lang="en-US" smtClean="0"/>
+              <a:rPr lang="en-US"/>
               <a:t>Second level</a:t>
             </a:r>
           </a:p>
           <a:p>
             <a:pPr lvl="2"/>
             <a:r>
-              <a:rPr lang="en-US" smtClean="0"/>
+              <a:rPr lang="en-US"/>
               <a:t>Third level</a:t>
             </a:r>
           </a:p>
           <a:p>
             <a:pPr lvl="3"/>
             <a:r>
-              <a:rPr lang="en-US" smtClean="0"/>
+              <a:rPr lang="en-US"/>
               <a:t>Fourth level</a:t>
             </a:r>
           </a:p>
           <a:p>
             <a:pPr lvl="4"/>
             <a:r>
-              <a:rPr lang="en-US" smtClean="0"/>
+              <a:rPr lang="en-US"/>
               <a:t>Fifth level</a:t>
             </a:r>
-            <a:endParaRPr lang="en-US"/>
           </a:p>
         </p:txBody>
       </p:sp>
@@ -2584,7 +2618,7 @@
           <a:p>
             <a:pPr lvl="0"/>
             <a:r>
-              <a:rPr lang="en-US" smtClean="0"/>
+              <a:rPr lang="en-US"/>
               <a:t>Click to edit Master text styles</a:t>
             </a:r>
           </a:p>
@@ -2607,7 +2641,7 @@
           <a:p>
             <a:fld id="{78C97017-6FC3-485B-9764-EAC9E56C1D49}" type="datetimeFigureOut">
               <a:rPr lang="en-US" smtClean="0"/>
-              <a:t>10/16/2016</a:t>
+              <a:t>10/24/2017</a:t>
             </a:fld>
             <a:endParaRPr lang="en-US"/>
           </a:p>
@@ -2710,10 +2744,9 @@
           </a:lstStyle>
           <a:p>
             <a:r>
-              <a:rPr lang="en-US" smtClean="0"/>
+              <a:rPr lang="en-US"/>
               <a:t>Click to edit Master title style</a:t>
             </a:r>
-            <a:endParaRPr lang="en-US"/>
           </a:p>
         </p:txBody>
       </p:sp>
@@ -2837,7 +2870,7 @@
           <a:p>
             <a:pPr lvl="0"/>
             <a:r>
-              <a:rPr lang="en-US" smtClean="0"/>
+              <a:rPr lang="en-US"/>
               <a:t>Click to edit Master text styles</a:t>
             </a:r>
           </a:p>
@@ -2860,7 +2893,7 @@
           <a:p>
             <a:fld id="{78C97017-6FC3-485B-9764-EAC9E56C1D49}" type="datetimeFigureOut">
               <a:rPr lang="en-US" smtClean="0"/>
-              <a:t>10/16/2016</a:t>
+              <a:t>10/24/2017</a:t>
             </a:fld>
             <a:endParaRPr lang="en-US"/>
           </a:p>
@@ -2969,10 +3002,9 @@
           <a:lstStyle/>
           <a:p>
             <a:r>
-              <a:rPr lang="en-US" smtClean="0"/>
+              <a:rPr lang="en-US"/>
               <a:t>Click to edit Master title style</a:t>
             </a:r>
-            <a:endParaRPr lang="en-US"/>
           </a:p>
         </p:txBody>
       </p:sp>
@@ -3003,38 +3035,37 @@
           <a:p>
             <a:pPr lvl="0"/>
             <a:r>
-              <a:rPr lang="en-US" smtClean="0"/>
+              <a:rPr lang="en-US"/>
               <a:t>Click to edit Master text styles</a:t>
             </a:r>
           </a:p>
           <a:p>
             <a:pPr lvl="1"/>
             <a:r>
-              <a:rPr lang="en-US" smtClean="0"/>
+              <a:rPr lang="en-US"/>
               <a:t>Second level</a:t>
             </a:r>
           </a:p>
           <a:p>
             <a:pPr lvl="2"/>
             <a:r>
-              <a:rPr lang="en-US" smtClean="0"/>
+              <a:rPr lang="en-US"/>
               <a:t>Third level</a:t>
             </a:r>
           </a:p>
           <a:p>
             <a:pPr lvl="3"/>
             <a:r>
-              <a:rPr lang="en-US" smtClean="0"/>
+              <a:rPr lang="en-US"/>
               <a:t>Fourth level</a:t>
             </a:r>
           </a:p>
           <a:p>
             <a:pPr lvl="4"/>
             <a:r>
-              <a:rPr lang="en-US" smtClean="0"/>
+              <a:rPr lang="en-US"/>
               <a:t>Fifth level</a:t>
             </a:r>
-            <a:endParaRPr lang="en-US"/>
           </a:p>
         </p:txBody>
       </p:sp>
@@ -3073,7 +3104,7 @@
           <a:p>
             <a:fld id="{78C97017-6FC3-485B-9764-EAC9E56C1D49}" type="datetimeFigureOut">
               <a:rPr lang="en-US" smtClean="0"/>
-              <a:t>10/16/2016</a:t>
+              <a:t>10/24/2017</a:t>
             </a:fld>
             <a:endParaRPr lang="en-US"/>
           </a:p>
@@ -3494,7 +3525,7 @@
           <a:lstStyle/>
           <a:p>
             <a:r>
-              <a:rPr lang="en-US" sz="1200" b="1" dirty="0" smtClean="0">
+              <a:rPr lang="en-US" sz="1200" b="1" dirty="0">
                 <a:solidFill>
                   <a:schemeClr val="accent6">
                     <a:lumMod val="75000"/>
@@ -3561,7 +3592,7 @@
           <a:p>
             <a:pPr algn="ctr"/>
             <a:r>
-              <a:rPr lang="en-US" sz="1050" dirty="0" smtClean="0">
+              <a:rPr lang="en-US" sz="1050" dirty="0">
                 <a:solidFill>
                   <a:schemeClr val="bg1"/>
                 </a:solidFill>
@@ -3569,14 +3600,14 @@
               <a:t>&lt;&lt;interface&gt;&gt;</a:t>
             </a:r>
             <a:br>
-              <a:rPr lang="en-US" sz="1050" dirty="0" smtClean="0">
+              <a:rPr lang="en-US" sz="1050" dirty="0">
                 <a:solidFill>
                   <a:schemeClr val="bg1"/>
                 </a:solidFill>
               </a:rPr>
             </a:br>
             <a:r>
-              <a:rPr lang="en-US" sz="1050" dirty="0" err="1" smtClean="0">
+              <a:rPr lang="en-US" sz="1050" dirty="0" err="1">
                 <a:solidFill>
                   <a:schemeClr val="bg1"/>
                 </a:solidFill>
@@ -3639,7 +3670,7 @@
           <a:p>
             <a:pPr algn="ctr"/>
             <a:r>
-              <a:rPr lang="en-US" sz="1050" dirty="0" err="1" smtClean="0">
+              <a:rPr lang="en-US" sz="1050" dirty="0" err="1">
                 <a:solidFill>
                   <a:schemeClr val="bg1"/>
                 </a:solidFill>
@@ -3713,7 +3744,7 @@
           <a:p>
             <a:pPr algn="ctr"/>
             <a:r>
-              <a:rPr lang="en-US" sz="1050" dirty="0" smtClean="0">
+              <a:rPr lang="en-US" sz="1050" dirty="0">
                 <a:solidFill>
                   <a:schemeClr val="bg1"/>
                 </a:solidFill>
@@ -4147,7 +4178,7 @@
           <a:p>
             <a:pPr algn="ctr"/>
             <a:r>
-              <a:rPr lang="en-US" sz="1050" b="1" dirty="0" err="1" smtClean="0">
+              <a:rPr lang="en-US" sz="1050" b="1" dirty="0" err="1">
                 <a:solidFill>
                   <a:schemeClr val="accent6">
                     <a:lumMod val="75000"/>
@@ -4156,18 +4187,8 @@
               </a:rPr>
               <a:t>XmlAddressBook</a:t>
             </a:r>
-            <a:r>
-              <a:rPr lang="en-US" sz="1050" b="1" dirty="0" smtClean="0">
-                <a:solidFill>
-                  <a:schemeClr val="accent6">
-                    <a:lumMod val="75000"/>
-                  </a:schemeClr>
-                </a:solidFill>
-              </a:rPr>
-              <a:t/>
-            </a:r>
             <a:br>
-              <a:rPr lang="en-US" sz="1050" b="1" dirty="0" smtClean="0">
+              <a:rPr lang="en-US" sz="1050" b="1" dirty="0">
                 <a:solidFill>
                   <a:schemeClr val="accent6">
                     <a:lumMod val="75000"/>
@@ -4176,7 +4197,7 @@
               </a:rPr>
             </a:br>
             <a:r>
-              <a:rPr lang="en-US" sz="1050" b="1" dirty="0" smtClean="0">
+              <a:rPr lang="en-US" sz="1050" b="1" dirty="0">
                 <a:solidFill>
                   <a:schemeClr val="accent6">
                     <a:lumMod val="75000"/>
@@ -4243,7 +4264,7 @@
           <a:p>
             <a:pPr algn="ctr"/>
             <a:r>
-              <a:rPr lang="en-US" sz="1050" dirty="0" smtClean="0">
+              <a:rPr lang="en-US" sz="1050" dirty="0">
                 <a:solidFill>
                   <a:schemeClr val="bg1"/>
                 </a:solidFill>
@@ -4251,14 +4272,14 @@
               <a:t>&lt;&lt;interface&gt;&gt;</a:t>
             </a:r>
             <a:br>
-              <a:rPr lang="en-US" sz="1050" dirty="0" smtClean="0">
+              <a:rPr lang="en-US" sz="1050" dirty="0">
                 <a:solidFill>
                   <a:schemeClr val="bg1"/>
                 </a:solidFill>
               </a:rPr>
             </a:br>
             <a:r>
-              <a:rPr lang="en-US" sz="1050" dirty="0" err="1" smtClean="0">
+              <a:rPr lang="en-US" sz="1050" dirty="0" err="1">
                 <a:solidFill>
                   <a:schemeClr val="bg1"/>
                 </a:solidFill>
@@ -4516,30 +4537,22 @@
           <a:p>
             <a:pPr algn="ctr"/>
             <a:r>
-              <a:rPr lang="en-US" sz="1050" dirty="0" err="1" smtClean="0">
+              <a:rPr lang="en-US" sz="1050" dirty="0" err="1">
                 <a:solidFill>
                   <a:schemeClr val="bg1"/>
                 </a:solidFill>
               </a:rPr>
               <a:t>JsonUserPrefs</a:t>
             </a:r>
-            <a:r>
-              <a:rPr lang="en-US" sz="1050" dirty="0" smtClean="0">
-                <a:solidFill>
-                  <a:schemeClr val="bg1"/>
-                </a:solidFill>
-              </a:rPr>
-              <a:t/>
-            </a:r>
             <a:br>
-              <a:rPr lang="en-US" sz="1050" dirty="0" smtClean="0">
+              <a:rPr lang="en-US" sz="1050" dirty="0">
                 <a:solidFill>
                   <a:schemeClr val="bg1"/>
                 </a:solidFill>
               </a:rPr>
             </a:br>
             <a:r>
-              <a:rPr lang="en-US" sz="1050" dirty="0" smtClean="0">
+              <a:rPr lang="en-US" sz="1050" dirty="0">
                 <a:solidFill>
                   <a:schemeClr val="bg1"/>
                 </a:solidFill>
@@ -4591,7 +4604,7 @@
           <a:p>
             <a:pPr algn="ctr"/>
             <a:r>
-              <a:rPr lang="en-US" sz="1050" b="1" dirty="0" err="1" smtClean="0">
+              <a:rPr lang="en-US" sz="1050" b="1" dirty="0" err="1">
                 <a:solidFill>
                   <a:schemeClr val="accent6">
                     <a:lumMod val="75000"/>
@@ -4600,18 +4613,8 @@
               </a:rPr>
               <a:t>XmlSerializable</a:t>
             </a:r>
-            <a:r>
-              <a:rPr lang="en-US" sz="1050" b="1" dirty="0" smtClean="0">
-                <a:solidFill>
-                  <a:schemeClr val="accent6">
-                    <a:lumMod val="75000"/>
-                  </a:schemeClr>
-                </a:solidFill>
-              </a:rPr>
-              <a:t/>
-            </a:r>
             <a:br>
-              <a:rPr lang="en-US" sz="1050" b="1" dirty="0" smtClean="0">
+              <a:rPr lang="en-US" sz="1050" b="1" dirty="0">
                 <a:solidFill>
                   <a:schemeClr val="accent6">
                     <a:lumMod val="75000"/>
@@ -4620,7 +4623,7 @@
               </a:rPr>
             </a:br>
             <a:r>
-              <a:rPr lang="en-US" sz="1050" b="1" dirty="0" err="1" smtClean="0">
+              <a:rPr lang="en-US" sz="1050" b="1" dirty="0" err="1">
                 <a:solidFill>
                   <a:schemeClr val="accent6">
                     <a:lumMod val="75000"/>
@@ -4717,7 +4720,7 @@
           <a:p>
             <a:pPr algn="ctr"/>
             <a:r>
-              <a:rPr lang="en-US" sz="1050" b="1" dirty="0" err="1" smtClean="0">
+              <a:rPr lang="en-US" sz="1050" b="1" dirty="0" err="1">
                 <a:solidFill>
                   <a:schemeClr val="accent6">
                     <a:lumMod val="75000"/>
@@ -4773,7 +4776,7 @@
           <a:p>
             <a:pPr algn="ctr"/>
             <a:r>
-              <a:rPr lang="en-US" sz="1050" b="1" dirty="0" err="1" smtClean="0">
+              <a:rPr lang="en-US" sz="1050" b="1" dirty="0" err="1">
                 <a:solidFill>
                   <a:schemeClr val="accent6">
                     <a:lumMod val="75000"/>
@@ -4833,6 +4836,112 @@
           </a:fontRef>
         </p:style>
       </p:cxnSp>
+      <p:sp>
+        <p:nvSpPr>
+          <p:cNvPr id="26" name="Rectangle 8">
+            <a:extLst>
+              <a:ext uri="{FF2B5EF4-FFF2-40B4-BE49-F238E27FC236}">
+                <a16:creationId xmlns:a16="http://schemas.microsoft.com/office/drawing/2014/main" id="{62312A7A-3E50-4DDF-BFDF-DA4BAC181FCD}"/>
+              </a:ext>
+            </a:extLst>
+          </p:cNvPr>
+          <p:cNvSpPr/>
+          <p:nvPr/>
+        </p:nvSpPr>
+        <p:spPr>
+          <a:xfrm>
+            <a:off x="5975640" y="2494164"/>
+            <a:ext cx="1376220" cy="346760"/>
+          </a:xfrm>
+          <a:prstGeom prst="rect">
+            <a:avLst/>
+          </a:prstGeom>
+          <a:ln w="19050"/>
+          <a:effectLst/>
+        </p:spPr>
+        <p:style>
+          <a:lnRef idx="1">
+            <a:schemeClr val="accent6"/>
+          </a:lnRef>
+          <a:fillRef idx="2">
+            <a:schemeClr val="accent6"/>
+          </a:fillRef>
+          <a:effectRef idx="1">
+            <a:schemeClr val="accent6"/>
+          </a:effectRef>
+          <a:fontRef idx="minor">
+            <a:schemeClr val="dk1"/>
+          </a:fontRef>
+        </p:style>
+        <p:txBody>
+          <a:bodyPr rtlCol="0" anchor="ctr"/>
+          <a:lstStyle/>
+          <a:p>
+            <a:pPr algn="ctr"/>
+            <a:r>
+              <a:rPr lang="en-US" sz="1050" b="1" dirty="0" err="1">
+                <a:solidFill>
+                  <a:schemeClr val="accent6">
+                    <a:lumMod val="75000"/>
+                  </a:schemeClr>
+                </a:solidFill>
+              </a:rPr>
+              <a:t>XmlAdaptedMeeting</a:t>
+            </a:r>
+            <a:endParaRPr lang="en-SG" sz="1050" b="1" dirty="0">
+              <a:solidFill>
+                <a:schemeClr val="accent6">
+                  <a:lumMod val="75000"/>
+                </a:schemeClr>
+              </a:solidFill>
+            </a:endParaRPr>
+          </a:p>
+        </p:txBody>
+      </p:sp>
+      <p:cxnSp>
+        <p:nvCxnSpPr>
+          <p:cNvPr id="27" name="Elbow Connector 122">
+            <a:extLst>
+              <a:ext uri="{FF2B5EF4-FFF2-40B4-BE49-F238E27FC236}">
+                <a16:creationId xmlns:a16="http://schemas.microsoft.com/office/drawing/2014/main" id="{AC18CD23-2D9D-4447-8BB0-67D1F70B78D9}"/>
+              </a:ext>
+            </a:extLst>
+          </p:cNvPr>
+          <p:cNvCxnSpPr/>
+          <p:nvPr/>
+        </p:nvCxnSpPr>
+        <p:spPr>
+          <a:xfrm rot="5400000" flipH="1" flipV="1">
+            <a:off x="6450078" y="3002178"/>
+            <a:ext cx="335208" cy="12700"/>
+          </a:xfrm>
+          <a:prstGeom prst="bentConnector3">
+            <a:avLst>
+              <a:gd name="adj1" fmla="val 50000"/>
+            </a:avLst>
+          </a:prstGeom>
+          <a:ln w="19050">
+            <a:prstDash val="sysDot"/>
+            <a:headEnd type="none" w="med" len="med"/>
+            <a:tailEnd type="arrow" w="med" len="med"/>
+          </a:ln>
+          <a:effectLst/>
+        </p:spPr>
+        <p:style>
+          <a:lnRef idx="1">
+            <a:schemeClr val="accent6"/>
+          </a:lnRef>
+          <a:fillRef idx="2">
+            <a:schemeClr val="accent6"/>
+          </a:fillRef>
+          <a:effectRef idx="1">
+            <a:schemeClr val="accent6"/>
+          </a:effectRef>
+          <a:fontRef idx="minor">
+            <a:schemeClr val="dk1"/>
+          </a:fontRef>
+        </p:style>
+      </p:cxnSp>
     </p:spTree>
     <p:extLst>
       <p:ext uri="{BB962C8B-B14F-4D97-AF65-F5344CB8AC3E}">
@@ -4843,13 +4952,6 @@
   <p:clrMapOvr>
     <a:masterClrMapping/>
   </p:clrMapOvr>
-  <p:timing>
-    <p:tnLst>
-      <p:par>
-        <p:cTn id="1" dur="indefinite" restart="never" nodeType="tmRoot"/>
-      </p:par>
-    </p:tnLst>
-  </p:timing>
 </p:sld>
 </file>
 

</xml_diff>

<commit_message>
Update storage component class diagram
</commit_message>
<xml_diff>
--- a/docs/diagrams/StorageComponentClassDiagram.pptx
+++ b/docs/diagrams/StorageComponentClassDiagram.pptx
@@ -107,6 +107,22 @@
       </a:defRPr>
     </a:lvl9pPr>
   </p:defaultTextStyle>
+  <p:extLst>
+    <p:ext uri="{EFAFB233-063F-42B5-8137-9DF3F51BA10A}">
+      <p15:sldGuideLst xmlns:p15="http://schemas.microsoft.com/office/powerpoint/2012/main">
+        <p15:guide id="1" orient="horz" pos="1488">
+          <p15:clr>
+            <a:srgbClr val="A4A3A4"/>
+          </p15:clr>
+        </p15:guide>
+        <p15:guide id="2" pos="2880">
+          <p15:clr>
+            <a:srgbClr val="A4A3A4"/>
+          </p15:clr>
+        </p15:guide>
+      </p15:sldGuideLst>
+    </p:ext>
+  </p:extLst>
 </p:presentation>
 </file>
 
@@ -192,7 +208,7 @@
           <a:p>
             <a:fld id="{F5CC4B3F-88C1-4FFA-B1B6-F41C21DC6924}" type="datetimeFigureOut">
               <a:rPr lang="en-US" smtClean="0"/>
-              <a:t>10/16/2016</a:t>
+              <a:t>11/10/17</a:t>
             </a:fld>
             <a:endParaRPr lang="en-US"/>
           </a:p>
@@ -641,7 +657,7 @@
           <a:p>
             <a:fld id="{78C97017-6FC3-485B-9764-EAC9E56C1D49}" type="datetimeFigureOut">
               <a:rPr lang="en-US" smtClean="0"/>
-              <a:t>10/16/2016</a:t>
+              <a:t>11/10/17</a:t>
             </a:fld>
             <a:endParaRPr lang="en-US"/>
           </a:p>
@@ -811,7 +827,7 @@
           <a:p>
             <a:fld id="{78C97017-6FC3-485B-9764-EAC9E56C1D49}" type="datetimeFigureOut">
               <a:rPr lang="en-US" smtClean="0"/>
-              <a:t>10/16/2016</a:t>
+              <a:t>11/10/17</a:t>
             </a:fld>
             <a:endParaRPr lang="en-US"/>
           </a:p>
@@ -991,7 +1007,7 @@
           <a:p>
             <a:fld id="{78C97017-6FC3-485B-9764-EAC9E56C1D49}" type="datetimeFigureOut">
               <a:rPr lang="en-US" smtClean="0"/>
-              <a:t>10/16/2016</a:t>
+              <a:t>11/10/17</a:t>
             </a:fld>
             <a:endParaRPr lang="en-US"/>
           </a:p>
@@ -1161,7 +1177,7 @@
           <a:p>
             <a:fld id="{78C97017-6FC3-485B-9764-EAC9E56C1D49}" type="datetimeFigureOut">
               <a:rPr lang="en-US" smtClean="0"/>
-              <a:t>10/16/2016</a:t>
+              <a:t>11/10/17</a:t>
             </a:fld>
             <a:endParaRPr lang="en-US"/>
           </a:p>
@@ -1407,7 +1423,7 @@
           <a:p>
             <a:fld id="{78C97017-6FC3-485B-9764-EAC9E56C1D49}" type="datetimeFigureOut">
               <a:rPr lang="en-US" smtClean="0"/>
-              <a:t>10/16/2016</a:t>
+              <a:t>11/10/17</a:t>
             </a:fld>
             <a:endParaRPr lang="en-US"/>
           </a:p>
@@ -1695,7 +1711,7 @@
           <a:p>
             <a:fld id="{78C97017-6FC3-485B-9764-EAC9E56C1D49}" type="datetimeFigureOut">
               <a:rPr lang="en-US" smtClean="0"/>
-              <a:t>10/16/2016</a:t>
+              <a:t>11/10/17</a:t>
             </a:fld>
             <a:endParaRPr lang="en-US"/>
           </a:p>
@@ -2117,7 +2133,7 @@
           <a:p>
             <a:fld id="{78C97017-6FC3-485B-9764-EAC9E56C1D49}" type="datetimeFigureOut">
               <a:rPr lang="en-US" smtClean="0"/>
-              <a:t>10/16/2016</a:t>
+              <a:t>11/10/17</a:t>
             </a:fld>
             <a:endParaRPr lang="en-US"/>
           </a:p>
@@ -2235,7 +2251,7 @@
           <a:p>
             <a:fld id="{78C97017-6FC3-485B-9764-EAC9E56C1D49}" type="datetimeFigureOut">
               <a:rPr lang="en-US" smtClean="0"/>
-              <a:t>10/16/2016</a:t>
+              <a:t>11/10/17</a:t>
             </a:fld>
             <a:endParaRPr lang="en-US"/>
           </a:p>
@@ -2330,7 +2346,7 @@
           <a:p>
             <a:fld id="{78C97017-6FC3-485B-9764-EAC9E56C1D49}" type="datetimeFigureOut">
               <a:rPr lang="en-US" smtClean="0"/>
-              <a:t>10/16/2016</a:t>
+              <a:t>11/10/17</a:t>
             </a:fld>
             <a:endParaRPr lang="en-US"/>
           </a:p>
@@ -2607,7 +2623,7 @@
           <a:p>
             <a:fld id="{78C97017-6FC3-485B-9764-EAC9E56C1D49}" type="datetimeFigureOut">
               <a:rPr lang="en-US" smtClean="0"/>
-              <a:t>10/16/2016</a:t>
+              <a:t>11/10/17</a:t>
             </a:fld>
             <a:endParaRPr lang="en-US"/>
           </a:p>
@@ -2860,7 +2876,7 @@
           <a:p>
             <a:fld id="{78C97017-6FC3-485B-9764-EAC9E56C1D49}" type="datetimeFigureOut">
               <a:rPr lang="en-US" smtClean="0"/>
-              <a:t>10/16/2016</a:t>
+              <a:t>11/10/17</a:t>
             </a:fld>
             <a:endParaRPr lang="en-US"/>
           </a:p>
@@ -3073,7 +3089,7 @@
           <a:p>
             <a:fld id="{78C97017-6FC3-485B-9764-EAC9E56C1D49}" type="datetimeFigureOut">
               <a:rPr lang="en-US" smtClean="0"/>
-              <a:t>10/16/2016</a:t>
+              <a:t>11/10/17</a:t>
             </a:fld>
             <a:endParaRPr lang="en-US"/>
           </a:p>
@@ -3456,8 +3472,8 @@
         </p:nvSpPr>
         <p:spPr>
           <a:xfrm>
-            <a:off x="1119865" y="2086382"/>
-            <a:ext cx="7871735" cy="1723618"/>
+            <a:off x="1143000" y="2085277"/>
+            <a:ext cx="7924800" cy="2222582"/>
           </a:xfrm>
           <a:prstGeom prst="roundRect">
             <a:avLst>
@@ -4809,6 +4825,555 @@
           <a:prstGeom prst="bentConnector3">
             <a:avLst>
               <a:gd name="adj1" fmla="val 50000"/>
+            </a:avLst>
+          </a:prstGeom>
+          <a:ln w="19050">
+            <a:prstDash val="sysDot"/>
+            <a:headEnd type="none" w="med" len="med"/>
+            <a:tailEnd type="arrow" w="med" len="med"/>
+          </a:ln>
+          <a:effectLst/>
+        </p:spPr>
+        <p:style>
+          <a:lnRef idx="1">
+            <a:schemeClr val="accent6"/>
+          </a:lnRef>
+          <a:fillRef idx="2">
+            <a:schemeClr val="accent6"/>
+          </a:fillRef>
+          <a:effectRef idx="1">
+            <a:schemeClr val="accent6"/>
+          </a:effectRef>
+          <a:fontRef idx="minor">
+            <a:schemeClr val="dk1"/>
+          </a:fontRef>
+        </p:style>
+      </p:cxnSp>
+      <p:sp>
+        <p:nvSpPr>
+          <p:cNvPr id="26" name="Rectangle 8"/>
+          <p:cNvSpPr/>
+          <p:nvPr/>
+        </p:nvSpPr>
+        <p:spPr>
+          <a:xfrm>
+            <a:off x="2873942" y="3747215"/>
+            <a:ext cx="1323049" cy="346760"/>
+          </a:xfrm>
+          <a:prstGeom prst="rect">
+            <a:avLst/>
+          </a:prstGeom>
+          <a:solidFill>
+            <a:schemeClr val="accent6">
+              <a:lumMod val="75000"/>
+            </a:schemeClr>
+          </a:solidFill>
+          <a:ln w="19050">
+            <a:solidFill>
+              <a:schemeClr val="accent6">
+                <a:lumMod val="75000"/>
+              </a:schemeClr>
+            </a:solidFill>
+          </a:ln>
+          <a:effectLst/>
+        </p:spPr>
+        <p:style>
+          <a:lnRef idx="1">
+            <a:schemeClr val="accent2"/>
+          </a:lnRef>
+          <a:fillRef idx="2">
+            <a:schemeClr val="accent2"/>
+          </a:fillRef>
+          <a:effectRef idx="1">
+            <a:schemeClr val="accent2"/>
+          </a:effectRef>
+          <a:fontRef idx="minor">
+            <a:schemeClr val="dk1"/>
+          </a:fontRef>
+        </p:style>
+        <p:txBody>
+          <a:bodyPr rtlCol="0" anchor="ctr"/>
+          <a:lstStyle/>
+          <a:p>
+            <a:pPr algn="ctr"/>
+            <a:r>
+              <a:rPr lang="en-US" sz="1050" dirty="0" smtClean="0">
+                <a:solidFill>
+                  <a:schemeClr val="bg1"/>
+                </a:solidFill>
+              </a:rPr>
+              <a:t>&lt;&lt;interface&gt;&gt;</a:t>
+            </a:r>
+            <a:br>
+              <a:rPr lang="en-US" sz="1050" dirty="0" smtClean="0">
+                <a:solidFill>
+                  <a:schemeClr val="bg1"/>
+                </a:solidFill>
+              </a:rPr>
+            </a:br>
+            <a:r>
+              <a:rPr lang="en-US" sz="1050" dirty="0" err="1" smtClean="0">
+                <a:solidFill>
+                  <a:schemeClr val="bg1"/>
+                </a:solidFill>
+              </a:rPr>
+              <a:t>Task</a:t>
+            </a:r>
+            <a:r>
+              <a:rPr lang="en-US" sz="1050" dirty="0" err="1" smtClean="0">
+                <a:solidFill>
+                  <a:schemeClr val="bg1"/>
+                </a:solidFill>
+              </a:rPr>
+              <a:t>BookStorage</a:t>
+            </a:r>
+            <a:endParaRPr lang="en-SG" sz="1050" dirty="0">
+              <a:solidFill>
+                <a:schemeClr val="bg1"/>
+              </a:solidFill>
+            </a:endParaRPr>
+          </a:p>
+        </p:txBody>
+      </p:sp>
+      <p:sp>
+        <p:nvSpPr>
+          <p:cNvPr id="27" name="Isosceles Triangle 102"/>
+          <p:cNvSpPr/>
+          <p:nvPr/>
+        </p:nvSpPr>
+        <p:spPr>
+          <a:xfrm rot="5400000" flipV="1">
+            <a:off x="4156079" y="3844459"/>
+            <a:ext cx="270504" cy="175523"/>
+          </a:xfrm>
+          <a:prstGeom prst="triangle">
+            <a:avLst/>
+          </a:prstGeom>
+          <a:solidFill>
+            <a:schemeClr val="accent6">
+              <a:lumMod val="75000"/>
+            </a:schemeClr>
+          </a:solidFill>
+          <a:ln w="19050">
+            <a:solidFill>
+              <a:schemeClr val="accent6">
+                <a:lumMod val="75000"/>
+              </a:schemeClr>
+            </a:solidFill>
+          </a:ln>
+          <a:effectLst/>
+        </p:spPr>
+        <p:style>
+          <a:lnRef idx="1">
+            <a:schemeClr val="accent2"/>
+          </a:lnRef>
+          <a:fillRef idx="2">
+            <a:schemeClr val="accent2"/>
+          </a:fillRef>
+          <a:effectRef idx="1">
+            <a:schemeClr val="accent2"/>
+          </a:effectRef>
+          <a:fontRef idx="minor">
+            <a:schemeClr val="dk1"/>
+          </a:fontRef>
+        </p:style>
+        <p:txBody>
+          <a:bodyPr rtlCol="0" anchor="ctr"/>
+          <a:lstStyle/>
+          <a:p>
+            <a:pPr algn="ctr"/>
+            <a:endParaRPr lang="en-SG" sz="1050">
+              <a:solidFill>
+                <a:schemeClr val="bg1"/>
+              </a:solidFill>
+            </a:endParaRPr>
+          </a:p>
+        </p:txBody>
+      </p:sp>
+      <p:cxnSp>
+        <p:nvCxnSpPr>
+          <p:cNvPr id="28" name="Elbow Connector 63"/>
+          <p:cNvCxnSpPr>
+            <a:stCxn id="27" idx="3"/>
+          </p:cNvCxnSpPr>
+          <p:nvPr/>
+        </p:nvCxnSpPr>
+        <p:spPr>
+          <a:xfrm flipV="1">
+            <a:off x="4379093" y="3932220"/>
+            <a:ext cx="213129" cy="1"/>
+          </a:xfrm>
+          <a:prstGeom prst="bentConnector3">
+            <a:avLst>
+              <a:gd name="adj1" fmla="val 50000"/>
+            </a:avLst>
+          </a:prstGeom>
+          <a:ln w="19050">
+            <a:solidFill>
+              <a:schemeClr val="accent6">
+                <a:lumMod val="75000"/>
+              </a:schemeClr>
+            </a:solidFill>
+            <a:prstDash val="sysDot"/>
+            <a:headEnd type="none" w="med" len="med"/>
+            <a:tailEnd type="none" w="med" len="med"/>
+          </a:ln>
+          <a:effectLst/>
+        </p:spPr>
+        <p:style>
+          <a:lnRef idx="1">
+            <a:schemeClr val="accent2"/>
+          </a:lnRef>
+          <a:fillRef idx="2">
+            <a:schemeClr val="accent2"/>
+          </a:fillRef>
+          <a:effectRef idx="1">
+            <a:schemeClr val="accent2"/>
+          </a:effectRef>
+          <a:fontRef idx="minor">
+            <a:schemeClr val="dk1"/>
+          </a:fontRef>
+        </p:style>
+      </p:cxnSp>
+      <p:sp>
+        <p:nvSpPr>
+          <p:cNvPr id="31" name="Rectangle 8"/>
+          <p:cNvSpPr/>
+          <p:nvPr/>
+        </p:nvSpPr>
+        <p:spPr>
+          <a:xfrm>
+            <a:off x="4618128" y="3747215"/>
+            <a:ext cx="1169835" cy="346760"/>
+          </a:xfrm>
+          <a:prstGeom prst="rect">
+            <a:avLst/>
+          </a:prstGeom>
+          <a:ln w="19050"/>
+          <a:effectLst/>
+        </p:spPr>
+        <p:style>
+          <a:lnRef idx="1">
+            <a:schemeClr val="accent6"/>
+          </a:lnRef>
+          <a:fillRef idx="2">
+            <a:schemeClr val="accent6"/>
+          </a:fillRef>
+          <a:effectRef idx="1">
+            <a:schemeClr val="accent6"/>
+          </a:effectRef>
+          <a:fontRef idx="minor">
+            <a:schemeClr val="dk1"/>
+          </a:fontRef>
+        </p:style>
+        <p:txBody>
+          <a:bodyPr rtlCol="0" anchor="ctr"/>
+          <a:lstStyle/>
+          <a:p>
+            <a:pPr algn="ctr"/>
+            <a:r>
+              <a:rPr lang="en-US" sz="1050" b="1" dirty="0" err="1" smtClean="0">
+                <a:solidFill>
+                  <a:schemeClr val="accent6">
+                    <a:lumMod val="75000"/>
+                  </a:schemeClr>
+                </a:solidFill>
+              </a:rPr>
+              <a:t>XmlTaskBook</a:t>
+            </a:r>
+            <a:r>
+              <a:rPr lang="en-US" sz="1050" b="1" dirty="0" smtClean="0">
+                <a:solidFill>
+                  <a:schemeClr val="accent6">
+                    <a:lumMod val="75000"/>
+                  </a:schemeClr>
+                </a:solidFill>
+              </a:rPr>
+              <a:t/>
+            </a:r>
+            <a:br>
+              <a:rPr lang="en-US" sz="1050" b="1" dirty="0" smtClean="0">
+                <a:solidFill>
+                  <a:schemeClr val="accent6">
+                    <a:lumMod val="75000"/>
+                  </a:schemeClr>
+                </a:solidFill>
+              </a:rPr>
+            </a:br>
+            <a:r>
+              <a:rPr lang="en-US" sz="1050" b="1" dirty="0" smtClean="0">
+                <a:solidFill>
+                  <a:schemeClr val="accent6">
+                    <a:lumMod val="75000"/>
+                  </a:schemeClr>
+                </a:solidFill>
+              </a:rPr>
+              <a:t>Storage</a:t>
+            </a:r>
+            <a:endParaRPr lang="en-SG" sz="1050" b="1" dirty="0">
+              <a:solidFill>
+                <a:schemeClr val="accent6">
+                  <a:lumMod val="75000"/>
+                </a:schemeClr>
+              </a:solidFill>
+            </a:endParaRPr>
+          </a:p>
+        </p:txBody>
+      </p:sp>
+      <p:cxnSp>
+        <p:nvCxnSpPr>
+          <p:cNvPr id="32" name="Elbow Connector 122"/>
+          <p:cNvCxnSpPr>
+            <a:stCxn id="31" idx="3"/>
+          </p:cNvCxnSpPr>
+          <p:nvPr/>
+        </p:nvCxnSpPr>
+        <p:spPr>
+          <a:xfrm>
+            <a:off x="5787963" y="3920595"/>
+            <a:ext cx="223324" cy="11625"/>
+          </a:xfrm>
+          <a:prstGeom prst="bentConnector3">
+            <a:avLst>
+              <a:gd name="adj1" fmla="val 50000"/>
+            </a:avLst>
+          </a:prstGeom>
+          <a:ln w="19050">
+            <a:solidFill>
+              <a:schemeClr val="accent6">
+                <a:lumMod val="75000"/>
+              </a:schemeClr>
+            </a:solidFill>
+            <a:prstDash val="sysDot"/>
+            <a:headEnd type="none" w="med" len="med"/>
+            <a:tailEnd type="arrow" w="med" len="med"/>
+          </a:ln>
+          <a:effectLst/>
+        </p:spPr>
+        <p:style>
+          <a:lnRef idx="1">
+            <a:schemeClr val="accent2"/>
+          </a:lnRef>
+          <a:fillRef idx="2">
+            <a:schemeClr val="accent2"/>
+          </a:fillRef>
+          <a:effectRef idx="1">
+            <a:schemeClr val="accent2"/>
+          </a:effectRef>
+          <a:fontRef idx="minor">
+            <a:schemeClr val="dk1"/>
+          </a:fontRef>
+        </p:style>
+      </p:cxnSp>
+      <p:sp>
+        <p:nvSpPr>
+          <p:cNvPr id="35" name="Rectangle 8"/>
+          <p:cNvSpPr/>
+          <p:nvPr/>
+        </p:nvSpPr>
+        <p:spPr>
+          <a:xfrm>
+            <a:off x="6008177" y="3737819"/>
+            <a:ext cx="1200707" cy="346760"/>
+          </a:xfrm>
+          <a:prstGeom prst="rect">
+            <a:avLst/>
+          </a:prstGeom>
+          <a:ln w="19050"/>
+          <a:effectLst/>
+        </p:spPr>
+        <p:style>
+          <a:lnRef idx="1">
+            <a:schemeClr val="accent6"/>
+          </a:lnRef>
+          <a:fillRef idx="2">
+            <a:schemeClr val="accent6"/>
+          </a:fillRef>
+          <a:effectRef idx="1">
+            <a:schemeClr val="accent6"/>
+          </a:effectRef>
+          <a:fontRef idx="minor">
+            <a:schemeClr val="dk1"/>
+          </a:fontRef>
+        </p:style>
+        <p:txBody>
+          <a:bodyPr rtlCol="0" anchor="ctr"/>
+          <a:lstStyle/>
+          <a:p>
+            <a:pPr algn="ctr"/>
+            <a:r>
+              <a:rPr lang="en-US" sz="1050" b="1" dirty="0" err="1" smtClean="0">
+                <a:solidFill>
+                  <a:schemeClr val="accent6">
+                    <a:lumMod val="75000"/>
+                  </a:schemeClr>
+                </a:solidFill>
+              </a:rPr>
+              <a:t>XmlSerializable</a:t>
+            </a:r>
+            <a:r>
+              <a:rPr lang="en-US" sz="1050" b="1" dirty="0" smtClean="0">
+                <a:solidFill>
+                  <a:schemeClr val="accent6">
+                    <a:lumMod val="75000"/>
+                  </a:schemeClr>
+                </a:solidFill>
+              </a:rPr>
+              <a:t/>
+            </a:r>
+            <a:br>
+              <a:rPr lang="en-US" sz="1050" b="1" dirty="0" smtClean="0">
+                <a:solidFill>
+                  <a:schemeClr val="accent6">
+                    <a:lumMod val="75000"/>
+                  </a:schemeClr>
+                </a:solidFill>
+              </a:rPr>
+            </a:br>
+            <a:r>
+              <a:rPr lang="en-US" sz="1050" b="1" dirty="0" err="1" smtClean="0">
+                <a:solidFill>
+                  <a:schemeClr val="accent6">
+                    <a:lumMod val="75000"/>
+                  </a:schemeClr>
+                </a:solidFill>
+              </a:rPr>
+              <a:t>Task</a:t>
+            </a:r>
+            <a:r>
+              <a:rPr lang="en-US" sz="1050" b="1" dirty="0" err="1" smtClean="0">
+                <a:solidFill>
+                  <a:schemeClr val="accent6">
+                    <a:lumMod val="75000"/>
+                  </a:schemeClr>
+                </a:solidFill>
+              </a:rPr>
+              <a:t>Book</a:t>
+            </a:r>
+            <a:endParaRPr lang="en-SG" sz="1050" b="1" dirty="0">
+              <a:solidFill>
+                <a:schemeClr val="accent6">
+                  <a:lumMod val="75000"/>
+                </a:schemeClr>
+              </a:solidFill>
+            </a:endParaRPr>
+          </a:p>
+        </p:txBody>
+      </p:sp>
+      <p:cxnSp>
+        <p:nvCxnSpPr>
+          <p:cNvPr id="36" name="Elbow Connector 122"/>
+          <p:cNvCxnSpPr>
+            <a:stCxn id="35" idx="3"/>
+          </p:cNvCxnSpPr>
+          <p:nvPr/>
+        </p:nvCxnSpPr>
+        <p:spPr>
+          <a:xfrm flipV="1">
+            <a:off x="7208884" y="3910413"/>
+            <a:ext cx="390265" cy="786"/>
+          </a:xfrm>
+          <a:prstGeom prst="bentConnector3">
+            <a:avLst>
+              <a:gd name="adj1" fmla="val 50000"/>
+            </a:avLst>
+          </a:prstGeom>
+          <a:ln w="19050">
+            <a:prstDash val="sysDot"/>
+            <a:headEnd type="none" w="med" len="med"/>
+            <a:tailEnd type="arrow" w="med" len="med"/>
+          </a:ln>
+          <a:effectLst/>
+        </p:spPr>
+        <p:style>
+          <a:lnRef idx="1">
+            <a:schemeClr val="accent6"/>
+          </a:lnRef>
+          <a:fillRef idx="2">
+            <a:schemeClr val="accent6"/>
+          </a:fillRef>
+          <a:effectRef idx="1">
+            <a:schemeClr val="accent6"/>
+          </a:effectRef>
+          <a:fontRef idx="minor">
+            <a:schemeClr val="dk1"/>
+          </a:fontRef>
+        </p:style>
+      </p:cxnSp>
+      <p:sp>
+        <p:nvSpPr>
+          <p:cNvPr id="39" name="Rectangle 8"/>
+          <p:cNvSpPr/>
+          <p:nvPr/>
+        </p:nvSpPr>
+        <p:spPr>
+          <a:xfrm>
+            <a:off x="7615738" y="3737033"/>
+            <a:ext cx="1259718" cy="346760"/>
+          </a:xfrm>
+          <a:prstGeom prst="rect">
+            <a:avLst/>
+          </a:prstGeom>
+          <a:ln w="19050"/>
+          <a:effectLst/>
+        </p:spPr>
+        <p:style>
+          <a:lnRef idx="1">
+            <a:schemeClr val="accent6"/>
+          </a:lnRef>
+          <a:fillRef idx="2">
+            <a:schemeClr val="accent6"/>
+          </a:fillRef>
+          <a:effectRef idx="1">
+            <a:schemeClr val="accent6"/>
+          </a:effectRef>
+          <a:fontRef idx="minor">
+            <a:schemeClr val="dk1"/>
+          </a:fontRef>
+        </p:style>
+        <p:txBody>
+          <a:bodyPr rtlCol="0" anchor="ctr"/>
+          <a:lstStyle/>
+          <a:p>
+            <a:pPr algn="ctr"/>
+            <a:r>
+              <a:rPr lang="en-US" sz="1050" b="1" dirty="0" err="1" smtClean="0">
+                <a:solidFill>
+                  <a:schemeClr val="accent6">
+                    <a:lumMod val="75000"/>
+                  </a:schemeClr>
+                </a:solidFill>
+              </a:rPr>
+              <a:t>XmlAdaptedTask</a:t>
+            </a:r>
+            <a:endParaRPr lang="en-SG" sz="1050" b="1" dirty="0">
+              <a:solidFill>
+                <a:schemeClr val="accent6">
+                  <a:lumMod val="75000"/>
+                </a:schemeClr>
+              </a:solidFill>
+            </a:endParaRPr>
+          </a:p>
+        </p:txBody>
+      </p:sp>
+      <p:cxnSp>
+        <p:nvCxnSpPr>
+          <p:cNvPr id="40" name="Elbow Connector 122"/>
+          <p:cNvCxnSpPr>
+            <a:stCxn id="39" idx="3"/>
+            <a:endCxn id="73" idx="0"/>
+          </p:cNvCxnSpPr>
+          <p:nvPr/>
+        </p:nvCxnSpPr>
+        <p:spPr>
+          <a:xfrm flipH="1" flipV="1">
+            <a:off x="8245597" y="2477656"/>
+            <a:ext cx="629859" cy="1432757"/>
+          </a:xfrm>
+          <a:prstGeom prst="bentConnector4">
+            <a:avLst>
+              <a:gd name="adj1" fmla="val -14073"/>
+              <a:gd name="adj2" fmla="val 115955"/>
             </a:avLst>
           </a:prstGeom>
           <a:ln w="19050">

</xml_diff>

<commit_message>
v1.5 Update adocs and remove unused methods (#133)
* DeveloperGuide.adoc: Update Sort Sequence Diagram

* DeveloperGuide.adoc: update user stories and use case

* ExtendedPersonCard.fxml: update icons file positions

* README.adoc: update

* Mainwindow: add cherBook icon

* Project Portfolio update

* remove line

* add newline at EOF

* ExtendedPersonCard: change Vbox to Gridpane & add labels

* no message

* fix checkstyle

* Minor fix

* UserGuide.adoc: update UILayout image link

* UserGuide.adoc: update image

* Update javadocs

* remove extra author tag

* DeveloperGuide.adoc: update StorageClassDiagram

* DeveloperGuide.adoc: improve implementations

* Celine.adoc: add v1.5 feature and proposed enhancement

* UserGuide.adoc: Add notes for adding and deleting schedules

* TabCommand: fix checkstyle
</commit_message>
<xml_diff>
--- a/docs/diagrams/StorageComponentClassDiagram.pptx
+++ b/docs/diagrams/StorageComponentClassDiagram.pptx
@@ -107,6 +107,22 @@
       </a:defRPr>
     </a:lvl9pPr>
   </p:defaultTextStyle>
+  <p:extLst>
+    <p:ext uri="{EFAFB233-063F-42B5-8137-9DF3F51BA10A}">
+      <p15:sldGuideLst xmlns:p15="http://schemas.microsoft.com/office/powerpoint/2012/main">
+        <p15:guide id="1" orient="horz" pos="1488">
+          <p15:clr>
+            <a:srgbClr val="A4A3A4"/>
+          </p15:clr>
+        </p15:guide>
+        <p15:guide id="2" pos="2880">
+          <p15:clr>
+            <a:srgbClr val="A4A3A4"/>
+          </p15:clr>
+        </p15:guide>
+      </p15:sldGuideLst>
+    </p:ext>
+  </p:extLst>
 </p:presentation>
 </file>
 
@@ -192,7 +208,7 @@
           <a:p>
             <a:fld id="{F5CC4B3F-88C1-4FFA-B1B6-F41C21DC6924}" type="datetimeFigureOut">
               <a:rPr lang="en-US" smtClean="0"/>
-              <a:t>10/16/2016</a:t>
+              <a:t>11/10/17</a:t>
             </a:fld>
             <a:endParaRPr lang="en-US"/>
           </a:p>
@@ -641,7 +657,7 @@
           <a:p>
             <a:fld id="{78C97017-6FC3-485B-9764-EAC9E56C1D49}" type="datetimeFigureOut">
               <a:rPr lang="en-US" smtClean="0"/>
-              <a:t>10/16/2016</a:t>
+              <a:t>11/10/17</a:t>
             </a:fld>
             <a:endParaRPr lang="en-US"/>
           </a:p>
@@ -811,7 +827,7 @@
           <a:p>
             <a:fld id="{78C97017-6FC3-485B-9764-EAC9E56C1D49}" type="datetimeFigureOut">
               <a:rPr lang="en-US" smtClean="0"/>
-              <a:t>10/16/2016</a:t>
+              <a:t>11/10/17</a:t>
             </a:fld>
             <a:endParaRPr lang="en-US"/>
           </a:p>
@@ -991,7 +1007,7 @@
           <a:p>
             <a:fld id="{78C97017-6FC3-485B-9764-EAC9E56C1D49}" type="datetimeFigureOut">
               <a:rPr lang="en-US" smtClean="0"/>
-              <a:t>10/16/2016</a:t>
+              <a:t>11/10/17</a:t>
             </a:fld>
             <a:endParaRPr lang="en-US"/>
           </a:p>
@@ -1161,7 +1177,7 @@
           <a:p>
             <a:fld id="{78C97017-6FC3-485B-9764-EAC9E56C1D49}" type="datetimeFigureOut">
               <a:rPr lang="en-US" smtClean="0"/>
-              <a:t>10/16/2016</a:t>
+              <a:t>11/10/17</a:t>
             </a:fld>
             <a:endParaRPr lang="en-US"/>
           </a:p>
@@ -1407,7 +1423,7 @@
           <a:p>
             <a:fld id="{78C97017-6FC3-485B-9764-EAC9E56C1D49}" type="datetimeFigureOut">
               <a:rPr lang="en-US" smtClean="0"/>
-              <a:t>10/16/2016</a:t>
+              <a:t>11/10/17</a:t>
             </a:fld>
             <a:endParaRPr lang="en-US"/>
           </a:p>
@@ -1695,7 +1711,7 @@
           <a:p>
             <a:fld id="{78C97017-6FC3-485B-9764-EAC9E56C1D49}" type="datetimeFigureOut">
               <a:rPr lang="en-US" smtClean="0"/>
-              <a:t>10/16/2016</a:t>
+              <a:t>11/10/17</a:t>
             </a:fld>
             <a:endParaRPr lang="en-US"/>
           </a:p>
@@ -2117,7 +2133,7 @@
           <a:p>
             <a:fld id="{78C97017-6FC3-485B-9764-EAC9E56C1D49}" type="datetimeFigureOut">
               <a:rPr lang="en-US" smtClean="0"/>
-              <a:t>10/16/2016</a:t>
+              <a:t>11/10/17</a:t>
             </a:fld>
             <a:endParaRPr lang="en-US"/>
           </a:p>
@@ -2235,7 +2251,7 @@
           <a:p>
             <a:fld id="{78C97017-6FC3-485B-9764-EAC9E56C1D49}" type="datetimeFigureOut">
               <a:rPr lang="en-US" smtClean="0"/>
-              <a:t>10/16/2016</a:t>
+              <a:t>11/10/17</a:t>
             </a:fld>
             <a:endParaRPr lang="en-US"/>
           </a:p>
@@ -2330,7 +2346,7 @@
           <a:p>
             <a:fld id="{78C97017-6FC3-485B-9764-EAC9E56C1D49}" type="datetimeFigureOut">
               <a:rPr lang="en-US" smtClean="0"/>
-              <a:t>10/16/2016</a:t>
+              <a:t>11/10/17</a:t>
             </a:fld>
             <a:endParaRPr lang="en-US"/>
           </a:p>
@@ -2607,7 +2623,7 @@
           <a:p>
             <a:fld id="{78C97017-6FC3-485B-9764-EAC9E56C1D49}" type="datetimeFigureOut">
               <a:rPr lang="en-US" smtClean="0"/>
-              <a:t>10/16/2016</a:t>
+              <a:t>11/10/17</a:t>
             </a:fld>
             <a:endParaRPr lang="en-US"/>
           </a:p>
@@ -2860,7 +2876,7 @@
           <a:p>
             <a:fld id="{78C97017-6FC3-485B-9764-EAC9E56C1D49}" type="datetimeFigureOut">
               <a:rPr lang="en-US" smtClean="0"/>
-              <a:t>10/16/2016</a:t>
+              <a:t>11/10/17</a:t>
             </a:fld>
             <a:endParaRPr lang="en-US"/>
           </a:p>
@@ -3073,7 +3089,7 @@
           <a:p>
             <a:fld id="{78C97017-6FC3-485B-9764-EAC9E56C1D49}" type="datetimeFigureOut">
               <a:rPr lang="en-US" smtClean="0"/>
-              <a:t>10/16/2016</a:t>
+              <a:t>11/10/17</a:t>
             </a:fld>
             <a:endParaRPr lang="en-US"/>
           </a:p>
@@ -3457,7 +3473,7 @@
         <p:spPr>
           <a:xfrm>
             <a:off x="1119865" y="2086382"/>
-            <a:ext cx="7871735" cy="1723618"/>
+            <a:ext cx="7871735" cy="2180818"/>
           </a:xfrm>
           <a:prstGeom prst="roundRect">
             <a:avLst>
@@ -4639,47 +4655,6 @@
           </a:p>
         </p:txBody>
       </p:sp>
-      <p:cxnSp>
-        <p:nvCxnSpPr>
-          <p:cNvPr id="70" name="Elbow Connector 122"/>
-          <p:cNvCxnSpPr>
-            <a:stCxn id="74" idx="0"/>
-            <a:endCxn id="73" idx="2"/>
-          </p:cNvCxnSpPr>
-          <p:nvPr/>
-        </p:nvCxnSpPr>
-        <p:spPr>
-          <a:xfrm rot="5400000" flipH="1" flipV="1">
-            <a:off x="8077993" y="2992020"/>
-            <a:ext cx="335208" cy="12700"/>
-          </a:xfrm>
-          <a:prstGeom prst="bentConnector3">
-            <a:avLst>
-              <a:gd name="adj1" fmla="val 50000"/>
-            </a:avLst>
-          </a:prstGeom>
-          <a:ln w="19050">
-            <a:prstDash val="sysDot"/>
-            <a:headEnd type="none" w="med" len="med"/>
-            <a:tailEnd type="arrow" w="med" len="med"/>
-          </a:ln>
-          <a:effectLst/>
-        </p:spPr>
-        <p:style>
-          <a:lnRef idx="1">
-            <a:schemeClr val="accent6"/>
-          </a:lnRef>
-          <a:fillRef idx="2">
-            <a:schemeClr val="accent6"/>
-          </a:fillRef>
-          <a:effectRef idx="1">
-            <a:schemeClr val="accent6"/>
-          </a:effectRef>
-          <a:fontRef idx="minor">
-            <a:schemeClr val="dk1"/>
-          </a:fontRef>
-        </p:style>
-      </p:cxnSp>
       <p:sp>
         <p:nvSpPr>
           <p:cNvPr id="73" name="Rectangle 8"/>
@@ -4827,6 +4802,152 @@
           </a:fillRef>
           <a:effectRef idx="1">
             <a:schemeClr val="accent6"/>
+          </a:effectRef>
+          <a:fontRef idx="minor">
+            <a:schemeClr val="dk1"/>
+          </a:fontRef>
+        </p:style>
+      </p:cxnSp>
+      <p:sp>
+        <p:nvSpPr>
+          <p:cNvPr id="26" name="Rectangle 8"/>
+          <p:cNvSpPr/>
+          <p:nvPr/>
+        </p:nvSpPr>
+        <p:spPr>
+          <a:xfrm>
+            <a:off x="7467600" y="3803254"/>
+            <a:ext cx="1414206" cy="346760"/>
+          </a:xfrm>
+          <a:prstGeom prst="rect">
+            <a:avLst/>
+          </a:prstGeom>
+          <a:ln w="19050"/>
+          <a:effectLst/>
+        </p:spPr>
+        <p:style>
+          <a:lnRef idx="1">
+            <a:schemeClr val="accent6"/>
+          </a:lnRef>
+          <a:fillRef idx="2">
+            <a:schemeClr val="accent6"/>
+          </a:fillRef>
+          <a:effectRef idx="1">
+            <a:schemeClr val="accent6"/>
+          </a:effectRef>
+          <a:fontRef idx="minor">
+            <a:schemeClr val="dk1"/>
+          </a:fontRef>
+        </p:style>
+        <p:txBody>
+          <a:bodyPr rtlCol="0" anchor="ctr"/>
+          <a:lstStyle/>
+          <a:p>
+            <a:pPr algn="ctr"/>
+            <a:r>
+              <a:rPr lang="en-US" sz="1050" b="1" smtClean="0">
+                <a:solidFill>
+                  <a:schemeClr val="accent6">
+                    <a:lumMod val="75000"/>
+                  </a:schemeClr>
+                </a:solidFill>
+              </a:rPr>
+              <a:t>XmlAdaptedSchedule</a:t>
+            </a:r>
+            <a:endParaRPr lang="en-SG" sz="1050" b="1" dirty="0">
+              <a:solidFill>
+                <a:schemeClr val="accent6">
+                  <a:lumMod val="75000"/>
+                </a:schemeClr>
+              </a:solidFill>
+            </a:endParaRPr>
+          </a:p>
+        </p:txBody>
+      </p:sp>
+      <p:cxnSp>
+        <p:nvCxnSpPr>
+          <p:cNvPr id="29" name="Elbow Connector 122"/>
+          <p:cNvCxnSpPr>
+            <a:stCxn id="74" idx="2"/>
+          </p:cNvCxnSpPr>
+          <p:nvPr/>
+        </p:nvCxnSpPr>
+        <p:spPr>
+          <a:xfrm rot="16200000" flipH="1">
+            <a:off x="8097361" y="3654620"/>
+            <a:ext cx="296871" cy="398"/>
+          </a:xfrm>
+          <a:prstGeom prst="bentConnector3">
+            <a:avLst>
+              <a:gd name="adj1" fmla="val 50000"/>
+            </a:avLst>
+          </a:prstGeom>
+          <a:ln w="19050">
+            <a:solidFill>
+              <a:schemeClr val="accent6">
+                <a:lumMod val="75000"/>
+              </a:schemeClr>
+            </a:solidFill>
+            <a:prstDash val="sysDot"/>
+            <a:headEnd type="none" w="med" len="med"/>
+            <a:tailEnd type="arrow" w="med" len="med"/>
+          </a:ln>
+          <a:effectLst/>
+        </p:spPr>
+        <p:style>
+          <a:lnRef idx="1">
+            <a:schemeClr val="accent2"/>
+          </a:lnRef>
+          <a:fillRef idx="2">
+            <a:schemeClr val="accent2"/>
+          </a:fillRef>
+          <a:effectRef idx="1">
+            <a:schemeClr val="accent2"/>
+          </a:effectRef>
+          <a:fontRef idx="minor">
+            <a:schemeClr val="dk1"/>
+          </a:fontRef>
+        </p:style>
+      </p:cxnSp>
+      <p:cxnSp>
+        <p:nvCxnSpPr>
+          <p:cNvPr id="41" name="Elbow Connector 122"/>
+          <p:cNvCxnSpPr>
+            <a:stCxn id="74" idx="0"/>
+          </p:cNvCxnSpPr>
+          <p:nvPr/>
+        </p:nvCxnSpPr>
+        <p:spPr>
+          <a:xfrm rot="5400000" flipH="1" flipV="1">
+            <a:off x="8073615" y="2987642"/>
+            <a:ext cx="343965" cy="1"/>
+          </a:xfrm>
+          <a:prstGeom prst="bentConnector3">
+            <a:avLst>
+              <a:gd name="adj1" fmla="val 50000"/>
+            </a:avLst>
+          </a:prstGeom>
+          <a:ln w="19050">
+            <a:solidFill>
+              <a:schemeClr val="accent6">
+                <a:lumMod val="75000"/>
+              </a:schemeClr>
+            </a:solidFill>
+            <a:prstDash val="sysDot"/>
+            <a:headEnd type="none" w="med" len="med"/>
+            <a:tailEnd type="arrow" w="med" len="med"/>
+          </a:ln>
+          <a:effectLst/>
+        </p:spPr>
+        <p:style>
+          <a:lnRef idx="1">
+            <a:schemeClr val="accent2"/>
+          </a:lnRef>
+          <a:fillRef idx="2">
+            <a:schemeClr val="accent2"/>
+          </a:fillRef>
+          <a:effectRef idx="1">
+            <a:schemeClr val="accent2"/>
           </a:effectRef>
           <a:fontRef idx="minor">
             <a:schemeClr val="dk1"/>

</xml_diff>